<commit_message>
Report on Software Testing finished, but it needs to be reviewed. TODO: write last 3 slides of ML presentation and review the ST report
</commit_message>
<xml_diff>
--- a/ML/Slides/MLforSE_AndreaPepe_0315903.pptx
+++ b/ML/Slides/MLforSE_AndreaPepe_0315903.pptx
@@ -221,7 +221,7 @@
           <a:p>
             <a:fld id="{97065540-07A0-4C6F-8DCB-73C0680980AD}" type="datetimeFigureOut">
               <a:rPr lang="en-GB" smtClean="0"/>
-              <a:t>25/06/2022</a:t>
+              <a:t>30/06/2022</a:t>
             </a:fld>
             <a:endParaRPr lang="en-GB"/>
           </a:p>
@@ -715,7 +715,7 @@
           <a:p>
             <a:fld id="{36675484-4142-4B7C-84B9-F01C655597FE}" type="datetime1">
               <a:rPr lang="en-GB" smtClean="0"/>
-              <a:t>25/06/2022</a:t>
+              <a:t>30/06/2022</a:t>
             </a:fld>
             <a:endParaRPr lang="en-GB"/>
           </a:p>
@@ -926,7 +926,7 @@
           <a:p>
             <a:fld id="{083C5A5D-FF99-4177-869B-DA343F422A01}" type="datetime1">
               <a:rPr lang="en-GB" smtClean="0"/>
-              <a:t>25/06/2022</a:t>
+              <a:t>30/06/2022</a:t>
             </a:fld>
             <a:endParaRPr lang="en-GB"/>
           </a:p>
@@ -1185,7 +1185,7 @@
           <a:p>
             <a:fld id="{092B45E3-D0D0-4AAE-9720-9E63567A47F3}" type="datetime1">
               <a:rPr lang="en-GB" smtClean="0"/>
-              <a:t>25/06/2022</a:t>
+              <a:t>30/06/2022</a:t>
             </a:fld>
             <a:endParaRPr lang="en-GB"/>
           </a:p>
@@ -1362,7 +1362,7 @@
           <a:p>
             <a:fld id="{0C1C7B71-B0D6-4D5D-BBBB-43567A72C6E5}" type="datetime1">
               <a:rPr lang="en-GB" smtClean="0"/>
-              <a:t>25/06/2022</a:t>
+              <a:t>30/06/2022</a:t>
             </a:fld>
             <a:endParaRPr lang="en-GB"/>
           </a:p>
@@ -1746,7 +1746,7 @@
           <a:p>
             <a:fld id="{C935CB07-C061-473A-A75F-B2F9AE8216F8}" type="datetime1">
               <a:rPr lang="en-GB" smtClean="0"/>
-              <a:t>25/06/2022</a:t>
+              <a:t>30/06/2022</a:t>
             </a:fld>
             <a:endParaRPr lang="en-GB"/>
           </a:p>
@@ -2024,7 +2024,7 @@
           <a:p>
             <a:fld id="{391B62BF-7985-4FDD-BC5F-23B7B3D0F313}" type="datetime1">
               <a:rPr lang="en-GB" smtClean="0"/>
-              <a:t>25/06/2022</a:t>
+              <a:t>30/06/2022</a:t>
             </a:fld>
             <a:endParaRPr lang="en-GB"/>
           </a:p>
@@ -2406,7 +2406,7 @@
           <a:p>
             <a:fld id="{64D75D9B-AAEB-48B3-99F3-2419C903C6D0}" type="datetime1">
               <a:rPr lang="en-GB" smtClean="0"/>
-              <a:t>25/06/2022</a:t>
+              <a:t>30/06/2022</a:t>
             </a:fld>
             <a:endParaRPr lang="en-GB"/>
           </a:p>
@@ -2527,7 +2527,7 @@
           <a:p>
             <a:fld id="{D4AA4976-D0F0-4CBE-AC66-43EB7632E6CE}" type="datetime1">
               <a:rPr lang="en-GB" smtClean="0"/>
-              <a:t>25/06/2022</a:t>
+              <a:t>30/06/2022</a:t>
             </a:fld>
             <a:endParaRPr lang="en-GB"/>
           </a:p>
@@ -2701,7 +2701,7 @@
           <a:p>
             <a:fld id="{75CC64E9-6628-44E0-9812-4A7D096FE556}" type="datetime1">
               <a:rPr lang="en-GB" smtClean="0"/>
-              <a:t>25/06/2022</a:t>
+              <a:t>30/06/2022</a:t>
             </a:fld>
             <a:endParaRPr lang="en-GB"/>
           </a:p>
@@ -3058,7 +3058,7 @@
           <a:p>
             <a:fld id="{C7C6A9E6-4737-40F4-BDF7-16F45B54A2C3}" type="datetime1">
               <a:rPr lang="en-GB" smtClean="0"/>
-              <a:t>25/06/2022</a:t>
+              <a:t>30/06/2022</a:t>
             </a:fld>
             <a:endParaRPr lang="en-GB"/>
           </a:p>
@@ -3443,7 +3443,7 @@
           <a:p>
             <a:fld id="{2187E6E7-BC76-4247-89A8-AACF9F7A52F2}" type="datetime1">
               <a:rPr lang="en-GB" smtClean="0"/>
-              <a:t>25/06/2022</a:t>
+              <a:t>30/06/2022</a:t>
             </a:fld>
             <a:endParaRPr lang="en-GB"/>
           </a:p>
@@ -3743,7 +3743,7 @@
           <a:p>
             <a:fld id="{4A967235-3FFC-4E0D-8871-192108DDF2C6}" type="datetime1">
               <a:rPr lang="en-GB" smtClean="0"/>
-              <a:t>25/06/2022</a:t>
+              <a:t>30/06/2022</a:t>
             </a:fld>
             <a:endParaRPr lang="en-GB"/>
           </a:p>
@@ -4895,23 +4895,39 @@
                   <a:schemeClr val="tx1"/>
                 </a:solidFill>
               </a:rPr>
-              <a:t>I training set </a:t>
-            </a:r>
-            <a:r>
-              <a:rPr lang="en-GB" dirty="0" err="1">
-                <a:solidFill>
-                  <a:schemeClr val="tx1"/>
-                </a:solidFill>
-              </a:rPr>
-              <a:t>usati</a:t>
-            </a:r>
-            <a:r>
-              <a:rPr lang="en-GB" dirty="0">
-                <a:solidFill>
-                  <a:schemeClr val="tx1"/>
-                </a:solidFill>
-              </a:rPr>
-              <a:t> </a:t>
+              <a:t>Ad </a:t>
+            </a:r>
+            <a:r>
+              <a:rPr lang="en-GB" dirty="0" err="1">
+                <a:solidFill>
+                  <a:schemeClr val="tx1"/>
+                </a:solidFill>
+              </a:rPr>
+              <a:t>ogni</a:t>
+            </a:r>
+            <a:r>
+              <a:rPr lang="en-GB" dirty="0">
+                <a:solidFill>
+                  <a:schemeClr val="tx1"/>
+                </a:solidFill>
+              </a:rPr>
+              <a:t> run, </a:t>
+            </a:r>
+            <a:r>
+              <a:rPr lang="en-GB" dirty="0" err="1">
+                <a:solidFill>
+                  <a:schemeClr val="tx1"/>
+                </a:solidFill>
+              </a:rPr>
+              <a:t>tutte</a:t>
+            </a:r>
+            <a:r>
+              <a:rPr lang="en-GB" dirty="0">
+                <a:solidFill>
+                  <a:schemeClr val="tx1"/>
+                </a:solidFill>
+              </a:rPr>
+              <a:t> le releases di training set </a:t>
             </a:r>
             <a:r>
               <a:rPr lang="en-GB" b="1" dirty="0">
@@ -4927,39 +4943,55 @@
                   <a:schemeClr val="tx1"/>
                 </a:solidFill>
               </a:rPr>
-              <a:t>tengono</a:t>
-            </a:r>
-            <a:r>
-              <a:rPr lang="en-GB" dirty="0">
-                <a:solidFill>
-                  <a:schemeClr val="tx1"/>
-                </a:solidFill>
-              </a:rPr>
-              <a:t> </a:t>
-            </a:r>
-            <a:r>
-              <a:rPr lang="en-GB" dirty="0" err="1">
-                <a:solidFill>
-                  <a:schemeClr val="tx1"/>
-                </a:solidFill>
-              </a:rPr>
-              <a:t>conto</a:t>
-            </a:r>
-            <a:r>
-              <a:rPr lang="en-GB" dirty="0">
-                <a:solidFill>
-                  <a:schemeClr val="tx1"/>
-                </a:solidFill>
-              </a:rPr>
-              <a:t> </a:t>
-            </a:r>
-            <a:r>
-              <a:rPr lang="en-GB" dirty="0" err="1">
-                <a:solidFill>
-                  <a:schemeClr val="tx1"/>
-                </a:solidFill>
-              </a:rPr>
-              <a:t>delle</a:t>
+              <a:t>devono</a:t>
+            </a:r>
+            <a:r>
+              <a:rPr lang="en-GB" dirty="0">
+                <a:solidFill>
+                  <a:schemeClr val="tx1"/>
+                </a:solidFill>
+              </a:rPr>
+              <a:t> </a:t>
+            </a:r>
+            <a:r>
+              <a:rPr lang="en-GB" dirty="0" err="1">
+                <a:solidFill>
+                  <a:schemeClr val="tx1"/>
+                </a:solidFill>
+              </a:rPr>
+              <a:t>essere</a:t>
+            </a:r>
+            <a:r>
+              <a:rPr lang="en-GB" dirty="0">
+                <a:solidFill>
+                  <a:schemeClr val="tx1"/>
+                </a:solidFill>
+              </a:rPr>
+              <a:t> </a:t>
+            </a:r>
+            <a:r>
+              <a:rPr lang="en-GB" dirty="0" err="1">
+                <a:solidFill>
+                  <a:schemeClr val="tx1"/>
+                </a:solidFill>
+              </a:rPr>
+              <a:t>influenzati</a:t>
+            </a:r>
+            <a:r>
+              <a:rPr lang="en-GB" dirty="0">
+                <a:solidFill>
+                  <a:schemeClr val="tx1"/>
+                </a:solidFill>
+              </a:rPr>
+              <a:t> </a:t>
+            </a:r>
+            <a:r>
+              <a:rPr lang="en-GB" dirty="0" err="1">
+                <a:solidFill>
+                  <a:schemeClr val="tx1"/>
+                </a:solidFill>
+              </a:rPr>
+              <a:t>dalle</a:t>
             </a:r>
             <a:r>
               <a:rPr lang="en-GB" dirty="0">
@@ -4991,79 +5023,31 @@
                   <a:schemeClr val="tx1"/>
                 </a:solidFill>
               </a:rPr>
-              <a:t>ottenute</a:t>
-            </a:r>
-            <a:r>
-              <a:rPr lang="en-GB" dirty="0">
-                <a:solidFill>
-                  <a:schemeClr val="tx1"/>
-                </a:solidFill>
-              </a:rPr>
-              <a:t> in </a:t>
-            </a:r>
-            <a:r>
-              <a:rPr lang="en-GB" dirty="0" err="1">
-                <a:solidFill>
-                  <a:schemeClr val="tx1"/>
-                </a:solidFill>
-              </a:rPr>
-              <a:t>futuro</a:t>
-            </a:r>
-            <a:r>
-              <a:rPr lang="en-GB" dirty="0">
-                <a:solidFill>
-                  <a:schemeClr val="tx1"/>
-                </a:solidFill>
-              </a:rPr>
-              <a:t> rispetto </a:t>
-            </a:r>
-            <a:r>
-              <a:rPr lang="en-GB" dirty="0" err="1">
-                <a:solidFill>
-                  <a:schemeClr val="tx1"/>
-                </a:solidFill>
-              </a:rPr>
-              <a:t>alla</a:t>
-            </a:r>
-            <a:r>
-              <a:rPr lang="en-GB" dirty="0">
-                <a:solidFill>
-                  <a:schemeClr val="tx1"/>
-                </a:solidFill>
-              </a:rPr>
-              <a:t> </a:t>
-            </a:r>
-            <a:r>
-              <a:rPr lang="en-GB" dirty="0" err="1">
-                <a:solidFill>
-                  <a:schemeClr val="tx1"/>
-                </a:solidFill>
-              </a:rPr>
-              <a:t>più</a:t>
-            </a:r>
-            <a:r>
-              <a:rPr lang="en-GB" dirty="0">
-                <a:solidFill>
-                  <a:schemeClr val="tx1"/>
-                </a:solidFill>
-              </a:rPr>
-              <a:t> </a:t>
-            </a:r>
-            <a:r>
-              <a:rPr lang="en-GB" dirty="0" err="1">
-                <a:solidFill>
-                  <a:schemeClr val="tx1"/>
-                </a:solidFill>
-              </a:rPr>
-              <a:t>recente</a:t>
-            </a:r>
-            <a:r>
-              <a:rPr lang="en-GB" dirty="0">
-                <a:solidFill>
-                  <a:schemeClr val="tx1"/>
-                </a:solidFill>
-              </a:rPr>
-              <a:t> release di training set: in </a:t>
+              <a:t>ottenibili</a:t>
+            </a:r>
+            <a:r>
+              <a:rPr lang="en-GB" dirty="0">
+                <a:solidFill>
+                  <a:schemeClr val="tx1"/>
+                </a:solidFill>
+              </a:rPr>
+              <a:t> </a:t>
+            </a:r>
+            <a:r>
+              <a:rPr lang="en-GB" dirty="0" err="1">
+                <a:solidFill>
+                  <a:schemeClr val="tx1"/>
+                </a:solidFill>
+              </a:rPr>
+              <a:t>nelle</a:t>
+            </a:r>
+            <a:r>
+              <a:rPr lang="en-GB" dirty="0">
+                <a:solidFill>
+                  <a:schemeClr val="tx1"/>
+                </a:solidFill>
+              </a:rPr>
+              <a:t> releases successive: in </a:t>
             </a:r>
             <a:r>
               <a:rPr lang="en-GB" dirty="0" err="1">
@@ -5349,10 +5333,10 @@
         </p:nvGrpSpPr>
         <p:grpSpPr>
           <a:xfrm>
-            <a:off x="4119748" y="3359894"/>
-            <a:ext cx="3366781" cy="2764085"/>
+            <a:off x="4119749" y="3359894"/>
+            <a:ext cx="3284593" cy="2678984"/>
             <a:chOff x="4181777" y="3251680"/>
-            <a:chExt cx="3366781" cy="2764085"/>
+            <a:chExt cx="3995981" cy="3459101"/>
           </a:xfrm>
         </p:grpSpPr>
         <p:graphicFrame>
@@ -5370,14 +5354,14 @@
             <p:nvPr>
               <p:extLst>
                 <p:ext uri="{D42A27DB-BD31-4B8C-83A1-F6EECF244321}">
-                  <p14:modId xmlns:p14="http://schemas.microsoft.com/office/powerpoint/2010/main" val="696088417"/>
+                  <p14:modId xmlns:p14="http://schemas.microsoft.com/office/powerpoint/2010/main" val="246016778"/>
                 </p:ext>
               </p:extLst>
             </p:nvPr>
           </p:nvGraphicFramePr>
           <p:xfrm>
             <a:off x="4643442" y="3629025"/>
-            <a:ext cx="2905116" cy="2386740"/>
+            <a:ext cx="3534316" cy="3081756"/>
           </p:xfrm>
           <a:graphic>
             <a:graphicData uri="http://schemas.openxmlformats.org/drawingml/2006/table">
@@ -5820,7 +5804,20 @@
                       <a:bodyPr/>
                       <a:lstStyle/>
                       <a:p>
-                        <a:endParaRPr lang="it-IT" dirty="0"/>
+                        <a:pPr algn="ctr"/>
+                        <a:r>
+                          <a:rPr lang="it-IT" sz="2000" b="1" dirty="0">
+                            <a:solidFill>
+                              <a:schemeClr val="tx1"/>
+                            </a:solidFill>
+                          </a:rPr>
+                          <a:t>X</a:t>
+                        </a:r>
+                        <a:endParaRPr lang="it-IT" b="1" dirty="0">
+                          <a:solidFill>
+                            <a:schemeClr val="tx1"/>
+                          </a:solidFill>
+                        </a:endParaRPr>
                       </a:p>
                     </a:txBody>
                     <a:tcPr>
@@ -5860,9 +5857,7 @@
                         <a:headEnd type="none" w="med" len="med"/>
                         <a:tailEnd type="none" w="med" len="med"/>
                       </a:lnB>
-                      <a:solidFill>
-                        <a:srgbClr val="002060"/>
-                      </a:solidFill>
+                      <a:noFill/>
                     </a:tcPr>
                   </a:tc>
                   <a:tc>
@@ -7841,100 +7836,12 @@
               <a:buChar char="•"/>
             </a:pPr>
             <a:r>
-              <a:rPr lang="en-GB" dirty="0">
-                <a:solidFill>
-                  <a:schemeClr val="tx1"/>
-                </a:solidFill>
-              </a:rPr>
-              <a:t>Come </a:t>
-            </a:r>
-            <a:r>
-              <a:rPr lang="en-GB" dirty="0" err="1">
-                <a:solidFill>
-                  <a:schemeClr val="tx1"/>
-                </a:solidFill>
-              </a:rPr>
-              <a:t>accennato</a:t>
-            </a:r>
-            <a:r>
-              <a:rPr lang="en-GB" dirty="0">
-                <a:solidFill>
-                  <a:schemeClr val="tx1"/>
-                </a:solidFill>
-              </a:rPr>
-              <a:t> </a:t>
-            </a:r>
-            <a:r>
-              <a:rPr lang="en-GB" dirty="0" err="1">
-                <a:solidFill>
-                  <a:schemeClr val="tx1"/>
-                </a:solidFill>
-              </a:rPr>
-              <a:t>precedentemente</a:t>
-            </a:r>
-            <a:r>
-              <a:rPr lang="en-GB" dirty="0">
-                <a:solidFill>
-                  <a:schemeClr val="tx1"/>
-                </a:solidFill>
-              </a:rPr>
-              <a:t>, lo studio è </a:t>
-            </a:r>
-            <a:r>
-              <a:rPr lang="en-GB" dirty="0" err="1">
-                <a:solidFill>
-                  <a:schemeClr val="tx1"/>
-                </a:solidFill>
-              </a:rPr>
-              <a:t>stato</a:t>
-            </a:r>
-            <a:r>
-              <a:rPr lang="en-GB" dirty="0">
-                <a:solidFill>
-                  <a:schemeClr val="tx1"/>
-                </a:solidFill>
-              </a:rPr>
-              <a:t> </a:t>
-            </a:r>
-            <a:r>
-              <a:rPr lang="en-GB" dirty="0" err="1">
-                <a:solidFill>
-                  <a:schemeClr val="tx1"/>
-                </a:solidFill>
-              </a:rPr>
-              <a:t>effettuato</a:t>
-            </a:r>
-            <a:r>
-              <a:rPr lang="en-GB" dirty="0">
-                <a:solidFill>
-                  <a:schemeClr val="tx1"/>
-                </a:solidFill>
-              </a:rPr>
-              <a:t> </a:t>
-            </a:r>
-            <a:r>
-              <a:rPr lang="en-GB" dirty="0" err="1">
-                <a:solidFill>
-                  <a:schemeClr val="tx1"/>
-                </a:solidFill>
-              </a:rPr>
-              <a:t>prendendo</a:t>
-            </a:r>
-            <a:r>
-              <a:rPr lang="en-GB" dirty="0">
-                <a:solidFill>
-                  <a:schemeClr val="tx1"/>
-                </a:solidFill>
-              </a:rPr>
-              <a:t> in </a:t>
-            </a:r>
-            <a:r>
-              <a:rPr lang="en-GB" dirty="0" err="1">
-                <a:solidFill>
-                  <a:schemeClr val="tx1"/>
-                </a:solidFill>
-              </a:rPr>
-              <a:t>esame</a:t>
+              <a:rPr lang="en-GB" dirty="0" err="1">
+                <a:solidFill>
+                  <a:schemeClr val="tx1"/>
+                </a:solidFill>
+              </a:rPr>
+              <a:t>Ottenuti</a:t>
             </a:r>
             <a:r>
               <a:rPr lang="en-GB" dirty="0">
@@ -7958,6 +7865,70 @@
                   <a:schemeClr val="tx1"/>
                 </a:solidFill>
               </a:rPr>
+              <a:t> dataset e </a:t>
+            </a:r>
+            <a:r>
+              <a:rPr lang="en-GB" dirty="0" err="1">
+                <a:solidFill>
+                  <a:schemeClr val="tx1"/>
+                </a:solidFill>
+              </a:rPr>
+              <a:t>stabilita</a:t>
+            </a:r>
+            <a:r>
+              <a:rPr lang="en-GB" dirty="0">
+                <a:solidFill>
+                  <a:schemeClr val="tx1"/>
+                </a:solidFill>
+              </a:rPr>
+              <a:t> la </a:t>
+            </a:r>
+            <a:r>
+              <a:rPr lang="en-GB" dirty="0" err="1">
+                <a:solidFill>
+                  <a:schemeClr val="tx1"/>
+                </a:solidFill>
+              </a:rPr>
+              <a:t>tecnica</a:t>
+            </a:r>
+            <a:r>
+              <a:rPr lang="en-GB" dirty="0">
+                <a:solidFill>
+                  <a:schemeClr val="tx1"/>
+                </a:solidFill>
+              </a:rPr>
+              <a:t> di </a:t>
+            </a:r>
+            <a:r>
+              <a:rPr lang="en-GB" dirty="0" err="1">
+                <a:solidFill>
+                  <a:schemeClr val="tx1"/>
+                </a:solidFill>
+              </a:rPr>
+              <a:t>valutazione</a:t>
+            </a:r>
+            <a:r>
+              <a:rPr lang="en-GB" dirty="0">
+                <a:solidFill>
+                  <a:schemeClr val="tx1"/>
+                </a:solidFill>
+              </a:rPr>
+              <a:t> per </a:t>
+            </a:r>
+            <a:r>
+              <a:rPr lang="en-GB" dirty="0" err="1">
+                <a:solidFill>
+                  <a:schemeClr val="tx1"/>
+                </a:solidFill>
+              </a:rPr>
+              <a:t>i</a:t>
+            </a:r>
+            <a:r>
+              <a:rPr lang="en-GB" dirty="0">
+                <a:solidFill>
+                  <a:schemeClr val="tx1"/>
+                </a:solidFill>
+              </a:rPr>
               <a:t> </a:t>
             </a:r>
             <a:r>
@@ -7998,7 +7969,63 @@
                   <a:schemeClr val="tx1"/>
                 </a:solidFill>
               </a:rPr>
-              <a:t>IBK</a:t>
+              <a:t>IBK, </a:t>
+            </a:r>
+            <a:r>
+              <a:rPr lang="en-GB" dirty="0" err="1">
+                <a:solidFill>
+                  <a:schemeClr val="tx1"/>
+                </a:solidFill>
+              </a:rPr>
+              <a:t>si</a:t>
+            </a:r>
+            <a:r>
+              <a:rPr lang="en-GB" dirty="0">
+                <a:solidFill>
+                  <a:schemeClr val="tx1"/>
+                </a:solidFill>
+              </a:rPr>
+              <a:t> è </a:t>
+            </a:r>
+            <a:r>
+              <a:rPr lang="en-GB" dirty="0" err="1">
+                <a:solidFill>
+                  <a:schemeClr val="tx1"/>
+                </a:solidFill>
+              </a:rPr>
+              <a:t>proceduto</a:t>
+            </a:r>
+            <a:r>
+              <a:rPr lang="en-GB" dirty="0">
+                <a:solidFill>
+                  <a:schemeClr val="tx1"/>
+                </a:solidFill>
+              </a:rPr>
+              <a:t> con la </a:t>
+            </a:r>
+            <a:r>
+              <a:rPr lang="en-GB" dirty="0" err="1">
+                <a:solidFill>
+                  <a:schemeClr val="tx1"/>
+                </a:solidFill>
+              </a:rPr>
+              <a:t>loro</a:t>
+            </a:r>
+            <a:r>
+              <a:rPr lang="en-GB" dirty="0">
+                <a:solidFill>
+                  <a:schemeClr val="tx1"/>
+                </a:solidFill>
+              </a:rPr>
+              <a:t> </a:t>
+            </a:r>
+            <a:r>
+              <a:rPr lang="en-GB" dirty="0" err="1">
+                <a:solidFill>
+                  <a:schemeClr val="tx1"/>
+                </a:solidFill>
+              </a:rPr>
+              <a:t>valutazione</a:t>
             </a:r>
             <a:r>
               <a:rPr lang="en-GB" dirty="0">
@@ -8191,23 +8218,39 @@
                   <a:schemeClr val="tx1"/>
                 </a:solidFill>
               </a:rPr>
-              <a:t> di feature selection e sampling e </a:t>
-            </a:r>
-            <a:r>
-              <a:rPr lang="en-GB" dirty="0" err="1">
-                <a:solidFill>
-                  <a:schemeClr val="tx1"/>
-                </a:solidFill>
-              </a:rPr>
-              <a:t>considerando</a:t>
-            </a:r>
-            <a:r>
-              <a:rPr lang="en-GB" dirty="0">
-                <a:solidFill>
-                  <a:schemeClr val="tx1"/>
-                </a:solidFill>
-              </a:rPr>
-              <a:t> le </a:t>
+              <a:t> di feature selection e sampling, </a:t>
+            </a:r>
+            <a:r>
+              <a:rPr lang="en-GB" dirty="0" err="1">
+                <a:solidFill>
+                  <a:schemeClr val="tx1"/>
+                </a:solidFill>
+              </a:rPr>
+              <a:t>mentre</a:t>
+            </a:r>
+            <a:r>
+              <a:rPr lang="en-GB" dirty="0">
+                <a:solidFill>
+                  <a:schemeClr val="tx1"/>
+                </a:solidFill>
+              </a:rPr>
+              <a:t> </a:t>
+            </a:r>
+            <a:r>
+              <a:rPr lang="en-GB" dirty="0" err="1">
+                <a:solidFill>
+                  <a:schemeClr val="tx1"/>
+                </a:solidFill>
+              </a:rPr>
+              <a:t>sono</a:t>
+            </a:r>
+            <a:r>
+              <a:rPr lang="en-GB" dirty="0">
+                <a:solidFill>
+                  <a:schemeClr val="tx1"/>
+                </a:solidFill>
+              </a:rPr>
+              <a:t> state considerate le </a:t>
             </a:r>
             <a:r>
               <a:rPr lang="en-GB" b="1" dirty="0">
@@ -8355,28 +8398,36 @@
               <a:t> greedy </a:t>
             </a:r>
             <a:r>
+              <a:rPr lang="en-GB" b="1" i="1" dirty="0">
+                <a:solidFill>
+                  <a:schemeClr val="tx1"/>
+                </a:solidFill>
+              </a:rPr>
+              <a:t>Backward Search</a:t>
+            </a:r>
+            <a:r>
               <a:rPr lang="en-GB" i="1" dirty="0">
                 <a:solidFill>
                   <a:schemeClr val="tx1"/>
                 </a:solidFill>
               </a:rPr>
-              <a:t>Backward Search,</a:t>
-            </a:r>
-            <a:r>
-              <a:rPr lang="en-GB" dirty="0">
-                <a:solidFill>
-                  <a:schemeClr val="tx1"/>
-                </a:solidFill>
-              </a:rPr>
-              <a:t> in </a:t>
-            </a:r>
-            <a:r>
-              <a:rPr lang="en-GB" dirty="0" err="1">
-                <a:solidFill>
-                  <a:schemeClr val="tx1"/>
-                </a:solidFill>
-              </a:rPr>
-              <a:t>quanto</a:t>
+              <a:t>,</a:t>
+            </a:r>
+            <a:r>
+              <a:rPr lang="en-GB" dirty="0">
+                <a:solidFill>
+                  <a:schemeClr val="tx1"/>
+                </a:solidFill>
+              </a:rPr>
+              <a:t> </a:t>
+            </a:r>
+            <a:r>
+              <a:rPr lang="en-GB" dirty="0" err="1">
+                <a:solidFill>
+                  <a:schemeClr val="tx1"/>
+                </a:solidFill>
+              </a:rPr>
+              <a:t>poiché</a:t>
             </a:r>
             <a:r>
               <a:rPr lang="en-GB" dirty="0">
@@ -8456,7 +8507,7 @@
                   <a:schemeClr val="tx1"/>
                 </a:solidFill>
               </a:rPr>
-              <a:t>troppo</a:t>
+              <a:t>così</a:t>
             </a:r>
             <a:r>
               <a:rPr lang="en-GB" dirty="0">
@@ -8560,55 +8611,63 @@
                   <a:schemeClr val="tx1"/>
                 </a:solidFill>
               </a:rPr>
-              <a:t> e </a:t>
-            </a:r>
-            <a:r>
-              <a:rPr lang="en-GB" dirty="0" err="1">
-                <a:solidFill>
-                  <a:schemeClr val="tx1"/>
-                </a:solidFill>
-              </a:rPr>
-              <a:t>perché</a:t>
-            </a:r>
-            <a:r>
-              <a:rPr lang="en-GB" dirty="0">
-                <a:solidFill>
-                  <a:schemeClr val="tx1"/>
-                </a:solidFill>
-              </a:rPr>
-              <a:t> </a:t>
-            </a:r>
-            <a:r>
-              <a:rPr lang="en-GB" dirty="0" err="1">
-                <a:solidFill>
-                  <a:schemeClr val="tx1"/>
-                </a:solidFill>
-              </a:rPr>
-              <a:t>si</a:t>
-            </a:r>
-            <a:r>
-              <a:rPr lang="en-GB" dirty="0">
-                <a:solidFill>
-                  <a:schemeClr val="tx1"/>
-                </a:solidFill>
-              </a:rPr>
-              <a:t> </a:t>
-            </a:r>
-            <a:r>
-              <a:rPr lang="en-GB" dirty="0" err="1">
-                <a:solidFill>
-                  <a:schemeClr val="tx1"/>
-                </a:solidFill>
-              </a:rPr>
-              <a:t>volevano</a:t>
-            </a:r>
-            <a:r>
-              <a:rPr lang="en-GB" dirty="0">
-                <a:solidFill>
-                  <a:schemeClr val="tx1"/>
-                </a:solidFill>
-              </a:rPr>
-              <a:t> </a:t>
+              <a:t> rispetto a </a:t>
+            </a:r>
+            <a:r>
+              <a:rPr lang="en-GB" i="1" dirty="0">
+                <a:solidFill>
+                  <a:schemeClr val="tx1"/>
+                </a:solidFill>
+              </a:rPr>
+              <a:t>Forward Search. </a:t>
+            </a:r>
+            <a:r>
+              <a:rPr lang="en-GB" dirty="0" err="1">
+                <a:solidFill>
+                  <a:schemeClr val="tx1"/>
+                </a:solidFill>
+              </a:rPr>
+              <a:t>Inoltre</a:t>
+            </a:r>
+            <a:r>
+              <a:rPr lang="en-GB" dirty="0">
+                <a:solidFill>
+                  <a:schemeClr val="tx1"/>
+                </a:solidFill>
+              </a:rPr>
+              <a:t>, </a:t>
+            </a:r>
+            <a:r>
+              <a:rPr lang="en-GB" dirty="0" err="1">
+                <a:solidFill>
+                  <a:schemeClr val="tx1"/>
+                </a:solidFill>
+              </a:rPr>
+              <a:t>l’obiettivo</a:t>
+            </a:r>
+            <a:r>
+              <a:rPr lang="en-GB" dirty="0">
+                <a:solidFill>
+                  <a:schemeClr val="tx1"/>
+                </a:solidFill>
+              </a:rPr>
+              <a:t> era </a:t>
+            </a:r>
+            <a:r>
+              <a:rPr lang="en-GB" dirty="0" err="1">
+                <a:solidFill>
+                  <a:schemeClr val="tx1"/>
+                </a:solidFill>
+              </a:rPr>
+              <a:t>quello</a:t>
+            </a:r>
+            <a:r>
+              <a:rPr lang="en-GB" dirty="0">
+                <a:solidFill>
+                  <a:schemeClr val="tx1"/>
+                </a:solidFill>
+              </a:rPr>
+              <a:t> di </a:t>
             </a:r>
             <a:r>
               <a:rPr lang="en-GB" dirty="0" err="1">
@@ -8624,7 +8683,7 @@
                   <a:schemeClr val="tx1"/>
                 </a:solidFill>
               </a:rPr>
-              <a:t> le </a:t>
+              <a:t> </a:t>
             </a:r>
             <a:r>
               <a:rPr lang="en-GB" dirty="0" err="1">
@@ -8640,55 +8699,135 @@
                   <a:schemeClr val="tx1"/>
                 </a:solidFill>
               </a:rPr>
-              <a:t> con </a:t>
-            </a:r>
-            <a:r>
-              <a:rPr lang="en-GB" dirty="0" err="1">
-                <a:solidFill>
-                  <a:schemeClr val="tx1"/>
-                </a:solidFill>
-              </a:rPr>
-              <a:t>informazioni</a:t>
-            </a:r>
-            <a:r>
-              <a:rPr lang="en-GB" dirty="0">
-                <a:solidFill>
-                  <a:schemeClr val="tx1"/>
-                </a:solidFill>
-              </a:rPr>
-              <a:t> </a:t>
-            </a:r>
-            <a:r>
-              <a:rPr lang="en-GB" dirty="0" err="1">
-                <a:solidFill>
-                  <a:schemeClr val="tx1"/>
-                </a:solidFill>
-              </a:rPr>
-              <a:t>ritenute</a:t>
-            </a:r>
-            <a:r>
-              <a:rPr lang="en-GB" dirty="0">
-                <a:solidFill>
-                  <a:schemeClr val="tx1"/>
-                </a:solidFill>
-              </a:rPr>
-              <a:t> </a:t>
-            </a:r>
-            <a:r>
-              <a:rPr lang="en-GB" dirty="0" err="1">
-                <a:solidFill>
-                  <a:schemeClr val="tx1"/>
-                </a:solidFill>
-              </a:rPr>
-              <a:t>ridondanti</a:t>
-            </a:r>
-            <a:r>
-              <a:rPr lang="en-GB" dirty="0">
-                <a:solidFill>
-                  <a:schemeClr val="tx1"/>
-                </a:solidFill>
-              </a:rPr>
-              <a:t>.</a:t>
+              <a:t> </a:t>
+            </a:r>
+            <a:r>
+              <a:rPr lang="en-GB" dirty="0" err="1">
+                <a:solidFill>
+                  <a:schemeClr val="tx1"/>
+                </a:solidFill>
+              </a:rPr>
+              <a:t>superflue</a:t>
+            </a:r>
+            <a:r>
+              <a:rPr lang="en-GB" dirty="0">
+                <a:solidFill>
+                  <a:schemeClr val="tx1"/>
+                </a:solidFill>
+              </a:rPr>
+              <a:t>, </a:t>
+            </a:r>
+            <a:r>
+              <a:rPr lang="en-GB" dirty="0" err="1">
+                <a:solidFill>
+                  <a:schemeClr val="tx1"/>
+                </a:solidFill>
+              </a:rPr>
+              <a:t>piuttosto</a:t>
+            </a:r>
+            <a:r>
+              <a:rPr lang="en-GB" dirty="0">
+                <a:solidFill>
+                  <a:schemeClr val="tx1"/>
+                </a:solidFill>
+              </a:rPr>
+              <a:t> </a:t>
+            </a:r>
+            <a:r>
+              <a:rPr lang="en-GB" dirty="0" err="1">
+                <a:solidFill>
+                  <a:schemeClr val="tx1"/>
+                </a:solidFill>
+              </a:rPr>
+              <a:t>che</a:t>
+            </a:r>
+            <a:r>
+              <a:rPr lang="en-GB" dirty="0">
+                <a:solidFill>
+                  <a:schemeClr val="tx1"/>
+                </a:solidFill>
+              </a:rPr>
+              <a:t> </a:t>
+            </a:r>
+            <a:r>
+              <a:rPr lang="en-GB" dirty="0" err="1">
+                <a:solidFill>
+                  <a:schemeClr val="tx1"/>
+                </a:solidFill>
+              </a:rPr>
+              <a:t>restringere</a:t>
+            </a:r>
+            <a:r>
+              <a:rPr lang="en-GB" dirty="0">
+                <a:solidFill>
+                  <a:schemeClr val="tx1"/>
+                </a:solidFill>
+              </a:rPr>
+              <a:t> il </a:t>
+            </a:r>
+            <a:r>
+              <a:rPr lang="en-GB" dirty="0" err="1">
+                <a:solidFill>
+                  <a:schemeClr val="tx1"/>
+                </a:solidFill>
+              </a:rPr>
+              <a:t>più</a:t>
+            </a:r>
+            <a:r>
+              <a:rPr lang="en-GB" dirty="0">
+                <a:solidFill>
+                  <a:schemeClr val="tx1"/>
+                </a:solidFill>
+              </a:rPr>
+              <a:t> </a:t>
+            </a:r>
+            <a:r>
+              <a:rPr lang="en-GB" dirty="0" err="1">
+                <a:solidFill>
+                  <a:schemeClr val="tx1"/>
+                </a:solidFill>
+              </a:rPr>
+              <a:t>possibile</a:t>
+            </a:r>
+            <a:r>
+              <a:rPr lang="en-GB" dirty="0">
+                <a:solidFill>
+                  <a:schemeClr val="tx1"/>
+                </a:solidFill>
+              </a:rPr>
+              <a:t> il pool </a:t>
+            </a:r>
+            <a:r>
+              <a:rPr lang="en-GB" dirty="0" err="1">
+                <a:solidFill>
+                  <a:schemeClr val="tx1"/>
+                </a:solidFill>
+              </a:rPr>
+              <a:t>delle</a:t>
+            </a:r>
+            <a:r>
+              <a:rPr lang="en-GB" dirty="0">
+                <a:solidFill>
+                  <a:schemeClr val="tx1"/>
+                </a:solidFill>
+              </a:rPr>
+              <a:t> </a:t>
+            </a:r>
+            <a:r>
+              <a:rPr lang="en-GB" dirty="0" err="1">
+                <a:solidFill>
+                  <a:schemeClr val="tx1"/>
+                </a:solidFill>
+              </a:rPr>
+              <a:t>metriche</a:t>
+            </a:r>
+            <a:r>
+              <a:rPr lang="en-GB" dirty="0">
+                <a:solidFill>
+                  <a:schemeClr val="tx1"/>
+                </a:solidFill>
+              </a:rPr>
+              <a:t> considerate.</a:t>
             </a:r>
           </a:p>
           <a:p>
@@ -8737,7 +8876,7 @@
                   <a:schemeClr val="tx1"/>
                 </a:solidFill>
               </a:rPr>
-              <a:t> le </a:t>
+              <a:t>, le </a:t>
             </a:r>
             <a:r>
               <a:rPr lang="en-GB" dirty="0" err="1">
@@ -8849,7 +8988,23 @@
                   <a:schemeClr val="tx1"/>
                 </a:solidFill>
               </a:rPr>
-              <a:t> per Syncope </a:t>
+              <a:t>, per Syncope, </a:t>
+            </a:r>
+            <a:r>
+              <a:rPr lang="en-GB" dirty="0" err="1">
+                <a:solidFill>
+                  <a:schemeClr val="tx1"/>
+                </a:solidFill>
+              </a:rPr>
+              <a:t>esse</a:t>
+            </a:r>
+            <a:r>
+              <a:rPr lang="en-GB" dirty="0">
+                <a:solidFill>
+                  <a:schemeClr val="tx1"/>
+                </a:solidFill>
+              </a:rPr>
+              <a:t> </a:t>
             </a:r>
             <a:r>
               <a:rPr lang="en-GB" dirty="0" err="1">
@@ -8865,7 +9020,23 @@
                   <a:schemeClr val="tx1"/>
                 </a:solidFill>
               </a:rPr>
-              <a:t> al 16.03%. Si è </a:t>
+              <a:t> al 16.03% del </a:t>
+            </a:r>
+            <a:r>
+              <a:rPr lang="en-GB" dirty="0" err="1">
+                <a:solidFill>
+                  <a:schemeClr val="tx1"/>
+                </a:solidFill>
+              </a:rPr>
+              <a:t>totale</a:t>
+            </a:r>
+            <a:r>
+              <a:rPr lang="en-GB" dirty="0">
+                <a:solidFill>
+                  <a:schemeClr val="tx1"/>
+                </a:solidFill>
+              </a:rPr>
+              <a:t>. Si è </a:t>
             </a:r>
             <a:r>
               <a:rPr lang="en-GB" dirty="0" err="1">
@@ -8900,7 +9071,7 @@
               <a:t> </a:t>
             </a:r>
             <a:r>
-              <a:rPr lang="en-GB" i="1" dirty="0" err="1">
+              <a:rPr lang="en-GB" b="1" i="1" dirty="0" err="1">
                 <a:solidFill>
                   <a:schemeClr val="tx1"/>
                 </a:solidFill>
@@ -9295,23 +9466,7 @@
                       <a:schemeClr val="tx1"/>
                     </a:solidFill>
                   </a:rPr>
-                  <a:t>, il </a:t>
-                </a:r>
-                <a:r>
-                  <a:rPr lang="en-GB" dirty="0" err="1">
-                    <a:solidFill>
-                      <a:schemeClr val="tx1"/>
-                    </a:solidFill>
-                  </a:rPr>
-                  <a:t>costo</a:t>
-                </a:r>
-                <a:r>
-                  <a:rPr lang="en-GB" dirty="0">
-                    <a:solidFill>
-                      <a:schemeClr val="tx1"/>
-                    </a:solidFill>
-                  </a:rPr>
-                  <a:t> di </a:t>
+                  <a:t>, </a:t>
                 </a:r>
                 <a:r>
                   <a:rPr lang="en-GB" dirty="0" err="1">
@@ -9343,7 +9498,7 @@
                       <a:schemeClr val="tx1"/>
                     </a:solidFill>
                   </a:rPr>
-                  <a:t> errata è sempre lo </a:t>
+                  <a:t> errata ha sempre lo </a:t>
                 </a:r>
                 <a:r>
                   <a:rPr lang="en-GB" dirty="0" err="1">
@@ -9359,7 +9514,7 @@
                       <a:schemeClr val="tx1"/>
                     </a:solidFill>
                   </a:rPr>
-                  <a:t>, a </a:t>
+                  <a:t> peso, a </a:t>
                 </a:r>
                 <a:r>
                   <a:rPr lang="en-GB" dirty="0" err="1">
@@ -9688,6 +9843,54 @@
                       <a:schemeClr val="tx1"/>
                     </a:solidFill>
                   </a:rPr>
+                  <a:t>; tale </a:t>
+                </a:r>
+                <a:r>
+                  <a:rPr lang="en-GB" dirty="0" err="1">
+                    <a:solidFill>
+                      <a:schemeClr val="tx1"/>
+                    </a:solidFill>
+                  </a:rPr>
+                  <a:t>valore</a:t>
+                </a:r>
+                <a:r>
+                  <a:rPr lang="en-GB" dirty="0">
+                    <a:solidFill>
+                      <a:schemeClr val="tx1"/>
+                    </a:solidFill>
+                  </a:rPr>
+                  <a:t> </a:t>
+                </a:r>
+                <a:r>
+                  <a:rPr lang="en-GB" dirty="0" err="1">
+                    <a:solidFill>
+                      <a:schemeClr val="tx1"/>
+                    </a:solidFill>
+                  </a:rPr>
+                  <a:t>viene</a:t>
+                </a:r>
+                <a:r>
+                  <a:rPr lang="en-GB" dirty="0">
+                    <a:solidFill>
+                      <a:schemeClr val="tx1"/>
+                    </a:solidFill>
+                  </a:rPr>
+                  <a:t> </a:t>
+                </a:r>
+                <a:r>
+                  <a:rPr lang="en-GB" dirty="0" err="1">
+                    <a:solidFill>
+                      <a:schemeClr val="tx1"/>
+                    </a:solidFill>
+                  </a:rPr>
+                  <a:t>usato</a:t>
+                </a:r>
+                <a:r>
+                  <a:rPr lang="en-GB" dirty="0">
+                    <a:solidFill>
+                      <a:schemeClr val="tx1"/>
+                    </a:solidFill>
+                  </a:rPr>
                   <a:t> per </a:t>
                 </a:r>
                 <a:r>
@@ -9704,7 +9907,7 @@
                       <a:schemeClr val="tx1"/>
                     </a:solidFill>
                   </a:rPr>
-                  <a:t> il </a:t>
+                  <a:t> quale </a:t>
                 </a:r>
                 <a:r>
                   <a:rPr lang="en-GB" dirty="0" err="1">
@@ -9712,7 +9915,7 @@
                       <a:schemeClr val="tx1"/>
                     </a:solidFill>
                   </a:rPr>
-                  <a:t>valore</a:t>
+                  <a:t>dei</a:t>
                 </a:r>
                 <a:r>
                   <a:rPr lang="en-GB" dirty="0">
@@ -9720,7 +9923,23 @@
                       <a:schemeClr val="tx1"/>
                     </a:solidFill>
                   </a:rPr>
-                  <a:t> da </a:t>
+                  <a:t> due </a:t>
+                </a:r>
+                <a:r>
+                  <a:rPr lang="en-GB" dirty="0" err="1">
+                    <a:solidFill>
+                      <a:schemeClr val="tx1"/>
+                    </a:solidFill>
+                  </a:rPr>
+                  <a:t>esiti</a:t>
+                </a:r>
+                <a:r>
+                  <a:rPr lang="en-GB" dirty="0">
+                    <a:solidFill>
+                      <a:schemeClr val="tx1"/>
+                    </a:solidFill>
+                  </a:rPr>
+                  <a:t> </a:t>
                 </a:r>
                 <a:r>
                   <a:rPr lang="en-GB" dirty="0" err="1">
@@ -9736,7 +9955,7 @@
                       <a:schemeClr val="tx1"/>
                     </a:solidFill>
                   </a:rPr>
-                  <a:t>.</a:t>
+                  <a:t> (buggy / non buggy).</a:t>
                 </a:r>
               </a:p>
               <a:p>
@@ -9875,16 +10094,26 @@
                   </a:rPr>
                   <a:t> (</a:t>
                 </a:r>
-                <a:r>
-                  <a:rPr lang="en-GB" b="1" dirty="0">
-                    <a:solidFill>
-                      <a:schemeClr val="tx1"/>
-                    </a:solidFill>
-                  </a:rPr>
-                  <a:t>CFN = </a:t>
-                </a:r>
                 <a14:m>
                   <m:oMath xmlns:m="http://schemas.openxmlformats.org/officeDocument/2006/math">
+                    <m:r>
+                      <a:rPr lang="it-IT" b="1" i="0" dirty="0" smtClean="0">
+                        <a:solidFill>
+                          <a:schemeClr val="tx1"/>
+                        </a:solidFill>
+                        <a:latin typeface="Cambria Math" panose="02040503050406030204" pitchFamily="18" charset="0"/>
+                      </a:rPr>
+                      <m:t>𝐂𝐅𝐍</m:t>
+                    </m:r>
+                    <m:r>
+                      <a:rPr lang="it-IT" b="1" i="0" dirty="0" smtClean="0">
+                        <a:solidFill>
+                          <a:schemeClr val="tx1"/>
+                        </a:solidFill>
+                        <a:latin typeface="Cambria Math" panose="02040503050406030204" pitchFamily="18" charset="0"/>
+                      </a:rPr>
+                      <m:t>=</m:t>
+                    </m:r>
                     <m:r>
                       <a:rPr lang="en-GB" b="1" i="1" dirty="0" smtClean="0">
                         <a:solidFill>
@@ -10112,7 +10341,23 @@
                       <a:schemeClr val="tx1"/>
                     </a:solidFill>
                   </a:rPr>
-                  <a:t> considerate con il peso </a:t>
+                  <a:t> del dataset </a:t>
+                </a:r>
+                <a:r>
+                  <a:rPr lang="en-GB" dirty="0" err="1">
+                    <a:solidFill>
+                      <a:schemeClr val="tx1"/>
+                    </a:solidFill>
+                  </a:rPr>
+                  <a:t>riconsiderate</a:t>
+                </a:r>
+                <a:r>
+                  <a:rPr lang="en-GB" dirty="0">
+                    <a:solidFill>
+                      <a:schemeClr val="tx1"/>
+                    </a:solidFill>
+                  </a:rPr>
+                  <a:t> con il peso </a:t>
                 </a:r>
                 <a:r>
                   <a:rPr lang="en-GB" dirty="0" err="1">
@@ -10325,7 +10570,7 @@
               <a:blipFill>
                 <a:blip r:embed="rId2"/>
                 <a:stretch>
-                  <a:fillRect t="-1828" r="-1338" b="-914"/>
+                  <a:fillRect t="-1828" b="-914"/>
                 </a:stretch>
               </a:blipFill>
             </p:spPr>
@@ -11415,7 +11660,7 @@
               <a:buChar char="•"/>
             </a:pPr>
             <a:r>
-              <a:rPr lang="en-GB" i="1" dirty="0">
+              <a:rPr lang="en-GB" sz="1600" i="1" dirty="0">
                 <a:solidFill>
                   <a:schemeClr val="tx1"/>
                 </a:solidFill>
@@ -11429,7 +11674,7 @@
               <a:buChar char="•"/>
             </a:pPr>
             <a:r>
-              <a:rPr lang="en-GB" i="1" dirty="0">
+              <a:rPr lang="en-GB" sz="1600" i="1" dirty="0">
                 <a:solidFill>
                   <a:schemeClr val="tx1"/>
                 </a:solidFill>
@@ -11443,7 +11688,7 @@
               <a:buChar char="•"/>
             </a:pPr>
             <a:r>
-              <a:rPr lang="en-GB" i="1" dirty="0">
+              <a:rPr lang="en-GB" sz="1600" i="1" dirty="0">
                 <a:solidFill>
                   <a:schemeClr val="tx1"/>
                 </a:solidFill>
@@ -11457,7 +11702,7 @@
               <a:buChar char="•"/>
             </a:pPr>
             <a:r>
-              <a:rPr lang="en-GB" i="1" dirty="0">
+              <a:rPr lang="en-GB" sz="1600" i="1" dirty="0">
                 <a:solidFill>
                   <a:schemeClr val="tx1"/>
                 </a:solidFill>
@@ -12251,12 +12496,12 @@
               <a:buChar char="•"/>
             </a:pPr>
             <a:r>
-              <a:rPr lang="en-GB" b="1" dirty="0" err="1">
-                <a:solidFill>
-                  <a:schemeClr val="tx1"/>
-                </a:solidFill>
-              </a:rPr>
-              <a:t>Premessa</a:t>
+              <a:rPr lang="en-GB" b="1" dirty="0">
+                <a:solidFill>
+                  <a:schemeClr val="tx1"/>
+                </a:solidFill>
+              </a:rPr>
+              <a:t>PREMESSA</a:t>
             </a:r>
             <a:r>
               <a:rPr lang="en-GB" dirty="0">
@@ -12296,7 +12541,7 @@
                   <a:schemeClr val="tx1"/>
                 </a:solidFill>
               </a:rPr>
-              <a:t> il </a:t>
+              <a:t>, il </a:t>
             </a:r>
             <a:r>
               <a:rPr lang="en-GB" dirty="0" err="1">
@@ -12328,39 +12573,39 @@
                   <a:schemeClr val="tx1"/>
                 </a:solidFill>
               </a:rPr>
-              <a:t> con Walk Forward ha </a:t>
-            </a:r>
-            <a:r>
-              <a:rPr lang="en-GB" dirty="0" err="1">
-                <a:solidFill>
-                  <a:schemeClr val="tx1"/>
-                </a:solidFill>
-              </a:rPr>
-              <a:t>eseguito</a:t>
-            </a:r>
-            <a:r>
-              <a:rPr lang="en-GB" dirty="0">
-                <a:solidFill>
-                  <a:schemeClr val="tx1"/>
-                </a:solidFill>
-              </a:rPr>
-              <a:t> </a:t>
-            </a:r>
-            <a:r>
-              <a:rPr lang="en-GB" dirty="0" err="1">
-                <a:solidFill>
-                  <a:schemeClr val="tx1"/>
-                </a:solidFill>
-              </a:rPr>
-              <a:t>soltanto</a:t>
-            </a:r>
-            <a:r>
-              <a:rPr lang="en-GB" dirty="0">
-                <a:solidFill>
-                  <a:schemeClr val="tx1"/>
-                </a:solidFill>
-              </a:rPr>
-              <a:t> 5 run. Di </a:t>
+              <a:t> con Walk Forward è </a:t>
+            </a:r>
+            <a:r>
+              <a:rPr lang="en-GB" dirty="0" err="1">
+                <a:solidFill>
+                  <a:schemeClr val="tx1"/>
+                </a:solidFill>
+              </a:rPr>
+              <a:t>risultato</a:t>
+            </a:r>
+            <a:r>
+              <a:rPr lang="en-GB" dirty="0">
+                <a:solidFill>
+                  <a:schemeClr val="tx1"/>
+                </a:solidFill>
+              </a:rPr>
+              <a:t> </a:t>
+            </a:r>
+            <a:r>
+              <a:rPr lang="en-GB" dirty="0" err="1">
+                <a:solidFill>
+                  <a:schemeClr val="tx1"/>
+                </a:solidFill>
+              </a:rPr>
+              <a:t>nell’esecuzione</a:t>
+            </a:r>
+            <a:r>
+              <a:rPr lang="en-GB" dirty="0">
+                <a:solidFill>
+                  <a:schemeClr val="tx1"/>
+                </a:solidFill>
+              </a:rPr>
+              <a:t> di sole 5 run. Di </a:t>
             </a:r>
             <a:r>
               <a:rPr lang="en-GB" dirty="0" err="1">
@@ -12481,6 +12726,46 @@
                 </a:solidFill>
               </a:rPr>
               <a:t>limitate</a:t>
+            </a:r>
+            <a:r>
+              <a:rPr lang="en-GB" dirty="0">
+                <a:solidFill>
+                  <a:schemeClr val="tx1"/>
+                </a:solidFill>
+              </a:rPr>
+              <a:t>, </a:t>
+            </a:r>
+            <a:r>
+              <a:rPr lang="en-GB" dirty="0" err="1">
+                <a:solidFill>
+                  <a:schemeClr val="tx1"/>
+                </a:solidFill>
+              </a:rPr>
+              <a:t>composto</a:t>
+            </a:r>
+            <a:r>
+              <a:rPr lang="en-GB" dirty="0">
+                <a:solidFill>
+                  <a:schemeClr val="tx1"/>
+                </a:solidFill>
+              </a:rPr>
+              <a:t> da </a:t>
+            </a:r>
+            <a:r>
+              <a:rPr lang="en-GB" dirty="0" err="1">
+                <a:solidFill>
+                  <a:schemeClr val="tx1"/>
+                </a:solidFill>
+              </a:rPr>
+              <a:t>pochi</a:t>
+            </a:r>
+            <a:r>
+              <a:rPr lang="en-GB">
+                <a:solidFill>
+                  <a:schemeClr val="tx1"/>
+                </a:solidFill>
+              </a:rPr>
+              <a:t> sample points</a:t>
             </a:r>
             <a:r>
               <a:rPr lang="en-GB" dirty="0">
@@ -14394,7 +14679,7 @@
               <a:buChar char="•"/>
             </a:pPr>
             <a:r>
-              <a:rPr lang="en-GB" err="1">
+              <a:rPr lang="en-GB" dirty="0" err="1">
                 <a:solidFill>
                   <a:schemeClr val="tx1"/>
                 </a:solidFill>
@@ -14402,7 +14687,7 @@
               <a:t>Introduzione</a:t>
             </a:r>
             <a:r>
-              <a:rPr lang="en-GB">
+              <a:rPr lang="en-GB" dirty="0">
                 <a:solidFill>
                   <a:schemeClr val="tx1"/>
                 </a:solidFill>
@@ -14410,14 +14695,14 @@
               <a:t> ed </a:t>
             </a:r>
             <a:r>
-              <a:rPr lang="en-GB" err="1">
+              <a:rPr lang="en-GB" dirty="0" err="1">
                 <a:solidFill>
                   <a:schemeClr val="tx1"/>
                 </a:solidFill>
               </a:rPr>
               <a:t>obiettivi</a:t>
             </a:r>
-            <a:endParaRPr lang="en-GB">
+            <a:endParaRPr lang="en-GB" dirty="0">
               <a:solidFill>
                 <a:schemeClr val="tx1"/>
               </a:solidFill>
@@ -14432,14 +14717,14 @@
               <a:buChar char="•"/>
             </a:pPr>
             <a:r>
-              <a:rPr lang="en-GB" err="1">
+              <a:rPr lang="en-GB" dirty="0" err="1">
                 <a:solidFill>
                   <a:schemeClr val="tx1"/>
                 </a:solidFill>
               </a:rPr>
               <a:t>Progettazione</a:t>
             </a:r>
-            <a:endParaRPr lang="en-GB">
+            <a:endParaRPr lang="en-GB" dirty="0">
               <a:solidFill>
                 <a:schemeClr val="tx1"/>
               </a:solidFill>
@@ -14454,7 +14739,7 @@
               <a:buChar char="•"/>
             </a:pPr>
             <a:r>
-              <a:rPr lang="en-GB" err="1">
+              <a:rPr lang="en-GB" sz="1600" dirty="0" err="1">
                 <a:solidFill>
                   <a:schemeClr val="tx1"/>
                 </a:solidFill>
@@ -14462,7 +14747,7 @@
               <a:t>Metodologia</a:t>
             </a:r>
             <a:r>
-              <a:rPr lang="en-GB">
+              <a:rPr lang="en-GB" sz="1600" dirty="0">
                 <a:solidFill>
                   <a:schemeClr val="tx1"/>
                 </a:solidFill>
@@ -14470,14 +14755,14 @@
               <a:t> ed </a:t>
             </a:r>
             <a:r>
-              <a:rPr lang="en-GB" err="1">
+              <a:rPr lang="en-GB" sz="1600" dirty="0" err="1">
                 <a:solidFill>
                   <a:schemeClr val="tx1"/>
                 </a:solidFill>
               </a:rPr>
               <a:t>assunzioni</a:t>
             </a:r>
-            <a:endParaRPr lang="en-GB">
+            <a:endParaRPr lang="en-GB" sz="1600" dirty="0">
               <a:solidFill>
                 <a:schemeClr val="tx1"/>
               </a:solidFill>
@@ -14492,7 +14777,7 @@
               <a:buChar char="•"/>
             </a:pPr>
             <a:r>
-              <a:rPr lang="en-GB" err="1">
+              <a:rPr lang="en-GB" sz="1600" dirty="0" err="1">
                 <a:solidFill>
                   <a:schemeClr val="tx1"/>
                 </a:solidFill>
@@ -14500,15 +14785,15 @@
               <a:t>Raccolta</a:t>
             </a:r>
             <a:r>
-              <a:rPr lang="en-GB">
-                <a:solidFill>
-                  <a:schemeClr val="tx1"/>
-                </a:solidFill>
-              </a:rPr>
-              <a:t> </a:t>
-            </a:r>
-            <a:r>
-              <a:rPr lang="en-GB" err="1">
+              <a:rPr lang="en-GB" sz="1600" dirty="0">
+                <a:solidFill>
+                  <a:schemeClr val="tx1"/>
+                </a:solidFill>
+              </a:rPr>
+              <a:t> </a:t>
+            </a:r>
+            <a:r>
+              <a:rPr lang="en-GB" sz="1600" dirty="0" err="1">
                 <a:solidFill>
                   <a:schemeClr val="tx1"/>
                 </a:solidFill>
@@ -14516,22 +14801,22 @@
               <a:t>dei</a:t>
             </a:r>
             <a:r>
-              <a:rPr lang="en-GB">
-                <a:solidFill>
-                  <a:schemeClr val="tx1"/>
-                </a:solidFill>
-              </a:rPr>
-              <a:t> </a:t>
-            </a:r>
-            <a:r>
-              <a:rPr lang="en-GB" err="1">
+              <a:rPr lang="en-GB" sz="1600" dirty="0">
+                <a:solidFill>
+                  <a:schemeClr val="tx1"/>
+                </a:solidFill>
+              </a:rPr>
+              <a:t> </a:t>
+            </a:r>
+            <a:r>
+              <a:rPr lang="en-GB" sz="1600" dirty="0" err="1">
                 <a:solidFill>
                   <a:schemeClr val="tx1"/>
                 </a:solidFill>
               </a:rPr>
               <a:t>dati</a:t>
             </a:r>
-            <a:endParaRPr lang="en-GB">
+            <a:endParaRPr lang="en-GB" sz="1600" dirty="0">
               <a:solidFill>
                 <a:schemeClr val="tx1"/>
               </a:solidFill>
@@ -14546,7 +14831,7 @@
               <a:buChar char="•"/>
             </a:pPr>
             <a:r>
-              <a:rPr lang="en-GB" err="1">
+              <a:rPr lang="en-GB" sz="1600" dirty="0" err="1">
                 <a:solidFill>
                   <a:schemeClr val="tx1"/>
                 </a:solidFill>
@@ -14554,15 +14839,15 @@
               <a:t>Valutazione</a:t>
             </a:r>
             <a:r>
-              <a:rPr lang="en-GB">
-                <a:solidFill>
-                  <a:schemeClr val="tx1"/>
-                </a:solidFill>
-              </a:rPr>
-              <a:t> </a:t>
-            </a:r>
-            <a:r>
-              <a:rPr lang="en-GB" err="1">
+              <a:rPr lang="en-GB" sz="1600" dirty="0">
+                <a:solidFill>
+                  <a:schemeClr val="tx1"/>
+                </a:solidFill>
+              </a:rPr>
+              <a:t> </a:t>
+            </a:r>
+            <a:r>
+              <a:rPr lang="en-GB" sz="1600" dirty="0" err="1">
                 <a:solidFill>
                   <a:schemeClr val="tx1"/>
                 </a:solidFill>
@@ -14570,22 +14855,22 @@
               <a:t>dei</a:t>
             </a:r>
             <a:r>
-              <a:rPr lang="en-GB">
-                <a:solidFill>
-                  <a:schemeClr val="tx1"/>
-                </a:solidFill>
-              </a:rPr>
-              <a:t> </a:t>
-            </a:r>
-            <a:r>
-              <a:rPr lang="en-GB" err="1">
+              <a:rPr lang="en-GB" sz="1600" dirty="0">
+                <a:solidFill>
+                  <a:schemeClr val="tx1"/>
+                </a:solidFill>
+              </a:rPr>
+              <a:t> </a:t>
+            </a:r>
+            <a:r>
+              <a:rPr lang="en-GB" sz="1600" dirty="0" err="1">
                 <a:solidFill>
                   <a:schemeClr val="tx1"/>
                 </a:solidFill>
               </a:rPr>
               <a:t>classificatori</a:t>
             </a:r>
-            <a:endParaRPr lang="en-GB">
+            <a:endParaRPr lang="en-GB" sz="1600" dirty="0">
               <a:solidFill>
                 <a:schemeClr val="tx1"/>
               </a:solidFill>
@@ -14600,7 +14885,7 @@
               <a:buChar char="•"/>
             </a:pPr>
             <a:r>
-              <a:rPr lang="en-GB" err="1">
+              <a:rPr lang="en-GB" sz="1600" dirty="0" err="1">
                 <a:solidFill>
                   <a:schemeClr val="tx1"/>
                 </a:solidFill>
@@ -14608,7 +14893,7 @@
               <a:t>Tecniche</a:t>
             </a:r>
             <a:r>
-              <a:rPr lang="en-GB">
+              <a:rPr lang="en-GB" sz="1600" dirty="0">
                 <a:solidFill>
                   <a:schemeClr val="tx1"/>
                 </a:solidFill>
@@ -14616,7 +14901,7 @@
               <a:t> considerate per il </a:t>
             </a:r>
             <a:r>
-              <a:rPr lang="en-GB" err="1">
+              <a:rPr lang="en-GB" sz="1600" dirty="0" err="1">
                 <a:solidFill>
                   <a:schemeClr val="tx1"/>
                 </a:solidFill>
@@ -14624,15 +14909,15 @@
               <a:t>confronto</a:t>
             </a:r>
             <a:r>
-              <a:rPr lang="en-GB">
-                <a:solidFill>
-                  <a:schemeClr val="tx1"/>
-                </a:solidFill>
-              </a:rPr>
-              <a:t> </a:t>
-            </a:r>
-            <a:r>
-              <a:rPr lang="en-GB" err="1">
+              <a:rPr lang="en-GB" sz="1600" dirty="0">
+                <a:solidFill>
+                  <a:schemeClr val="tx1"/>
+                </a:solidFill>
+              </a:rPr>
+              <a:t> </a:t>
+            </a:r>
+            <a:r>
+              <a:rPr lang="en-GB" sz="1600" dirty="0" err="1">
                 <a:solidFill>
                   <a:schemeClr val="tx1"/>
                 </a:solidFill>
@@ -14640,15 +14925,15 @@
               <a:t>tra</a:t>
             </a:r>
             <a:r>
-              <a:rPr lang="en-GB">
-                <a:solidFill>
-                  <a:schemeClr val="tx1"/>
-                </a:solidFill>
-              </a:rPr>
-              <a:t> </a:t>
-            </a:r>
-            <a:r>
-              <a:rPr lang="en-GB" err="1">
+              <a:rPr lang="en-GB" sz="1600" dirty="0">
+                <a:solidFill>
+                  <a:schemeClr val="tx1"/>
+                </a:solidFill>
+              </a:rPr>
+              <a:t> </a:t>
+            </a:r>
+            <a:r>
+              <a:rPr lang="en-GB" sz="1600" dirty="0" err="1">
                 <a:solidFill>
                   <a:schemeClr val="tx1"/>
                 </a:solidFill>
@@ -14656,22 +14941,22 @@
               <a:t>i</a:t>
             </a:r>
             <a:r>
-              <a:rPr lang="en-GB">
-                <a:solidFill>
-                  <a:schemeClr val="tx1"/>
-                </a:solidFill>
-              </a:rPr>
-              <a:t> </a:t>
-            </a:r>
-            <a:r>
-              <a:rPr lang="en-GB" err="1">
+              <a:rPr lang="en-GB" sz="1600" dirty="0">
+                <a:solidFill>
+                  <a:schemeClr val="tx1"/>
+                </a:solidFill>
+              </a:rPr>
+              <a:t> </a:t>
+            </a:r>
+            <a:r>
+              <a:rPr lang="en-GB" sz="1600" dirty="0" err="1">
                 <a:solidFill>
                   <a:schemeClr val="tx1"/>
                 </a:solidFill>
               </a:rPr>
               <a:t>classificatori</a:t>
             </a:r>
-            <a:endParaRPr lang="en-GB">
+            <a:endParaRPr lang="en-GB" sz="1600" dirty="0">
               <a:solidFill>
                 <a:schemeClr val="tx1"/>
               </a:solidFill>
@@ -14686,14 +14971,14 @@
               <a:buChar char="•"/>
             </a:pPr>
             <a:r>
-              <a:rPr lang="en-GB" err="1">
+              <a:rPr lang="en-GB" dirty="0" err="1">
                 <a:solidFill>
                   <a:schemeClr val="tx1"/>
                 </a:solidFill>
               </a:rPr>
               <a:t>Risultati</a:t>
             </a:r>
-            <a:endParaRPr lang="en-GB">
+            <a:endParaRPr lang="en-GB" dirty="0">
               <a:solidFill>
                 <a:schemeClr val="tx1"/>
               </a:solidFill>
@@ -14708,7 +14993,7 @@
               <a:buChar char="•"/>
             </a:pPr>
             <a:r>
-              <a:rPr lang="en-GB" err="1">
+              <a:rPr lang="en-GB" dirty="0" err="1">
                 <a:solidFill>
                   <a:schemeClr val="tx1"/>
                 </a:solidFill>
@@ -14716,7 +15001,7 @@
               <a:t>Considerazioni</a:t>
             </a:r>
             <a:r>
-              <a:rPr lang="en-GB">
+              <a:rPr lang="en-GB" dirty="0">
                 <a:solidFill>
                   <a:schemeClr val="tx1"/>
                 </a:solidFill>
@@ -14724,14 +15009,14 @@
               <a:t> e </a:t>
             </a:r>
             <a:r>
-              <a:rPr lang="en-GB" err="1">
+              <a:rPr lang="en-GB" dirty="0" err="1">
                 <a:solidFill>
                   <a:schemeClr val="tx1"/>
                 </a:solidFill>
               </a:rPr>
               <a:t>conclusioni</a:t>
             </a:r>
-            <a:endParaRPr lang="en-GB">
+            <a:endParaRPr lang="en-GB" dirty="0">
               <a:solidFill>
                 <a:schemeClr val="tx1"/>
               </a:solidFill>
@@ -14742,41 +15027,41 @@
               <a:buFont typeface="Arial" panose="020B0604020202020204" pitchFamily="34" charset="0"/>
               <a:buChar char="•"/>
             </a:pPr>
-            <a:endParaRPr lang="en-GB"/>
+            <a:endParaRPr lang="en-GB" dirty="0"/>
           </a:p>
           <a:p>
             <a:pPr marL="384048" lvl="2" indent="0">
               <a:buNone/>
             </a:pPr>
-            <a:endParaRPr lang="en-GB"/>
+            <a:endParaRPr lang="en-GB" dirty="0"/>
           </a:p>
           <a:p>
             <a:pPr lvl="2">
               <a:buFont typeface="Arial" panose="020B0604020202020204" pitchFamily="34" charset="0"/>
               <a:buChar char="•"/>
             </a:pPr>
-            <a:endParaRPr lang="en-GB"/>
+            <a:endParaRPr lang="en-GB" dirty="0"/>
           </a:p>
           <a:p>
             <a:pPr lvl="2">
               <a:buFont typeface="Arial" panose="020B0604020202020204" pitchFamily="34" charset="0"/>
               <a:buChar char="•"/>
             </a:pPr>
-            <a:endParaRPr lang="en-GB"/>
+            <a:endParaRPr lang="en-GB" dirty="0"/>
           </a:p>
           <a:p>
             <a:pPr lvl="2">
               <a:buFont typeface="Arial" panose="020B0604020202020204" pitchFamily="34" charset="0"/>
               <a:buChar char="•"/>
             </a:pPr>
-            <a:endParaRPr lang="en-GB"/>
+            <a:endParaRPr lang="en-GB" dirty="0"/>
           </a:p>
           <a:p>
             <a:pPr lvl="1">
               <a:buFont typeface="Arial" panose="020B0604020202020204" pitchFamily="34" charset="0"/>
               <a:buChar char="•"/>
             </a:pPr>
-            <a:endParaRPr lang="en-GB"/>
+            <a:endParaRPr lang="en-GB" dirty="0"/>
           </a:p>
         </p:txBody>
       </p:sp>
@@ -17499,7 +17784,7 @@
               <a:buChar char="•"/>
             </a:pPr>
             <a:r>
-              <a:rPr lang="en-GB">
+              <a:rPr lang="en-GB" dirty="0">
                 <a:solidFill>
                   <a:schemeClr val="tx1"/>
                 </a:solidFill>
@@ -17507,7 +17792,7 @@
               <a:t>Tutti </a:t>
             </a:r>
             <a:r>
-              <a:rPr lang="en-GB" err="1">
+              <a:rPr lang="en-GB" dirty="0" err="1">
                 <a:solidFill>
                   <a:schemeClr val="tx1"/>
                 </a:solidFill>
@@ -17515,15 +17800,15 @@
               <a:t>i</a:t>
             </a:r>
             <a:r>
-              <a:rPr lang="en-GB">
-                <a:solidFill>
-                  <a:schemeClr val="tx1"/>
-                </a:solidFill>
-              </a:rPr>
-              <a:t> </a:t>
-            </a:r>
-            <a:r>
-              <a:rPr lang="en-GB" err="1">
+              <a:rPr lang="en-GB" dirty="0">
+                <a:solidFill>
+                  <a:schemeClr val="tx1"/>
+                </a:solidFill>
+              </a:rPr>
+              <a:t> </a:t>
+            </a:r>
+            <a:r>
+              <a:rPr lang="en-GB" dirty="0" err="1">
                 <a:solidFill>
                   <a:schemeClr val="tx1"/>
                 </a:solidFill>
@@ -17531,7 +17816,7 @@
               <a:t>processi</a:t>
             </a:r>
             <a:r>
-              <a:rPr lang="en-GB">
+              <a:rPr lang="en-GB" dirty="0">
                 <a:solidFill>
                   <a:schemeClr val="tx1"/>
                 </a:solidFill>
@@ -17539,7 +17824,7 @@
               <a:t> di </a:t>
             </a:r>
             <a:r>
-              <a:rPr lang="en-GB" err="1">
+              <a:rPr lang="en-GB" dirty="0" err="1">
                 <a:solidFill>
                   <a:schemeClr val="tx1"/>
                 </a:solidFill>
@@ -17547,7 +17832,7 @@
               <a:t>sviluppo</a:t>
             </a:r>
             <a:r>
-              <a:rPr lang="en-GB">
+              <a:rPr lang="en-GB" dirty="0">
                 <a:solidFill>
                   <a:schemeClr val="tx1"/>
                 </a:solidFill>
@@ -17555,7 +17840,7 @@
               <a:t> software </a:t>
             </a:r>
             <a:r>
-              <a:rPr lang="en-GB" err="1">
+              <a:rPr lang="en-GB" dirty="0" err="1">
                 <a:solidFill>
                   <a:schemeClr val="tx1"/>
                 </a:solidFill>
@@ -17563,15 +17848,15 @@
               <a:t>prevedono</a:t>
             </a:r>
             <a:r>
-              <a:rPr lang="en-GB">
-                <a:solidFill>
-                  <a:schemeClr val="tx1"/>
-                </a:solidFill>
-              </a:rPr>
-              <a:t> </a:t>
-            </a:r>
-            <a:r>
-              <a:rPr lang="en-GB" err="1">
+              <a:rPr lang="en-GB" dirty="0">
+                <a:solidFill>
+                  <a:schemeClr val="tx1"/>
+                </a:solidFill>
+              </a:rPr>
+              <a:t> </a:t>
+            </a:r>
+            <a:r>
+              <a:rPr lang="en-GB" dirty="0" err="1">
                 <a:solidFill>
                   <a:schemeClr val="tx1"/>
                 </a:solidFill>
@@ -17579,7 +17864,7 @@
               <a:t>attività</a:t>
             </a:r>
             <a:r>
-              <a:rPr lang="en-GB">
+              <a:rPr lang="en-GB" dirty="0">
                 <a:solidFill>
                   <a:schemeClr val="tx1"/>
                 </a:solidFill>
@@ -17587,7 +17872,7 @@
               <a:t> di testing, il cui </a:t>
             </a:r>
             <a:r>
-              <a:rPr lang="en-GB" err="1">
+              <a:rPr lang="en-GB" dirty="0" err="1">
                 <a:solidFill>
                   <a:schemeClr val="tx1"/>
                 </a:solidFill>
@@ -17595,7 +17880,7 @@
               <a:t>obiettivo</a:t>
             </a:r>
             <a:r>
-              <a:rPr lang="en-GB">
+              <a:rPr lang="en-GB" dirty="0">
                 <a:solidFill>
                   <a:schemeClr val="tx1"/>
                 </a:solidFill>
@@ -17603,7 +17888,7 @@
               <a:t> è </a:t>
             </a:r>
             <a:r>
-              <a:rPr lang="en-GB" err="1">
+              <a:rPr lang="en-GB" dirty="0" err="1">
                 <a:solidFill>
                   <a:schemeClr val="tx1"/>
                 </a:solidFill>
@@ -17611,7 +17896,7 @@
               <a:t>l’individuazione</a:t>
             </a:r>
             <a:r>
-              <a:rPr lang="en-GB">
+              <a:rPr lang="en-GB" dirty="0">
                 <a:solidFill>
                   <a:schemeClr val="tx1"/>
                 </a:solidFill>
@@ -17619,7 +17904,7 @@
               <a:t> di </a:t>
             </a:r>
             <a:r>
-              <a:rPr lang="en-GB" err="1">
+              <a:rPr lang="en-GB" dirty="0" err="1">
                 <a:solidFill>
                   <a:schemeClr val="tx1"/>
                 </a:solidFill>
@@ -17627,15 +17912,31 @@
               <a:t>eventuali</a:t>
             </a:r>
             <a:r>
-              <a:rPr lang="en-GB">
-                <a:solidFill>
-                  <a:schemeClr val="tx1"/>
-                </a:solidFill>
-              </a:rPr>
-              <a:t> bug </a:t>
-            </a:r>
-            <a:r>
-              <a:rPr lang="en-GB" err="1">
+              <a:rPr lang="en-GB" dirty="0">
+                <a:solidFill>
+                  <a:schemeClr val="tx1"/>
+                </a:solidFill>
+              </a:rPr>
+              <a:t> </a:t>
+            </a:r>
+            <a:r>
+              <a:rPr lang="en-GB" dirty="0" err="1">
+                <a:solidFill>
+                  <a:schemeClr val="tx1"/>
+                </a:solidFill>
+              </a:rPr>
+              <a:t>malfunzionamenti</a:t>
+            </a:r>
+            <a:r>
+              <a:rPr lang="en-GB" dirty="0">
+                <a:solidFill>
+                  <a:schemeClr val="tx1"/>
+                </a:solidFill>
+              </a:rPr>
+              <a:t> </a:t>
+            </a:r>
+            <a:r>
+              <a:rPr lang="en-GB" dirty="0" err="1">
                 <a:solidFill>
                   <a:schemeClr val="tx1"/>
                 </a:solidFill>
@@ -17643,12 +17944,124 @@
               <a:t>presenti</a:t>
             </a:r>
             <a:r>
-              <a:rPr lang="en-GB">
-                <a:solidFill>
-                  <a:schemeClr val="tx1"/>
-                </a:solidFill>
-              </a:rPr>
-              <a:t> nel codice.</a:t>
+              <a:rPr lang="en-GB" dirty="0">
+                <a:solidFill>
+                  <a:schemeClr val="tx1"/>
+                </a:solidFill>
+              </a:rPr>
+              <a:t> </a:t>
+            </a:r>
+            <a:r>
+              <a:rPr lang="en-GB" dirty="0" err="1">
+                <a:solidFill>
+                  <a:schemeClr val="tx1"/>
+                </a:solidFill>
+              </a:rPr>
+              <a:t>nel</a:t>
+            </a:r>
+            <a:r>
+              <a:rPr lang="en-GB" dirty="0">
+                <a:solidFill>
+                  <a:schemeClr val="tx1"/>
+                </a:solidFill>
+              </a:rPr>
+              <a:t> </a:t>
+            </a:r>
+            <a:r>
+              <a:rPr lang="en-GB" dirty="0" err="1">
+                <a:solidFill>
+                  <a:schemeClr val="tx1"/>
+                </a:solidFill>
+              </a:rPr>
+              <a:t>sistema</a:t>
+            </a:r>
+            <a:r>
+              <a:rPr lang="en-GB" dirty="0">
+                <a:solidFill>
+                  <a:schemeClr val="tx1"/>
+                </a:solidFill>
+              </a:rPr>
+              <a:t>, </a:t>
+            </a:r>
+            <a:r>
+              <a:rPr lang="en-GB" dirty="0" err="1">
+                <a:solidFill>
+                  <a:schemeClr val="tx1"/>
+                </a:solidFill>
+              </a:rPr>
+              <a:t>spesso</a:t>
+            </a:r>
+            <a:r>
+              <a:rPr lang="en-GB" dirty="0">
+                <a:solidFill>
+                  <a:schemeClr val="tx1"/>
+                </a:solidFill>
+              </a:rPr>
+              <a:t> </a:t>
+            </a:r>
+            <a:r>
+              <a:rPr lang="en-GB" dirty="0" err="1">
+                <a:solidFill>
+                  <a:schemeClr val="tx1"/>
+                </a:solidFill>
+              </a:rPr>
+              <a:t>causati</a:t>
+            </a:r>
+            <a:r>
+              <a:rPr lang="en-GB" dirty="0">
+                <a:solidFill>
+                  <a:schemeClr val="tx1"/>
+                </a:solidFill>
+              </a:rPr>
+              <a:t> da bug </a:t>
+            </a:r>
+            <a:r>
+              <a:rPr lang="en-GB" dirty="0" err="1">
+                <a:solidFill>
+                  <a:schemeClr val="tx1"/>
+                </a:solidFill>
+              </a:rPr>
+              <a:t>nel</a:t>
+            </a:r>
+            <a:r>
+              <a:rPr lang="en-GB" dirty="0">
+                <a:solidFill>
+                  <a:schemeClr val="tx1"/>
+                </a:solidFill>
+              </a:rPr>
+              <a:t> </a:t>
+            </a:r>
+            <a:r>
+              <a:rPr lang="en-GB" dirty="0" err="1">
+                <a:solidFill>
+                  <a:schemeClr val="tx1"/>
+                </a:solidFill>
+              </a:rPr>
+              <a:t>codice</a:t>
+            </a:r>
+            <a:r>
+              <a:rPr lang="en-GB" dirty="0">
+                <a:solidFill>
+                  <a:schemeClr val="tx1"/>
+                </a:solidFill>
+              </a:rPr>
+              <a:t> </a:t>
+            </a:r>
+            <a:r>
+              <a:rPr lang="en-GB" dirty="0" err="1">
+                <a:solidFill>
+                  <a:schemeClr val="tx1"/>
+                </a:solidFill>
+              </a:rPr>
+              <a:t>sorgente</a:t>
+            </a:r>
+            <a:r>
+              <a:rPr lang="en-GB" dirty="0">
+                <a:solidFill>
+                  <a:schemeClr val="tx1"/>
+                </a:solidFill>
+              </a:rPr>
+              <a:t>.</a:t>
             </a:r>
           </a:p>
           <a:p>
@@ -17658,7 +18071,7 @@
               </a:lnSpc>
               <a:buNone/>
             </a:pPr>
-            <a:endParaRPr lang="en-GB">
+            <a:endParaRPr lang="en-GB" dirty="0">
               <a:solidFill>
                 <a:schemeClr val="tx1"/>
               </a:solidFill>
@@ -17673,7 +18086,7 @@
               <a:buChar char="•"/>
             </a:pPr>
             <a:r>
-              <a:rPr lang="en-GB" err="1">
+              <a:rPr lang="en-GB" dirty="0" err="1">
                 <a:solidFill>
                   <a:schemeClr val="tx1"/>
                 </a:solidFill>
@@ -17681,15 +18094,15 @@
               <a:t>Su</a:t>
             </a:r>
             <a:r>
-              <a:rPr lang="en-GB">
-                <a:solidFill>
-                  <a:schemeClr val="tx1"/>
-                </a:solidFill>
-              </a:rPr>
-              <a:t> </a:t>
-            </a:r>
-            <a:r>
-              <a:rPr lang="en-GB" err="1">
+              <a:rPr lang="en-GB" dirty="0">
+                <a:solidFill>
+                  <a:schemeClr val="tx1"/>
+                </a:solidFill>
+              </a:rPr>
+              <a:t> </a:t>
+            </a:r>
+            <a:r>
+              <a:rPr lang="en-GB" dirty="0" err="1">
                 <a:solidFill>
                   <a:schemeClr val="tx1"/>
                 </a:solidFill>
@@ -17697,7 +18110,7 @@
               <a:t>progetti</a:t>
             </a:r>
             <a:r>
-              <a:rPr lang="en-GB">
+              <a:rPr lang="en-GB" dirty="0">
                 <a:solidFill>
                   <a:schemeClr val="tx1"/>
                 </a:solidFill>
@@ -17705,7 +18118,7 @@
               <a:t> di </a:t>
             </a:r>
             <a:r>
-              <a:rPr lang="en-GB" err="1">
+              <a:rPr lang="en-GB" dirty="0" err="1">
                 <a:solidFill>
                   <a:schemeClr val="tx1"/>
                 </a:solidFill>
@@ -17713,15 +18126,15 @@
               <a:t>dimensioni</a:t>
             </a:r>
             <a:r>
-              <a:rPr lang="en-GB">
-                <a:solidFill>
-                  <a:schemeClr val="tx1"/>
-                </a:solidFill>
-              </a:rPr>
-              <a:t> </a:t>
-            </a:r>
-            <a:r>
-              <a:rPr lang="en-GB" err="1">
+              <a:rPr lang="en-GB" dirty="0">
+                <a:solidFill>
+                  <a:schemeClr val="tx1"/>
+                </a:solidFill>
+              </a:rPr>
+              <a:t> </a:t>
+            </a:r>
+            <a:r>
+              <a:rPr lang="en-GB" dirty="0" err="1">
                 <a:solidFill>
                   <a:schemeClr val="tx1"/>
                 </a:solidFill>
@@ -17729,7 +18142,7 @@
               <a:t>notevoli</a:t>
             </a:r>
             <a:r>
-              <a:rPr lang="en-GB">
+              <a:rPr lang="en-GB" dirty="0">
                 <a:solidFill>
                   <a:schemeClr val="tx1"/>
                 </a:solidFill>
@@ -17737,7 +18150,7 @@
               <a:t>, </a:t>
             </a:r>
             <a:r>
-              <a:rPr lang="en-GB" err="1">
+              <a:rPr lang="en-GB" dirty="0" err="1">
                 <a:solidFill>
                   <a:schemeClr val="tx1"/>
                 </a:solidFill>
@@ -17745,15 +18158,15 @@
               <a:t>l’effort</a:t>
             </a:r>
             <a:r>
-              <a:rPr lang="en-GB">
-                <a:solidFill>
-                  <a:schemeClr val="tx1"/>
-                </a:solidFill>
-              </a:rPr>
-              <a:t> </a:t>
-            </a:r>
-            <a:r>
-              <a:rPr lang="en-GB" err="1">
+              <a:rPr lang="en-GB" dirty="0">
+                <a:solidFill>
+                  <a:schemeClr val="tx1"/>
+                </a:solidFill>
+              </a:rPr>
+              <a:t> </a:t>
+            </a:r>
+            <a:r>
+              <a:rPr lang="en-GB" dirty="0" err="1">
                 <a:solidFill>
                   <a:schemeClr val="tx1"/>
                 </a:solidFill>
@@ -17761,7 +18174,7 @@
               <a:t>necessario</a:t>
             </a:r>
             <a:r>
-              <a:rPr lang="en-GB">
+              <a:rPr lang="en-GB" dirty="0">
                 <a:solidFill>
                   <a:schemeClr val="tx1"/>
                 </a:solidFill>
@@ -17769,7 +18182,7 @@
               <a:t> per </a:t>
             </a:r>
             <a:r>
-              <a:rPr lang="en-GB" err="1">
+              <a:rPr lang="en-GB" dirty="0" err="1">
                 <a:solidFill>
                   <a:schemeClr val="tx1"/>
                 </a:solidFill>
@@ -17777,15 +18190,15 @@
               <a:t>l’individuazione</a:t>
             </a:r>
             <a:r>
-              <a:rPr lang="en-GB">
-                <a:solidFill>
-                  <a:schemeClr val="tx1"/>
-                </a:solidFill>
-              </a:rPr>
-              <a:t> </a:t>
-            </a:r>
-            <a:r>
-              <a:rPr lang="en-GB" err="1">
+              <a:rPr lang="en-GB" dirty="0">
+                <a:solidFill>
+                  <a:schemeClr val="tx1"/>
+                </a:solidFill>
+              </a:rPr>
+              <a:t> </a:t>
+            </a:r>
+            <a:r>
+              <a:rPr lang="en-GB" dirty="0" err="1">
                 <a:solidFill>
                   <a:schemeClr val="tx1"/>
                 </a:solidFill>
@@ -17793,7 +18206,7 @@
               <a:t>dei</a:t>
             </a:r>
             <a:r>
-              <a:rPr lang="en-GB">
+              <a:rPr lang="en-GB" dirty="0">
                 <a:solidFill>
                   <a:schemeClr val="tx1"/>
                 </a:solidFill>
@@ -17801,7 +18214,7 @@
               <a:t> bug </a:t>
             </a:r>
             <a:r>
-              <a:rPr lang="en-GB" err="1">
+              <a:rPr lang="en-GB" dirty="0" err="1">
                 <a:solidFill>
                   <a:schemeClr val="tx1"/>
                 </a:solidFill>
@@ -17809,15 +18222,15 @@
               <a:t>cresce</a:t>
             </a:r>
             <a:r>
-              <a:rPr lang="en-GB">
-                <a:solidFill>
-                  <a:schemeClr val="tx1"/>
-                </a:solidFill>
-              </a:rPr>
-              <a:t> </a:t>
-            </a:r>
-            <a:r>
-              <a:rPr lang="en-GB" err="1">
+              <a:rPr lang="en-GB" dirty="0">
+                <a:solidFill>
+                  <a:schemeClr val="tx1"/>
+                </a:solidFill>
+              </a:rPr>
+              <a:t> </a:t>
+            </a:r>
+            <a:r>
+              <a:rPr lang="en-GB" dirty="0" err="1">
                 <a:solidFill>
                   <a:schemeClr val="tx1"/>
                 </a:solidFill>
@@ -17825,7 +18238,7 @@
               <a:t>considerevolmente</a:t>
             </a:r>
             <a:r>
-              <a:rPr lang="en-GB">
+              <a:rPr lang="en-GB" dirty="0">
                 <a:solidFill>
                   <a:schemeClr val="tx1"/>
                 </a:solidFill>
@@ -17833,7 +18246,7 @@
               <a:t>. Il budget a </a:t>
             </a:r>
             <a:r>
-              <a:rPr lang="en-GB" err="1">
+              <a:rPr lang="en-GB" dirty="0" err="1">
                 <a:solidFill>
                   <a:schemeClr val="tx1"/>
                 </a:solidFill>
@@ -17841,7 +18254,7 @@
               <a:t>disposizione</a:t>
             </a:r>
             <a:r>
-              <a:rPr lang="en-GB">
+              <a:rPr lang="en-GB" dirty="0">
                 <a:solidFill>
                   <a:schemeClr val="tx1"/>
                 </a:solidFill>
@@ -17849,7 +18262,7 @@
               <a:t>, </a:t>
             </a:r>
             <a:r>
-              <a:rPr lang="en-GB" err="1">
+              <a:rPr lang="en-GB" dirty="0" err="1">
                 <a:solidFill>
                   <a:schemeClr val="tx1"/>
                 </a:solidFill>
@@ -17857,7 +18270,7 @@
               <a:t>sia</a:t>
             </a:r>
             <a:r>
-              <a:rPr lang="en-GB">
+              <a:rPr lang="en-GB" dirty="0">
                 <a:solidFill>
                   <a:schemeClr val="tx1"/>
                 </a:solidFill>
@@ -17865,7 +18278,7 @@
               <a:t> in termini economici </a:t>
             </a:r>
             <a:r>
-              <a:rPr lang="en-GB" err="1">
+              <a:rPr lang="en-GB" dirty="0" err="1">
                 <a:solidFill>
                   <a:schemeClr val="tx1"/>
                 </a:solidFill>
@@ -17873,7 +18286,7 @@
               <a:t>che</a:t>
             </a:r>
             <a:r>
-              <a:rPr lang="en-GB">
+              <a:rPr lang="en-GB" dirty="0">
                 <a:solidFill>
                   <a:schemeClr val="tx1"/>
                 </a:solidFill>
@@ -17881,7 +18294,7 @@
               <a:t> di tempo, è sempre </a:t>
             </a:r>
             <a:r>
-              <a:rPr lang="en-GB" err="1">
+              <a:rPr lang="en-GB" dirty="0" err="1">
                 <a:solidFill>
                   <a:schemeClr val="tx1"/>
                 </a:solidFill>
@@ -17889,7 +18302,7 @@
               <a:t>limitato</a:t>
             </a:r>
             <a:r>
-              <a:rPr lang="en-GB">
+              <a:rPr lang="en-GB" dirty="0">
                 <a:solidFill>
                   <a:schemeClr val="tx1"/>
                 </a:solidFill>
@@ -17897,7 +18310,7 @@
               <a:t> e non </a:t>
             </a:r>
             <a:r>
-              <a:rPr lang="en-GB" err="1">
+              <a:rPr lang="en-GB" dirty="0" err="1">
                 <a:solidFill>
                   <a:schemeClr val="tx1"/>
                 </a:solidFill>
@@ -17905,15 +18318,15 @@
               <a:t>tutto</a:t>
             </a:r>
             <a:r>
-              <a:rPr lang="en-GB">
-                <a:solidFill>
-                  <a:schemeClr val="tx1"/>
-                </a:solidFill>
-              </a:rPr>
-              <a:t> </a:t>
-            </a:r>
-            <a:r>
-              <a:rPr lang="en-GB" err="1">
+              <a:rPr lang="en-GB" dirty="0">
+                <a:solidFill>
+                  <a:schemeClr val="tx1"/>
+                </a:solidFill>
+              </a:rPr>
+              <a:t> </a:t>
+            </a:r>
+            <a:r>
+              <a:rPr lang="en-GB" dirty="0" err="1">
                 <a:solidFill>
                   <a:schemeClr val="tx1"/>
                 </a:solidFill>
@@ -17921,15 +18334,15 @@
               <a:t>può</a:t>
             </a:r>
             <a:r>
-              <a:rPr lang="en-GB">
-                <a:solidFill>
-                  <a:schemeClr val="tx1"/>
-                </a:solidFill>
-              </a:rPr>
-              <a:t> </a:t>
-            </a:r>
-            <a:r>
-              <a:rPr lang="en-GB" err="1">
+              <a:rPr lang="en-GB" dirty="0">
+                <a:solidFill>
+                  <a:schemeClr val="tx1"/>
+                </a:solidFill>
+              </a:rPr>
+              <a:t> </a:t>
+            </a:r>
+            <a:r>
+              <a:rPr lang="en-GB" dirty="0" err="1">
                 <a:solidFill>
                   <a:schemeClr val="tx1"/>
                 </a:solidFill>
@@ -17937,15 +18350,15 @@
               <a:t>essere</a:t>
             </a:r>
             <a:r>
-              <a:rPr lang="en-GB">
-                <a:solidFill>
-                  <a:schemeClr val="tx1"/>
-                </a:solidFill>
-              </a:rPr>
-              <a:t> </a:t>
-            </a:r>
-            <a:r>
-              <a:rPr lang="en-GB" err="1">
+              <a:rPr lang="en-GB" dirty="0">
+                <a:solidFill>
+                  <a:schemeClr val="tx1"/>
+                </a:solidFill>
+              </a:rPr>
+              <a:t> </a:t>
+            </a:r>
+            <a:r>
+              <a:rPr lang="en-GB" dirty="0" err="1">
                 <a:solidFill>
                   <a:schemeClr val="tx1"/>
                 </a:solidFill>
@@ -17953,7 +18366,7 @@
               <a:t>testato</a:t>
             </a:r>
             <a:r>
-              <a:rPr lang="en-GB">
+              <a:rPr lang="en-GB" dirty="0">
                 <a:solidFill>
                   <a:schemeClr val="tx1"/>
                 </a:solidFill>
@@ -17969,7 +18382,7 @@
               <a:buFont typeface="Arial" panose="020B0604020202020204" pitchFamily="34" charset="0"/>
               <a:buChar char="•"/>
             </a:pPr>
-            <a:endParaRPr lang="en-GB">
+            <a:endParaRPr lang="en-GB" dirty="0">
               <a:solidFill>
                 <a:schemeClr val="tx1"/>
               </a:solidFill>
@@ -17984,7 +18397,7 @@
               <a:buChar char="•"/>
             </a:pPr>
             <a:r>
-              <a:rPr lang="en-GB">
+              <a:rPr lang="en-GB" dirty="0">
                 <a:solidFill>
                   <a:schemeClr val="tx1"/>
                 </a:solidFill>
@@ -17992,7 +18405,7 @@
               <a:t>Come fare per </a:t>
             </a:r>
             <a:r>
-              <a:rPr lang="en-GB" err="1">
+              <a:rPr lang="en-GB" dirty="0" err="1">
                 <a:solidFill>
                   <a:schemeClr val="tx1"/>
                 </a:solidFill>
@@ -18000,15 +18413,15 @@
               <a:t>migliorare</a:t>
             </a:r>
             <a:r>
-              <a:rPr lang="en-GB">
-                <a:solidFill>
-                  <a:schemeClr val="tx1"/>
-                </a:solidFill>
-              </a:rPr>
-              <a:t> </a:t>
-            </a:r>
-            <a:r>
-              <a:rPr lang="en-GB" err="1">
+              <a:rPr lang="en-GB" dirty="0">
+                <a:solidFill>
+                  <a:schemeClr val="tx1"/>
+                </a:solidFill>
+              </a:rPr>
+              <a:t> </a:t>
+            </a:r>
+            <a:r>
+              <a:rPr lang="en-GB" dirty="0" err="1">
                 <a:solidFill>
                   <a:schemeClr val="tx1"/>
                 </a:solidFill>
@@ -18016,7 +18429,7 @@
               <a:t>l’efficacia</a:t>
             </a:r>
             <a:r>
-              <a:rPr lang="en-GB">
+              <a:rPr lang="en-GB" dirty="0">
                 <a:solidFill>
                   <a:schemeClr val="tx1"/>
                 </a:solidFill>
@@ -18024,7 +18437,7 @@
               <a:t> del testing? Come fare per </a:t>
             </a:r>
             <a:r>
-              <a:rPr lang="en-GB" err="1">
+              <a:rPr lang="en-GB" dirty="0" err="1">
                 <a:solidFill>
                   <a:schemeClr val="tx1"/>
                 </a:solidFill>
@@ -18032,15 +18445,15 @@
               <a:t>scovare</a:t>
             </a:r>
             <a:r>
-              <a:rPr lang="en-GB">
-                <a:solidFill>
-                  <a:schemeClr val="tx1"/>
-                </a:solidFill>
-              </a:rPr>
-              <a:t> </a:t>
-            </a:r>
-            <a:r>
-              <a:rPr lang="en-GB" err="1">
+              <a:rPr lang="en-GB" dirty="0">
+                <a:solidFill>
+                  <a:schemeClr val="tx1"/>
+                </a:solidFill>
+              </a:rPr>
+              <a:t> </a:t>
+            </a:r>
+            <a:r>
+              <a:rPr lang="en-GB" dirty="0" err="1">
                 <a:solidFill>
                   <a:schemeClr val="tx1"/>
                 </a:solidFill>
@@ -18048,7 +18461,7 @@
               <a:t>più</a:t>
             </a:r>
             <a:r>
-              <a:rPr lang="en-GB">
+              <a:rPr lang="en-GB" dirty="0">
                 <a:solidFill>
                   <a:schemeClr val="tx1"/>
                 </a:solidFill>
@@ -18056,7 +18469,7 @@
               <a:t> bug </a:t>
             </a:r>
             <a:r>
-              <a:rPr lang="en-GB" err="1">
+              <a:rPr lang="en-GB" dirty="0" err="1">
                 <a:solidFill>
                   <a:schemeClr val="tx1"/>
                 </a:solidFill>
@@ -18064,7 +18477,7 @@
               <a:t>possibili</a:t>
             </a:r>
             <a:r>
-              <a:rPr lang="en-GB">
+              <a:rPr lang="en-GB" dirty="0">
                 <a:solidFill>
                   <a:schemeClr val="tx1"/>
                 </a:solidFill>
@@ -18079,7 +18492,7 @@
               </a:lnSpc>
               <a:buNone/>
             </a:pPr>
-            <a:endParaRPr lang="en-GB">
+            <a:endParaRPr lang="en-GB" dirty="0">
               <a:solidFill>
                 <a:schemeClr val="tx1"/>
               </a:solidFill>
@@ -19073,7 +19486,7 @@
                   <a:schemeClr val="tx1"/>
                 </a:solidFill>
               </a:rPr>
-              <a:t>dei</a:t>
+              <a:t>i</a:t>
             </a:r>
             <a:r>
               <a:rPr lang="en-GB" dirty="0">
@@ -19105,6 +19518,38 @@
                   <a:schemeClr val="tx1"/>
                 </a:solidFill>
               </a:rPr>
+              <a:t>considerati</a:t>
+            </a:r>
+            <a:r>
+              <a:rPr lang="en-GB" dirty="0">
+                <a:solidFill>
+                  <a:schemeClr val="tx1"/>
+                </a:solidFill>
+              </a:rPr>
+              <a:t> </a:t>
+            </a:r>
+            <a:r>
+              <a:rPr lang="en-GB" dirty="0" err="1">
+                <a:solidFill>
+                  <a:schemeClr val="tx1"/>
+                </a:solidFill>
+              </a:rPr>
+              <a:t>più</a:t>
+            </a:r>
+            <a:r>
+              <a:rPr lang="en-GB" dirty="0">
+                <a:solidFill>
+                  <a:schemeClr val="tx1"/>
+                </a:solidFill>
+              </a:rPr>
+              <a:t> </a:t>
+            </a:r>
+            <a:r>
+              <a:rPr lang="en-GB" dirty="0" err="1">
+                <a:solidFill>
+                  <a:schemeClr val="tx1"/>
+                </a:solidFill>
+              </a:rPr>
               <a:t>opportuni</a:t>
             </a:r>
             <a:r>
@@ -19218,6 +19663,70 @@
                 </a:solidFill>
               </a:rPr>
               <a:t>scopi</a:t>
+            </a:r>
+            <a:r>
+              <a:rPr lang="en-GB" dirty="0">
+                <a:solidFill>
+                  <a:schemeClr val="tx1"/>
+                </a:solidFill>
+              </a:rPr>
+              <a:t> </a:t>
+            </a:r>
+            <a:r>
+              <a:rPr lang="en-GB" dirty="0" err="1">
+                <a:solidFill>
+                  <a:schemeClr val="tx1"/>
+                </a:solidFill>
+              </a:rPr>
+              <a:t>che</a:t>
+            </a:r>
+            <a:r>
+              <a:rPr lang="en-GB" dirty="0">
+                <a:solidFill>
+                  <a:schemeClr val="tx1"/>
+                </a:solidFill>
+              </a:rPr>
+              <a:t> </a:t>
+            </a:r>
+            <a:r>
+              <a:rPr lang="en-GB" dirty="0" err="1">
+                <a:solidFill>
+                  <a:schemeClr val="tx1"/>
+                </a:solidFill>
+              </a:rPr>
+              <a:t>si</a:t>
+            </a:r>
+            <a:r>
+              <a:rPr lang="en-GB" dirty="0">
+                <a:solidFill>
+                  <a:schemeClr val="tx1"/>
+                </a:solidFill>
+              </a:rPr>
+              <a:t> </a:t>
+            </a:r>
+            <a:r>
+              <a:rPr lang="en-GB" dirty="0" err="1">
+                <a:solidFill>
+                  <a:schemeClr val="tx1"/>
+                </a:solidFill>
+              </a:rPr>
+              <a:t>intende</a:t>
+            </a:r>
+            <a:r>
+              <a:rPr lang="en-GB" dirty="0">
+                <a:solidFill>
+                  <a:schemeClr val="tx1"/>
+                </a:solidFill>
+              </a:rPr>
+              <a:t> </a:t>
+            </a:r>
+            <a:r>
+              <a:rPr lang="en-GB" dirty="0" err="1">
+                <a:solidFill>
+                  <a:schemeClr val="tx1"/>
+                </a:solidFill>
+              </a:rPr>
+              <a:t>raggiungere</a:t>
             </a:r>
             <a:r>
               <a:rPr lang="en-GB" dirty="0">
@@ -19506,7 +20015,7 @@
               <a:buChar char="•"/>
             </a:pPr>
             <a:r>
-              <a:rPr lang="en-GB" dirty="0">
+              <a:rPr lang="en-GB" sz="1600" dirty="0">
                 <a:solidFill>
                   <a:schemeClr val="tx1"/>
                 </a:solidFill>
@@ -19514,14 +20023,14 @@
               <a:t>Apache </a:t>
             </a:r>
             <a:r>
-              <a:rPr lang="en-GB" dirty="0" err="1">
+              <a:rPr lang="en-GB" sz="1600" dirty="0" err="1">
                 <a:solidFill>
                   <a:schemeClr val="tx1"/>
                 </a:solidFill>
               </a:rPr>
               <a:t>BookKeeper</a:t>
             </a:r>
-            <a:endParaRPr lang="en-GB" dirty="0">
+            <a:endParaRPr lang="en-GB" sz="1600" dirty="0">
               <a:solidFill>
                 <a:schemeClr val="tx1"/>
               </a:solidFill>
@@ -19533,7 +20042,7 @@
               <a:buChar char="•"/>
             </a:pPr>
             <a:r>
-              <a:rPr lang="en-GB" dirty="0">
+              <a:rPr lang="en-GB" sz="1600" dirty="0">
                 <a:solidFill>
                   <a:schemeClr val="tx1"/>
                 </a:solidFill>
@@ -19557,12 +20066,84 @@
               <a:buChar char="•"/>
             </a:pPr>
             <a:r>
-              <a:rPr lang="en-GB" dirty="0">
-                <a:solidFill>
-                  <a:schemeClr val="tx1"/>
-                </a:solidFill>
-              </a:rPr>
-              <a:t>I </a:t>
+              <a:rPr lang="en-GB" dirty="0" err="1">
+                <a:solidFill>
+                  <a:schemeClr val="tx1"/>
+                </a:solidFill>
+              </a:rPr>
+              <a:t>Sono</a:t>
+            </a:r>
+            <a:r>
+              <a:rPr lang="en-GB" dirty="0">
+                <a:solidFill>
+                  <a:schemeClr val="tx1"/>
+                </a:solidFill>
+              </a:rPr>
+              <a:t> </a:t>
+            </a:r>
+            <a:r>
+              <a:rPr lang="en-GB" dirty="0" err="1">
+                <a:solidFill>
+                  <a:schemeClr val="tx1"/>
+                </a:solidFill>
+              </a:rPr>
+              <a:t>stati</a:t>
+            </a:r>
+            <a:r>
+              <a:rPr lang="en-GB" dirty="0">
+                <a:solidFill>
+                  <a:schemeClr val="tx1"/>
+                </a:solidFill>
+              </a:rPr>
+              <a:t> </a:t>
+            </a:r>
+            <a:r>
+              <a:rPr lang="en-GB" dirty="0" err="1">
+                <a:solidFill>
+                  <a:schemeClr val="tx1"/>
+                </a:solidFill>
+              </a:rPr>
+              <a:t>selezionati</a:t>
+            </a:r>
+            <a:r>
+              <a:rPr lang="en-GB" dirty="0">
+                <a:solidFill>
+                  <a:schemeClr val="tx1"/>
+                </a:solidFill>
+              </a:rPr>
+              <a:t> </a:t>
+            </a:r>
+            <a:r>
+              <a:rPr lang="en-GB" i="1" dirty="0">
+                <a:solidFill>
+                  <a:schemeClr val="tx1"/>
+                </a:solidFill>
+              </a:rPr>
+              <a:t>Random Forest, Naïve Bayes </a:t>
+            </a:r>
+            <a:r>
+              <a:rPr lang="en-GB" dirty="0">
+                <a:solidFill>
+                  <a:schemeClr val="tx1"/>
+                </a:solidFill>
+              </a:rPr>
+              <a:t>ed</a:t>
+            </a:r>
+            <a:r>
+              <a:rPr lang="en-GB" i="1" dirty="0">
+                <a:solidFill>
+                  <a:schemeClr val="tx1"/>
+                </a:solidFill>
+              </a:rPr>
+              <a:t> IBK </a:t>
+            </a:r>
+            <a:r>
+              <a:rPr lang="en-GB" dirty="0">
+                <a:solidFill>
+                  <a:schemeClr val="tx1"/>
+                </a:solidFill>
+              </a:rPr>
+              <a:t>come </a:t>
             </a:r>
             <a:r>
               <a:rPr lang="en-GB" dirty="0" err="1">
@@ -19578,71 +20159,23 @@
                   <a:schemeClr val="tx1"/>
                 </a:solidFill>
               </a:rPr>
-              <a:t> </a:t>
-            </a:r>
-            <a:r>
-              <a:rPr lang="en-GB" dirty="0" err="1">
-                <a:solidFill>
-                  <a:schemeClr val="tx1"/>
-                </a:solidFill>
-              </a:rPr>
-              <a:t>su</a:t>
-            </a:r>
-            <a:r>
-              <a:rPr lang="en-GB" dirty="0">
-                <a:solidFill>
-                  <a:schemeClr val="tx1"/>
-                </a:solidFill>
-              </a:rPr>
-              <a:t> cui è </a:t>
-            </a:r>
-            <a:r>
-              <a:rPr lang="en-GB" dirty="0" err="1">
-                <a:solidFill>
-                  <a:schemeClr val="tx1"/>
-                </a:solidFill>
-              </a:rPr>
-              <a:t>stato</a:t>
-            </a:r>
-            <a:r>
-              <a:rPr lang="en-GB" dirty="0">
-                <a:solidFill>
-                  <a:schemeClr val="tx1"/>
-                </a:solidFill>
-              </a:rPr>
-              <a:t> </a:t>
-            </a:r>
-            <a:r>
-              <a:rPr lang="en-GB" dirty="0" err="1">
-                <a:solidFill>
-                  <a:schemeClr val="tx1"/>
-                </a:solidFill>
-              </a:rPr>
-              <a:t>effettuato</a:t>
-            </a:r>
-            <a:r>
-              <a:rPr lang="en-GB" dirty="0">
-                <a:solidFill>
-                  <a:schemeClr val="tx1"/>
-                </a:solidFill>
-              </a:rPr>
-              <a:t> lo studio </a:t>
-            </a:r>
-            <a:r>
-              <a:rPr lang="en-GB" dirty="0" err="1">
-                <a:solidFill>
-                  <a:schemeClr val="tx1"/>
-                </a:solidFill>
-              </a:rPr>
-              <a:t>sono</a:t>
-            </a:r>
-            <a:r>
-              <a:rPr lang="en-GB" dirty="0">
-                <a:solidFill>
-                  <a:schemeClr val="tx1"/>
-                </a:solidFill>
-              </a:rPr>
-              <a:t> </a:t>
+              <a:t> da </a:t>
+            </a:r>
+            <a:r>
+              <a:rPr lang="en-GB" dirty="0" err="1">
+                <a:solidFill>
+                  <a:schemeClr val="tx1"/>
+                </a:solidFill>
+              </a:rPr>
+              <a:t>analizzare</a:t>
+            </a:r>
+            <a:r>
+              <a:rPr lang="en-GB" dirty="0">
+                <a:solidFill>
+                  <a:schemeClr val="tx1"/>
+                </a:solidFill>
+              </a:rPr>
+              <a:t>.</a:t>
             </a:r>
             <a:r>
               <a:rPr lang="en-GB" i="1" dirty="0">
@@ -19650,7 +20183,7 @@
                   <a:schemeClr val="tx1"/>
                 </a:solidFill>
               </a:rPr>
-              <a:t>Random Forest, Naïve Bayes, IBK.</a:t>
+              <a:t> </a:t>
             </a:r>
           </a:p>
           <a:p>
@@ -19715,6 +20248,254 @@
                   <a:schemeClr val="tx1"/>
                 </a:solidFill>
               </a:rPr>
+              <a:t>tali</a:t>
+            </a:r>
+            <a:r>
+              <a:rPr lang="en-GB" dirty="0">
+                <a:solidFill>
+                  <a:schemeClr val="tx1"/>
+                </a:solidFill>
+              </a:rPr>
+              <a:t> </a:t>
+            </a:r>
+            <a:r>
+              <a:rPr lang="en-GB" dirty="0" err="1">
+                <a:solidFill>
+                  <a:schemeClr val="tx1"/>
+                </a:solidFill>
+              </a:rPr>
+              <a:t>classificatori</a:t>
+            </a:r>
+            <a:r>
+              <a:rPr lang="en-GB" dirty="0">
+                <a:solidFill>
+                  <a:schemeClr val="tx1"/>
+                </a:solidFill>
+              </a:rPr>
+              <a:t> </a:t>
+            </a:r>
+            <a:r>
+              <a:rPr lang="en-GB" dirty="0" err="1">
+                <a:solidFill>
+                  <a:schemeClr val="tx1"/>
+                </a:solidFill>
+              </a:rPr>
+              <a:t>sono</a:t>
+            </a:r>
+            <a:r>
+              <a:rPr lang="en-GB" dirty="0">
+                <a:solidFill>
+                  <a:schemeClr val="tx1"/>
+                </a:solidFill>
+              </a:rPr>
+              <a:t> la </a:t>
+            </a:r>
+            <a:r>
+              <a:rPr lang="en-GB" b="1" dirty="0">
+                <a:solidFill>
+                  <a:schemeClr val="tx1"/>
+                </a:solidFill>
+              </a:rPr>
+              <a:t>feature selection</a:t>
+            </a:r>
+            <a:r>
+              <a:rPr lang="en-GB" dirty="0">
+                <a:solidFill>
+                  <a:schemeClr val="tx1"/>
+                </a:solidFill>
+              </a:rPr>
+              <a:t>, il </a:t>
+            </a:r>
+            <a:r>
+              <a:rPr lang="en-GB" b="1" dirty="0">
+                <a:solidFill>
+                  <a:schemeClr val="tx1"/>
+                </a:solidFill>
+              </a:rPr>
+              <a:t>sampling</a:t>
+            </a:r>
+            <a:r>
+              <a:rPr lang="en-GB" i="1" dirty="0">
+                <a:solidFill>
+                  <a:schemeClr val="tx1"/>
+                </a:solidFill>
+              </a:rPr>
+              <a:t>, </a:t>
+            </a:r>
+            <a:r>
+              <a:rPr lang="en-GB" dirty="0">
+                <a:solidFill>
+                  <a:schemeClr val="tx1"/>
+                </a:solidFill>
+              </a:rPr>
+              <a:t>e la </a:t>
+            </a:r>
+            <a:r>
+              <a:rPr lang="en-GB" b="1" dirty="0">
+                <a:solidFill>
+                  <a:schemeClr val="tx1"/>
+                </a:solidFill>
+              </a:rPr>
+              <a:t>cost sensitivity</a:t>
+            </a:r>
+            <a:r>
+              <a:rPr lang="en-GB" dirty="0">
+                <a:solidFill>
+                  <a:schemeClr val="tx1"/>
+                </a:solidFill>
+              </a:rPr>
+              <a:t>. Per non </a:t>
+            </a:r>
+            <a:r>
+              <a:rPr lang="en-GB" dirty="0" err="1">
+                <a:solidFill>
+                  <a:schemeClr val="tx1"/>
+                </a:solidFill>
+              </a:rPr>
+              <a:t>complicare</a:t>
+            </a:r>
+            <a:r>
+              <a:rPr lang="en-GB" dirty="0">
+                <a:solidFill>
+                  <a:schemeClr val="tx1"/>
+                </a:solidFill>
+              </a:rPr>
+              <a:t> </a:t>
+            </a:r>
+            <a:r>
+              <a:rPr lang="en-GB" dirty="0" err="1">
+                <a:solidFill>
+                  <a:schemeClr val="tx1"/>
+                </a:solidFill>
+              </a:rPr>
+              <a:t>eccessivamente</a:t>
+            </a:r>
+            <a:r>
+              <a:rPr lang="en-GB" dirty="0">
+                <a:solidFill>
+                  <a:schemeClr val="tx1"/>
+                </a:solidFill>
+              </a:rPr>
+              <a:t> lo studio, due di </a:t>
+            </a:r>
+            <a:r>
+              <a:rPr lang="en-GB" dirty="0" err="1">
+                <a:solidFill>
+                  <a:schemeClr val="tx1"/>
+                </a:solidFill>
+              </a:rPr>
+              <a:t>tali</a:t>
+            </a:r>
+            <a:r>
+              <a:rPr lang="en-GB" dirty="0">
+                <a:solidFill>
+                  <a:schemeClr val="tx1"/>
+                </a:solidFill>
+              </a:rPr>
+              <a:t> </a:t>
+            </a:r>
+            <a:r>
+              <a:rPr lang="en-GB" dirty="0" err="1">
+                <a:solidFill>
+                  <a:schemeClr val="tx1"/>
+                </a:solidFill>
+              </a:rPr>
+              <a:t>tecniche</a:t>
+            </a:r>
+            <a:r>
+              <a:rPr lang="en-GB" i="1" dirty="0">
+                <a:solidFill>
+                  <a:schemeClr val="tx1"/>
+                </a:solidFill>
+              </a:rPr>
+              <a:t> </a:t>
+            </a:r>
+            <a:r>
+              <a:rPr lang="en-GB" dirty="0" err="1">
+                <a:solidFill>
+                  <a:schemeClr val="tx1"/>
+                </a:solidFill>
+              </a:rPr>
+              <a:t>sono</a:t>
+            </a:r>
+            <a:r>
+              <a:rPr lang="en-GB" dirty="0">
+                <a:solidFill>
+                  <a:schemeClr val="tx1"/>
+                </a:solidFill>
+              </a:rPr>
+              <a:t> state </a:t>
+            </a:r>
+            <a:r>
+              <a:rPr lang="en-GB" dirty="0" err="1">
+                <a:solidFill>
+                  <a:schemeClr val="tx1"/>
+                </a:solidFill>
+              </a:rPr>
+              <a:t>fissate</a:t>
+            </a:r>
+            <a:r>
+              <a:rPr lang="en-GB" dirty="0">
+                <a:solidFill>
+                  <a:schemeClr val="tx1"/>
+                </a:solidFill>
+              </a:rPr>
+              <a:t> e </a:t>
+            </a:r>
+            <a:r>
+              <a:rPr lang="en-GB" dirty="0" err="1">
+                <a:solidFill>
+                  <a:schemeClr val="tx1"/>
+                </a:solidFill>
+              </a:rPr>
+              <a:t>sono</a:t>
+            </a:r>
+            <a:r>
+              <a:rPr lang="en-GB" dirty="0">
+                <a:solidFill>
+                  <a:schemeClr val="tx1"/>
+                </a:solidFill>
+              </a:rPr>
+              <a:t> </a:t>
+            </a:r>
+            <a:r>
+              <a:rPr lang="en-GB" dirty="0" err="1">
+                <a:solidFill>
+                  <a:schemeClr val="tx1"/>
+                </a:solidFill>
+              </a:rPr>
+              <a:t>stati</a:t>
+            </a:r>
+            <a:r>
+              <a:rPr lang="en-GB" dirty="0">
+                <a:solidFill>
+                  <a:schemeClr val="tx1"/>
+                </a:solidFill>
+              </a:rPr>
+              <a:t> </a:t>
+            </a:r>
+            <a:r>
+              <a:rPr lang="en-GB" dirty="0" err="1">
+                <a:solidFill>
+                  <a:schemeClr val="tx1"/>
+                </a:solidFill>
+              </a:rPr>
+              <a:t>analizzati</a:t>
+            </a:r>
+            <a:r>
+              <a:rPr lang="en-GB" dirty="0">
+                <a:solidFill>
+                  <a:schemeClr val="tx1"/>
+                </a:solidFill>
+              </a:rPr>
+              <a:t> </a:t>
+            </a:r>
+            <a:r>
+              <a:rPr lang="en-GB" dirty="0" err="1">
+                <a:solidFill>
+                  <a:schemeClr val="tx1"/>
+                </a:solidFill>
+              </a:rPr>
               <a:t>i</a:t>
             </a:r>
             <a:r>
@@ -19731,79 +20512,103 @@
                   <a:schemeClr val="tx1"/>
                 </a:solidFill>
               </a:rPr>
-              <a:t>classificatori</a:t>
-            </a:r>
-            <a:r>
-              <a:rPr lang="en-GB" dirty="0">
-                <a:solidFill>
-                  <a:schemeClr val="tx1"/>
-                </a:solidFill>
-              </a:rPr>
-              <a:t> </a:t>
-            </a:r>
-            <a:r>
-              <a:rPr lang="en-GB" dirty="0" err="1">
-                <a:solidFill>
-                  <a:schemeClr val="tx1"/>
-                </a:solidFill>
-              </a:rPr>
-              <a:t>sono</a:t>
-            </a:r>
-            <a:r>
-              <a:rPr lang="en-GB" dirty="0">
-                <a:solidFill>
-                  <a:schemeClr val="tx1"/>
-                </a:solidFill>
-              </a:rPr>
-              <a:t> la </a:t>
-            </a:r>
-            <a:r>
-              <a:rPr lang="en-GB" b="1" dirty="0">
-                <a:solidFill>
-                  <a:schemeClr val="tx1"/>
-                </a:solidFill>
-              </a:rPr>
-              <a:t>feature selection</a:t>
-            </a:r>
-            <a:r>
-              <a:rPr lang="en-GB" dirty="0">
-                <a:solidFill>
-                  <a:schemeClr val="tx1"/>
-                </a:solidFill>
-              </a:rPr>
-              <a:t>, il </a:t>
-            </a:r>
-            <a:r>
-              <a:rPr lang="en-GB" b="1" dirty="0">
-                <a:solidFill>
-                  <a:schemeClr val="tx1"/>
-                </a:solidFill>
-              </a:rPr>
-              <a:t>sampling</a:t>
-            </a:r>
-            <a:r>
-              <a:rPr lang="en-GB" i="1" dirty="0">
-                <a:solidFill>
-                  <a:schemeClr val="tx1"/>
-                </a:solidFill>
-              </a:rPr>
-              <a:t>, </a:t>
-            </a:r>
-            <a:r>
-              <a:rPr lang="en-GB" dirty="0">
-                <a:solidFill>
-                  <a:schemeClr val="tx1"/>
-                </a:solidFill>
-              </a:rPr>
-              <a:t>e la </a:t>
-            </a:r>
-            <a:r>
-              <a:rPr lang="en-GB" b="1" dirty="0">
-                <a:solidFill>
-                  <a:schemeClr val="tx1"/>
-                </a:solidFill>
-              </a:rPr>
-              <a:t>cost sensitivity</a:t>
+              <a:t>risultati</a:t>
+            </a:r>
+            <a:r>
+              <a:rPr lang="en-GB" dirty="0">
+                <a:solidFill>
+                  <a:schemeClr val="tx1"/>
+                </a:solidFill>
+              </a:rPr>
+              <a:t> </a:t>
+            </a:r>
+            <a:r>
+              <a:rPr lang="en-GB" dirty="0" err="1">
+                <a:solidFill>
+                  <a:schemeClr val="tx1"/>
+                </a:solidFill>
+              </a:rPr>
+              <a:t>ottenuti</a:t>
+            </a:r>
+            <a:r>
+              <a:rPr lang="en-GB" dirty="0">
+                <a:solidFill>
+                  <a:schemeClr val="tx1"/>
+                </a:solidFill>
+              </a:rPr>
+              <a:t> </a:t>
+            </a:r>
+            <a:r>
+              <a:rPr lang="en-GB" dirty="0" err="1">
+                <a:solidFill>
+                  <a:schemeClr val="tx1"/>
+                </a:solidFill>
+              </a:rPr>
+              <a:t>sperimentando</a:t>
+            </a:r>
+            <a:r>
+              <a:rPr lang="en-GB" dirty="0">
+                <a:solidFill>
+                  <a:schemeClr val="tx1"/>
+                </a:solidFill>
+              </a:rPr>
+              <a:t> </a:t>
+            </a:r>
+            <a:r>
+              <a:rPr lang="en-GB" dirty="0" err="1">
+                <a:solidFill>
+                  <a:schemeClr val="tx1"/>
+                </a:solidFill>
+              </a:rPr>
+              <a:t>l’utilizzo</a:t>
+            </a:r>
+            <a:r>
+              <a:rPr lang="en-GB" dirty="0">
+                <a:solidFill>
+                  <a:schemeClr val="tx1"/>
+                </a:solidFill>
+              </a:rPr>
+              <a:t> di diverse </a:t>
+            </a:r>
+            <a:r>
+              <a:rPr lang="en-GB" dirty="0" err="1">
+                <a:solidFill>
+                  <a:schemeClr val="tx1"/>
+                </a:solidFill>
+              </a:rPr>
+              <a:t>varianti</a:t>
+            </a:r>
+            <a:r>
+              <a:rPr lang="en-GB" dirty="0">
+                <a:solidFill>
+                  <a:schemeClr val="tx1"/>
+                </a:solidFill>
+              </a:rPr>
+              <a:t> </a:t>
+            </a:r>
+            <a:r>
+              <a:rPr lang="en-GB" dirty="0" err="1">
+                <a:solidFill>
+                  <a:schemeClr val="tx1"/>
+                </a:solidFill>
+              </a:rPr>
+              <a:t>della</a:t>
+            </a:r>
+            <a:r>
+              <a:rPr lang="en-GB" dirty="0">
+                <a:solidFill>
+                  <a:schemeClr val="tx1"/>
+                </a:solidFill>
+              </a:rPr>
+              <a:t> terza </a:t>
+            </a:r>
+            <a:r>
+              <a:rPr lang="en-GB" dirty="0" err="1">
+                <a:solidFill>
+                  <a:schemeClr val="tx1"/>
+                </a:solidFill>
+              </a:rPr>
+              <a:t>tecnica</a:t>
             </a:r>
             <a:r>
               <a:rPr lang="en-GB" dirty="0">
@@ -19812,14 +20617,6 @@
                 </a:solidFill>
               </a:rPr>
               <a:t>.</a:t>
-            </a:r>
-            <a:r>
-              <a:rPr lang="en-GB" i="1" dirty="0">
-                <a:solidFill>
-                  <a:schemeClr val="tx1"/>
-                </a:solidFill>
-              </a:rPr>
-              <a:t> </a:t>
             </a:r>
             <a:endParaRPr lang="en-GB" b="1" dirty="0">
               <a:solidFill>
@@ -20146,9 +20943,16 @@
             <p:ph idx="1"/>
           </p:nvPr>
         </p:nvSpPr>
-        <p:spPr/>
+        <p:spPr>
+          <a:xfrm>
+            <a:off x="581890" y="1283857"/>
+            <a:ext cx="10935856" cy="4694156"/>
+          </a:xfrm>
+        </p:spPr>
         <p:txBody>
-          <a:bodyPr/>
+          <a:bodyPr>
+            <a:normAutofit/>
+          </a:bodyPr>
           <a:lstStyle/>
           <a:p>
             <a:pPr lvl="1">
@@ -20465,7 +21269,7 @@
                   <a:schemeClr val="tx1"/>
                 </a:solidFill>
               </a:rPr>
-              <a:t> (IV) e </a:t>
+              <a:t> (OV) e </a:t>
             </a:r>
             <a:r>
               <a:rPr lang="en-GB" b="1" dirty="0">
@@ -20775,15 +21579,80 @@
                   <a:schemeClr val="tx1"/>
                 </a:solidFill>
               </a:rPr>
-              <a:t>Closed</a:t>
-            </a:r>
-            <a:r>
-              <a:rPr lang="en-GB" dirty="0">
-                <a:solidFill>
-                  <a:schemeClr val="tx1"/>
-                </a:solidFill>
-              </a:rPr>
-              <a:t>. La </a:t>
+              <a:t>Closed, </a:t>
+            </a:r>
+            <a:r>
+              <a:rPr lang="en-GB" dirty="0" err="1">
+                <a:solidFill>
+                  <a:schemeClr val="tx1"/>
+                </a:solidFill>
+              </a:rPr>
+              <a:t>collezionandoli</a:t>
+            </a:r>
+            <a:r>
+              <a:rPr lang="en-GB" dirty="0">
+                <a:solidFill>
+                  <a:schemeClr val="tx1"/>
+                </a:solidFill>
+              </a:rPr>
+              <a:t> in </a:t>
+            </a:r>
+            <a:r>
+              <a:rPr lang="en-GB" dirty="0" err="1">
+                <a:solidFill>
+                  <a:schemeClr val="tx1"/>
+                </a:solidFill>
+              </a:rPr>
+              <a:t>una</a:t>
+            </a:r>
+            <a:r>
+              <a:rPr lang="en-GB" dirty="0">
+                <a:solidFill>
+                  <a:schemeClr val="tx1"/>
+                </a:solidFill>
+              </a:rPr>
+              <a:t> </a:t>
+            </a:r>
+            <a:r>
+              <a:rPr lang="en-GB" dirty="0" err="1">
+                <a:solidFill>
+                  <a:schemeClr val="tx1"/>
+                </a:solidFill>
+              </a:rPr>
+              <a:t>lista</a:t>
+            </a:r>
+            <a:r>
+              <a:rPr lang="en-GB" dirty="0">
+                <a:solidFill>
+                  <a:schemeClr val="tx1"/>
+                </a:solidFill>
+              </a:rPr>
+              <a:t>. </a:t>
+            </a:r>
+          </a:p>
+          <a:p>
+            <a:pPr lvl="1">
+              <a:buFont typeface="Arial" panose="020B0604020202020204" pitchFamily="34" charset="0"/>
+              <a:buChar char="•"/>
+            </a:pPr>
+            <a:endParaRPr lang="en-GB" dirty="0">
+              <a:solidFill>
+                <a:schemeClr val="tx1"/>
+              </a:solidFill>
+            </a:endParaRPr>
+          </a:p>
+          <a:p>
+            <a:pPr lvl="1">
+              <a:buFont typeface="Arial" panose="020B0604020202020204" pitchFamily="34" charset="0"/>
+              <a:buChar char="•"/>
+            </a:pPr>
+            <a:r>
+              <a:rPr lang="en-GB" dirty="0">
+                <a:solidFill>
+                  <a:schemeClr val="tx1"/>
+                </a:solidFill>
+              </a:rPr>
+              <a:t>La </a:t>
             </a:r>
             <a:r>
               <a:rPr lang="en-GB" dirty="0" err="1">
@@ -20984,7 +21853,7 @@
               <a:buChar char="•"/>
             </a:pPr>
             <a:r>
-              <a:rPr lang="en-GB" dirty="0">
+              <a:rPr lang="en-GB" sz="1600" dirty="0">
                 <a:solidFill>
                   <a:schemeClr val="tx1"/>
                 </a:solidFill>
@@ -20992,7 +21861,7 @@
               <a:t>La FV è </a:t>
             </a:r>
             <a:r>
-              <a:rPr lang="en-GB" dirty="0" err="1">
+              <a:rPr lang="en-GB" sz="1600" dirty="0" err="1">
                 <a:solidFill>
                   <a:schemeClr val="tx1"/>
                 </a:solidFill>
@@ -21000,15 +21869,15 @@
               <a:t>indicata</a:t>
             </a:r>
             <a:r>
-              <a:rPr lang="en-GB" dirty="0">
-                <a:solidFill>
-                  <a:schemeClr val="tx1"/>
-                </a:solidFill>
-              </a:rPr>
-              <a:t> </a:t>
-            </a:r>
-            <a:r>
-              <a:rPr lang="en-GB" dirty="0" err="1">
+              <a:rPr lang="en-GB" sz="1600" dirty="0">
+                <a:solidFill>
+                  <a:schemeClr val="tx1"/>
+                </a:solidFill>
+              </a:rPr>
+              <a:t> </a:t>
+            </a:r>
+            <a:r>
+              <a:rPr lang="en-GB" sz="1600" dirty="0" err="1">
                 <a:solidFill>
                   <a:schemeClr val="tx1"/>
                 </a:solidFill>
@@ -21016,7 +21885,7 @@
               <a:t>tra</a:t>
             </a:r>
             <a:r>
-              <a:rPr lang="en-GB" dirty="0">
+              <a:rPr lang="en-GB" sz="1600" dirty="0">
                 <a:solidFill>
                   <a:schemeClr val="tx1"/>
                 </a:solidFill>
@@ -21030,7 +21899,7 @@
               <a:buChar char="•"/>
             </a:pPr>
             <a:r>
-              <a:rPr lang="en-GB" dirty="0">
+              <a:rPr lang="en-GB" sz="1600" dirty="0">
                 <a:solidFill>
                   <a:schemeClr val="tx1"/>
                 </a:solidFill>
@@ -21877,7 +22746,7 @@
         <p:spPr>
           <a:xfrm>
             <a:off x="581890" y="1283858"/>
-            <a:ext cx="10935856" cy="3621518"/>
+            <a:ext cx="10935856" cy="2688374"/>
           </a:xfrm>
         </p:spPr>
         <p:txBody>
@@ -21999,6 +22868,70 @@
                 </a:solidFill>
               </a:rPr>
               <a:t> commit </a:t>
+            </a:r>
+            <a:r>
+              <a:rPr lang="en-GB" dirty="0" err="1">
+                <a:solidFill>
+                  <a:schemeClr val="tx1"/>
+                </a:solidFill>
+              </a:rPr>
+              <a:t>effettuati</a:t>
+            </a:r>
+            <a:r>
+              <a:rPr lang="en-GB" dirty="0">
+                <a:solidFill>
+                  <a:schemeClr val="tx1"/>
+                </a:solidFill>
+              </a:rPr>
+              <a:t> </a:t>
+            </a:r>
+            <a:r>
+              <a:rPr lang="en-GB" dirty="0" err="1">
+                <a:solidFill>
+                  <a:schemeClr val="tx1"/>
+                </a:solidFill>
+              </a:rPr>
+              <a:t>nel</a:t>
+            </a:r>
+            <a:r>
+              <a:rPr lang="en-GB" dirty="0">
+                <a:solidFill>
+                  <a:schemeClr val="tx1"/>
+                </a:solidFill>
+              </a:rPr>
+              <a:t> tempo sui </a:t>
+            </a:r>
+            <a:r>
+              <a:rPr lang="en-GB" dirty="0" err="1">
+                <a:solidFill>
+                  <a:schemeClr val="tx1"/>
+                </a:solidFill>
+              </a:rPr>
+              <a:t>progetti</a:t>
+            </a:r>
+            <a:r>
+              <a:rPr lang="en-GB" dirty="0">
+                <a:solidFill>
+                  <a:schemeClr val="tx1"/>
+                </a:solidFill>
+              </a:rPr>
+              <a:t> </a:t>
+            </a:r>
+            <a:r>
+              <a:rPr lang="en-GB" dirty="0" err="1">
+                <a:solidFill>
+                  <a:schemeClr val="tx1"/>
+                </a:solidFill>
+              </a:rPr>
+              <a:t>analizzati</a:t>
+            </a:r>
+            <a:r>
+              <a:rPr lang="en-GB" dirty="0">
+                <a:solidFill>
+                  <a:schemeClr val="tx1"/>
+                </a:solidFill>
+              </a:rPr>
+              <a:t>, </a:t>
             </a:r>
             <a:r>
               <a:rPr lang="en-GB" dirty="0" err="1">
@@ -22793,225 +23726,6 @@
               <a:buChar char="•"/>
             </a:pPr>
             <a:endParaRPr lang="en-GB" dirty="0">
-              <a:solidFill>
-                <a:schemeClr val="tx1"/>
-              </a:solidFill>
-            </a:endParaRPr>
-          </a:p>
-          <a:p>
-            <a:pPr lvl="1" algn="just">
-              <a:buFont typeface="Arial" panose="020B0604020202020204" pitchFamily="34" charset="0"/>
-              <a:buChar char="•"/>
-            </a:pPr>
-            <a:r>
-              <a:rPr lang="en-GB" sz="2000" b="1" dirty="0">
-                <a:solidFill>
-                  <a:schemeClr val="tx1"/>
-                </a:solidFill>
-              </a:rPr>
-              <a:t>ASSUNZIONE:</a:t>
-            </a:r>
-            <a:r>
-              <a:rPr lang="en-GB" sz="2000" dirty="0">
-                <a:solidFill>
-                  <a:schemeClr val="tx1"/>
-                </a:solidFill>
-              </a:rPr>
-              <a:t> </a:t>
-            </a:r>
-            <a:r>
-              <a:rPr lang="en-GB" dirty="0">
-                <a:solidFill>
-                  <a:schemeClr val="tx1"/>
-                </a:solidFill>
-              </a:rPr>
-              <a:t>per </a:t>
-            </a:r>
-            <a:r>
-              <a:rPr lang="en-GB" dirty="0" err="1">
-                <a:solidFill>
-                  <a:schemeClr val="tx1"/>
-                </a:solidFill>
-              </a:rPr>
-              <a:t>effettuare</a:t>
-            </a:r>
-            <a:r>
-              <a:rPr lang="en-GB" dirty="0">
-                <a:solidFill>
-                  <a:schemeClr val="tx1"/>
-                </a:solidFill>
-              </a:rPr>
-              <a:t> il </a:t>
-            </a:r>
-            <a:r>
-              <a:rPr lang="en-GB" b="1" dirty="0" err="1">
-                <a:solidFill>
-                  <a:schemeClr val="tx1"/>
-                </a:solidFill>
-              </a:rPr>
-              <a:t>labeling</a:t>
-            </a:r>
-            <a:r>
-              <a:rPr lang="en-GB" b="1" dirty="0">
-                <a:solidFill>
-                  <a:schemeClr val="tx1"/>
-                </a:solidFill>
-              </a:rPr>
-              <a:t> </a:t>
-            </a:r>
-            <a:r>
-              <a:rPr lang="en-GB" dirty="0">
-                <a:solidFill>
-                  <a:schemeClr val="tx1"/>
-                </a:solidFill>
-              </a:rPr>
-              <a:t>(buggy VS no buggy), </a:t>
-            </a:r>
-            <a:r>
-              <a:rPr lang="en-GB" dirty="0" err="1">
-                <a:solidFill>
-                  <a:schemeClr val="tx1"/>
-                </a:solidFill>
-              </a:rPr>
-              <a:t>si</a:t>
-            </a:r>
-            <a:r>
-              <a:rPr lang="en-GB" dirty="0">
-                <a:solidFill>
-                  <a:schemeClr val="tx1"/>
-                </a:solidFill>
-              </a:rPr>
-              <a:t> è </a:t>
-            </a:r>
-            <a:r>
-              <a:rPr lang="en-GB" dirty="0" err="1">
-                <a:solidFill>
-                  <a:schemeClr val="tx1"/>
-                </a:solidFill>
-              </a:rPr>
-              <a:t>assunto</a:t>
-            </a:r>
-            <a:r>
-              <a:rPr lang="en-GB" dirty="0">
-                <a:solidFill>
-                  <a:schemeClr val="tx1"/>
-                </a:solidFill>
-              </a:rPr>
-              <a:t> </a:t>
-            </a:r>
-            <a:r>
-              <a:rPr lang="en-GB" dirty="0" err="1">
-                <a:solidFill>
-                  <a:schemeClr val="tx1"/>
-                </a:solidFill>
-              </a:rPr>
-              <a:t>che</a:t>
-            </a:r>
-            <a:r>
-              <a:rPr lang="en-GB" dirty="0">
-                <a:solidFill>
-                  <a:schemeClr val="tx1"/>
-                </a:solidFill>
-              </a:rPr>
-              <a:t> </a:t>
-            </a:r>
-            <a:r>
-              <a:rPr lang="en-GB" dirty="0" err="1">
-                <a:solidFill>
-                  <a:schemeClr val="tx1"/>
-                </a:solidFill>
-              </a:rPr>
-              <a:t>tutte</a:t>
-            </a:r>
-            <a:r>
-              <a:rPr lang="en-GB" dirty="0">
-                <a:solidFill>
-                  <a:schemeClr val="tx1"/>
-                </a:solidFill>
-              </a:rPr>
-              <a:t> le </a:t>
-            </a:r>
-            <a:r>
-              <a:rPr lang="en-GB" dirty="0" err="1">
-                <a:solidFill>
-                  <a:schemeClr val="tx1"/>
-                </a:solidFill>
-              </a:rPr>
-              <a:t>classi</a:t>
-            </a:r>
-            <a:r>
-              <a:rPr lang="en-GB" dirty="0">
-                <a:solidFill>
-                  <a:schemeClr val="tx1"/>
-                </a:solidFill>
-              </a:rPr>
-              <a:t> </a:t>
-            </a:r>
-            <a:r>
-              <a:rPr lang="en-GB" dirty="0" err="1">
-                <a:solidFill>
-                  <a:schemeClr val="tx1"/>
-                </a:solidFill>
-              </a:rPr>
-              <a:t>toccate</a:t>
-            </a:r>
-            <a:r>
-              <a:rPr lang="en-GB" dirty="0">
-                <a:solidFill>
-                  <a:schemeClr val="tx1"/>
-                </a:solidFill>
-              </a:rPr>
-              <a:t> dal commit di fix del bug B, </a:t>
-            </a:r>
-            <a:r>
-              <a:rPr lang="en-GB" dirty="0" err="1">
-                <a:solidFill>
-                  <a:schemeClr val="tx1"/>
-                </a:solidFill>
-              </a:rPr>
-              <a:t>siano</a:t>
-            </a:r>
-            <a:r>
-              <a:rPr lang="en-GB" dirty="0">
-                <a:solidFill>
-                  <a:schemeClr val="tx1"/>
-                </a:solidFill>
-              </a:rPr>
-              <a:t> </a:t>
-            </a:r>
-            <a:r>
-              <a:rPr lang="en-GB" dirty="0" err="1">
-                <a:solidFill>
-                  <a:schemeClr val="tx1"/>
-                </a:solidFill>
-              </a:rPr>
-              <a:t>classificate</a:t>
-            </a:r>
-            <a:r>
-              <a:rPr lang="en-GB" dirty="0">
-                <a:solidFill>
-                  <a:schemeClr val="tx1"/>
-                </a:solidFill>
-              </a:rPr>
-              <a:t> come buggy in </a:t>
-            </a:r>
-            <a:r>
-              <a:rPr lang="en-GB" dirty="0" err="1">
-                <a:solidFill>
-                  <a:schemeClr val="tx1"/>
-                </a:solidFill>
-              </a:rPr>
-              <a:t>tutte</a:t>
-            </a:r>
-            <a:r>
-              <a:rPr lang="en-GB" dirty="0">
-                <a:solidFill>
-                  <a:schemeClr val="tx1"/>
-                </a:solidFill>
-              </a:rPr>
-              <a:t> le affected versions del bug B.</a:t>
-            </a:r>
-            <a:endParaRPr lang="en-GB" b="1" dirty="0">
               <a:solidFill>
                 <a:schemeClr val="tx1"/>
               </a:solidFill>
@@ -23112,7 +23826,7 @@
         </p:blipFill>
         <p:spPr>
           <a:xfrm>
-            <a:off x="3038475" y="5274015"/>
+            <a:off x="3038475" y="5618135"/>
             <a:ext cx="3409950" cy="600253"/>
           </a:xfrm>
           <a:prstGeom prst="rect">
@@ -23148,7 +23862,7 @@
         </p:blipFill>
         <p:spPr>
           <a:xfrm>
-            <a:off x="6991350" y="5363140"/>
+            <a:off x="6991350" y="5707260"/>
             <a:ext cx="1009650" cy="422002"/>
           </a:xfrm>
           <a:prstGeom prst="rect">
@@ -23156,6 +23870,255 @@
           </a:prstGeom>
         </p:spPr>
       </p:pic>
+      <p:sp>
+        <p:nvSpPr>
+          <p:cNvPr id="6" name="CasellaDiTesto 5">
+            <a:extLst>
+              <a:ext uri="{FF2B5EF4-FFF2-40B4-BE49-F238E27FC236}">
+                <a16:creationId xmlns:a16="http://schemas.microsoft.com/office/drawing/2014/main" id="{105040A9-0631-82C9-E9D5-5893788028B0}"/>
+              </a:ext>
+            </a:extLst>
+          </p:cNvPr>
+          <p:cNvSpPr txBox="1"/>
+          <p:nvPr/>
+        </p:nvSpPr>
+        <p:spPr>
+          <a:xfrm>
+            <a:off x="1061883" y="4435504"/>
+            <a:ext cx="10150600" cy="677108"/>
+          </a:xfrm>
+          <a:prstGeom prst="rect">
+            <a:avLst/>
+          </a:prstGeom>
+          <a:noFill/>
+          <a:ln w="57150">
+            <a:solidFill>
+              <a:schemeClr val="accent1"/>
+            </a:solidFill>
+          </a:ln>
+        </p:spPr>
+        <p:txBody>
+          <a:bodyPr wrap="square" rtlCol="0">
+            <a:spAutoFit/>
+          </a:bodyPr>
+          <a:lstStyle/>
+          <a:p>
+            <a:r>
+              <a:rPr lang="en-GB" sz="2000" b="1" dirty="0">
+                <a:solidFill>
+                  <a:schemeClr val="tx1"/>
+                </a:solidFill>
+              </a:rPr>
+              <a:t>ASSUNZIONE:</a:t>
+            </a:r>
+            <a:r>
+              <a:rPr lang="en-GB" sz="2000" dirty="0">
+                <a:solidFill>
+                  <a:schemeClr val="tx1"/>
+                </a:solidFill>
+              </a:rPr>
+              <a:t> </a:t>
+            </a:r>
+            <a:r>
+              <a:rPr lang="en-GB" dirty="0">
+                <a:solidFill>
+                  <a:schemeClr val="tx1"/>
+                </a:solidFill>
+              </a:rPr>
+              <a:t>per </a:t>
+            </a:r>
+            <a:r>
+              <a:rPr lang="en-GB" dirty="0" err="1">
+                <a:solidFill>
+                  <a:schemeClr val="tx1"/>
+                </a:solidFill>
+              </a:rPr>
+              <a:t>effettuare</a:t>
+            </a:r>
+            <a:r>
+              <a:rPr lang="en-GB" dirty="0">
+                <a:solidFill>
+                  <a:schemeClr val="tx1"/>
+                </a:solidFill>
+              </a:rPr>
+              <a:t> il </a:t>
+            </a:r>
+            <a:r>
+              <a:rPr lang="en-GB" b="1" dirty="0" err="1">
+                <a:solidFill>
+                  <a:schemeClr val="tx1"/>
+                </a:solidFill>
+              </a:rPr>
+              <a:t>labeling</a:t>
+            </a:r>
+            <a:r>
+              <a:rPr lang="en-GB" b="1" dirty="0">
+                <a:solidFill>
+                  <a:schemeClr val="tx1"/>
+                </a:solidFill>
+              </a:rPr>
+              <a:t> </a:t>
+            </a:r>
+            <a:r>
+              <a:rPr lang="en-GB" dirty="0">
+                <a:solidFill>
+                  <a:schemeClr val="tx1"/>
+                </a:solidFill>
+              </a:rPr>
+              <a:t>(buggy VS no buggy), </a:t>
+            </a:r>
+            <a:r>
+              <a:rPr lang="en-GB" dirty="0" err="1">
+                <a:solidFill>
+                  <a:schemeClr val="tx1"/>
+                </a:solidFill>
+              </a:rPr>
+              <a:t>si</a:t>
+            </a:r>
+            <a:r>
+              <a:rPr lang="en-GB" dirty="0">
+                <a:solidFill>
+                  <a:schemeClr val="tx1"/>
+                </a:solidFill>
+              </a:rPr>
+              <a:t> è </a:t>
+            </a:r>
+            <a:r>
+              <a:rPr lang="en-GB" dirty="0" err="1">
+                <a:solidFill>
+                  <a:schemeClr val="tx1"/>
+                </a:solidFill>
+              </a:rPr>
+              <a:t>assunto</a:t>
+            </a:r>
+            <a:r>
+              <a:rPr lang="en-GB" dirty="0">
+                <a:solidFill>
+                  <a:schemeClr val="tx1"/>
+                </a:solidFill>
+              </a:rPr>
+              <a:t> </a:t>
+            </a:r>
+            <a:r>
+              <a:rPr lang="en-GB" dirty="0" err="1">
+                <a:solidFill>
+                  <a:schemeClr val="tx1"/>
+                </a:solidFill>
+              </a:rPr>
+              <a:t>che</a:t>
+            </a:r>
+            <a:r>
+              <a:rPr lang="en-GB" dirty="0">
+                <a:solidFill>
+                  <a:schemeClr val="tx1"/>
+                </a:solidFill>
+              </a:rPr>
+              <a:t> </a:t>
+            </a:r>
+            <a:r>
+              <a:rPr lang="en-GB" dirty="0" err="1">
+                <a:solidFill>
+                  <a:schemeClr val="tx1"/>
+                </a:solidFill>
+              </a:rPr>
+              <a:t>tutte</a:t>
+            </a:r>
+            <a:r>
+              <a:rPr lang="en-GB" dirty="0">
+                <a:solidFill>
+                  <a:schemeClr val="tx1"/>
+                </a:solidFill>
+              </a:rPr>
+              <a:t> le </a:t>
+            </a:r>
+            <a:r>
+              <a:rPr lang="en-GB" dirty="0" err="1">
+                <a:solidFill>
+                  <a:schemeClr val="tx1"/>
+                </a:solidFill>
+              </a:rPr>
+              <a:t>classi</a:t>
+            </a:r>
+            <a:r>
+              <a:rPr lang="en-GB" dirty="0">
+                <a:solidFill>
+                  <a:schemeClr val="tx1"/>
+                </a:solidFill>
+              </a:rPr>
+              <a:t> </a:t>
+            </a:r>
+            <a:r>
+              <a:rPr lang="en-GB" dirty="0" err="1">
+                <a:solidFill>
+                  <a:schemeClr val="tx1"/>
+                </a:solidFill>
+              </a:rPr>
+              <a:t>toccate</a:t>
+            </a:r>
+            <a:r>
+              <a:rPr lang="en-GB" dirty="0">
+                <a:solidFill>
+                  <a:schemeClr val="tx1"/>
+                </a:solidFill>
+              </a:rPr>
+              <a:t> dal commit di fix del bug B, </a:t>
+            </a:r>
+            <a:r>
+              <a:rPr lang="en-GB" dirty="0" err="1">
+                <a:solidFill>
+                  <a:schemeClr val="tx1"/>
+                </a:solidFill>
+              </a:rPr>
+              <a:t>siano</a:t>
+            </a:r>
+            <a:r>
+              <a:rPr lang="en-GB" dirty="0">
+                <a:solidFill>
+                  <a:schemeClr val="tx1"/>
+                </a:solidFill>
+              </a:rPr>
+              <a:t> </a:t>
+            </a:r>
+            <a:r>
+              <a:rPr lang="en-GB" dirty="0" err="1">
+                <a:solidFill>
+                  <a:schemeClr val="tx1"/>
+                </a:solidFill>
+              </a:rPr>
+              <a:t>classificate</a:t>
+            </a:r>
+            <a:r>
+              <a:rPr lang="en-GB" dirty="0">
+                <a:solidFill>
+                  <a:schemeClr val="tx1"/>
+                </a:solidFill>
+              </a:rPr>
+              <a:t> come buggy in </a:t>
+            </a:r>
+            <a:r>
+              <a:rPr lang="en-GB" dirty="0" err="1">
+                <a:solidFill>
+                  <a:schemeClr val="tx1"/>
+                </a:solidFill>
+              </a:rPr>
+              <a:t>tutte</a:t>
+            </a:r>
+            <a:r>
+              <a:rPr lang="en-GB" dirty="0">
+                <a:solidFill>
+                  <a:schemeClr val="tx1"/>
+                </a:solidFill>
+              </a:rPr>
+              <a:t> le affected versions del bug B.</a:t>
+            </a:r>
+            <a:endParaRPr lang="en-GB" b="1" dirty="0">
+              <a:solidFill>
+                <a:schemeClr val="tx1"/>
+              </a:solidFill>
+            </a:endParaRPr>
+          </a:p>
+        </p:txBody>
+      </p:sp>
     </p:spTree>
     <p:extLst>
       <p:ext uri="{BB962C8B-B14F-4D97-AF65-F5344CB8AC3E}">
@@ -23516,7 +24479,39 @@
                   <a:schemeClr val="tx1"/>
                 </a:solidFill>
               </a:rPr>
-              <a:t> </a:t>
+              <a:t>, </a:t>
+            </a:r>
+            <a:r>
+              <a:rPr lang="en-GB" dirty="0" err="1">
+                <a:solidFill>
+                  <a:schemeClr val="tx1"/>
+                </a:solidFill>
+              </a:rPr>
+              <a:t>seppur</a:t>
+            </a:r>
+            <a:r>
+              <a:rPr lang="en-GB" dirty="0">
+                <a:solidFill>
+                  <a:schemeClr val="tx1"/>
+                </a:solidFill>
+              </a:rPr>
+              <a:t> </a:t>
+            </a:r>
+            <a:r>
+              <a:rPr lang="en-GB" dirty="0" err="1">
+                <a:solidFill>
+                  <a:schemeClr val="tx1"/>
+                </a:solidFill>
+              </a:rPr>
+              <a:t>classificata</a:t>
+            </a:r>
+            <a:r>
+              <a:rPr lang="en-GB" dirty="0">
+                <a:solidFill>
+                  <a:schemeClr val="tx1"/>
+                </a:solidFill>
+              </a:rPr>
+              <a:t> come “non buggy”, </a:t>
             </a:r>
             <a:r>
               <a:rPr lang="en-GB" dirty="0" err="1">
@@ -23941,6 +24936,102 @@
                   <a:schemeClr val="tx1"/>
                 </a:solidFill>
               </a:rPr>
+              <a:t>, </a:t>
+            </a:r>
+            <a:r>
+              <a:rPr lang="en-GB" dirty="0" err="1">
+                <a:solidFill>
+                  <a:schemeClr val="tx1"/>
+                </a:solidFill>
+              </a:rPr>
+              <a:t>compromettendo</a:t>
+            </a:r>
+            <a:r>
+              <a:rPr lang="en-GB" dirty="0">
+                <a:solidFill>
+                  <a:schemeClr val="tx1"/>
+                </a:solidFill>
+              </a:rPr>
+              <a:t> la </a:t>
+            </a:r>
+            <a:r>
+              <a:rPr lang="en-GB" dirty="0" err="1">
+                <a:solidFill>
+                  <a:schemeClr val="tx1"/>
+                </a:solidFill>
+              </a:rPr>
+              <a:t>bontà</a:t>
+            </a:r>
+            <a:r>
+              <a:rPr lang="en-GB" dirty="0">
+                <a:solidFill>
+                  <a:schemeClr val="tx1"/>
+                </a:solidFill>
+              </a:rPr>
+              <a:t> </a:t>
+            </a:r>
+            <a:r>
+              <a:rPr lang="en-GB" dirty="0" err="1">
+                <a:solidFill>
+                  <a:schemeClr val="tx1"/>
+                </a:solidFill>
+              </a:rPr>
+              <a:t>delle</a:t>
+            </a:r>
+            <a:r>
+              <a:rPr lang="en-GB" dirty="0">
+                <a:solidFill>
+                  <a:schemeClr val="tx1"/>
+                </a:solidFill>
+              </a:rPr>
+              <a:t> </a:t>
+            </a:r>
+            <a:r>
+              <a:rPr lang="en-GB" dirty="0" err="1">
+                <a:solidFill>
+                  <a:schemeClr val="tx1"/>
+                </a:solidFill>
+              </a:rPr>
+              <a:t>predizioni</a:t>
+            </a:r>
+            <a:r>
+              <a:rPr lang="en-GB" dirty="0">
+                <a:solidFill>
+                  <a:schemeClr val="tx1"/>
+                </a:solidFill>
+              </a:rPr>
+              <a:t> </a:t>
+            </a:r>
+            <a:r>
+              <a:rPr lang="en-GB" dirty="0" err="1">
+                <a:solidFill>
+                  <a:schemeClr val="tx1"/>
+                </a:solidFill>
+              </a:rPr>
+              <a:t>dei</a:t>
+            </a:r>
+            <a:r>
+              <a:rPr lang="en-GB" dirty="0">
+                <a:solidFill>
+                  <a:schemeClr val="tx1"/>
+                </a:solidFill>
+              </a:rPr>
+              <a:t> </a:t>
+            </a:r>
+            <a:r>
+              <a:rPr lang="en-GB" dirty="0" err="1">
+                <a:solidFill>
+                  <a:schemeClr val="tx1"/>
+                </a:solidFill>
+              </a:rPr>
+              <a:t>classificatori</a:t>
+            </a:r>
+            <a:r>
+              <a:rPr lang="en-GB" dirty="0">
+                <a:solidFill>
+                  <a:schemeClr val="tx1"/>
+                </a:solidFill>
+              </a:rPr>
               <a:t>.</a:t>
             </a:r>
           </a:p>
@@ -23966,7 +25057,7 @@
                   <a:schemeClr val="tx1"/>
                 </a:solidFill>
               </a:rPr>
-              <a:t>Si decide </a:t>
+              <a:t>Si decide, </a:t>
             </a:r>
             <a:r>
               <a:rPr lang="en-GB" dirty="0" err="1">
@@ -23982,6 +25073,54 @@
                   <a:schemeClr val="tx1"/>
                 </a:solidFill>
               </a:rPr>
+              <a:t>, di </a:t>
+            </a:r>
+            <a:r>
+              <a:rPr lang="en-GB" dirty="0" err="1">
+                <a:solidFill>
+                  <a:schemeClr val="tx1"/>
+                </a:solidFill>
+              </a:rPr>
+              <a:t>sfruttare</a:t>
+            </a:r>
+            <a:r>
+              <a:rPr lang="en-GB" dirty="0">
+                <a:solidFill>
+                  <a:schemeClr val="tx1"/>
+                </a:solidFill>
+              </a:rPr>
+              <a:t> </a:t>
+            </a:r>
+            <a:r>
+              <a:rPr lang="en-GB" dirty="0" err="1">
+                <a:solidFill>
+                  <a:schemeClr val="tx1"/>
+                </a:solidFill>
+              </a:rPr>
+              <a:t>i</a:t>
+            </a:r>
+            <a:r>
+              <a:rPr lang="en-GB" dirty="0">
+                <a:solidFill>
+                  <a:schemeClr val="tx1"/>
+                </a:solidFill>
+              </a:rPr>
+              <a:t> </a:t>
+            </a:r>
+            <a:r>
+              <a:rPr lang="en-GB" dirty="0" err="1">
+                <a:solidFill>
+                  <a:schemeClr val="tx1"/>
+                </a:solidFill>
+              </a:rPr>
+              <a:t>dati</a:t>
+            </a:r>
+            <a:r>
+              <a:rPr lang="en-GB" dirty="0">
+                <a:solidFill>
+                  <a:schemeClr val="tx1"/>
+                </a:solidFill>
+              </a:rPr>
               <a:t> di </a:t>
             </a:r>
             <a:r>
@@ -23990,54 +25129,6 @@
                   <a:schemeClr val="tx1"/>
                 </a:solidFill>
               </a:rPr>
-              <a:t>sfruttare</a:t>
-            </a:r>
-            <a:r>
-              <a:rPr lang="en-GB" dirty="0">
-                <a:solidFill>
-                  <a:schemeClr val="tx1"/>
-                </a:solidFill>
-              </a:rPr>
-              <a:t> </a:t>
-            </a:r>
-            <a:r>
-              <a:rPr lang="en-GB" dirty="0" err="1">
-                <a:solidFill>
-                  <a:schemeClr val="tx1"/>
-                </a:solidFill>
-              </a:rPr>
-              <a:t>i</a:t>
-            </a:r>
-            <a:r>
-              <a:rPr lang="en-GB" dirty="0">
-                <a:solidFill>
-                  <a:schemeClr val="tx1"/>
-                </a:solidFill>
-              </a:rPr>
-              <a:t> </a:t>
-            </a:r>
-            <a:r>
-              <a:rPr lang="en-GB" dirty="0" err="1">
-                <a:solidFill>
-                  <a:schemeClr val="tx1"/>
-                </a:solidFill>
-              </a:rPr>
-              <a:t>dati</a:t>
-            </a:r>
-            <a:r>
-              <a:rPr lang="en-GB" dirty="0">
-                <a:solidFill>
-                  <a:schemeClr val="tx1"/>
-                </a:solidFill>
-              </a:rPr>
-              <a:t> di </a:t>
-            </a:r>
-            <a:r>
-              <a:rPr lang="en-GB" dirty="0" err="1">
-                <a:solidFill>
-                  <a:schemeClr val="tx1"/>
-                </a:solidFill>
-              </a:rPr>
               <a:t>tutte</a:t>
             </a:r>
             <a:r>
@@ -24190,6 +25281,22 @@
                   <a:schemeClr val="tx1"/>
                 </a:solidFill>
               </a:rPr>
+              <a:t> </a:t>
+            </a:r>
+            <a:r>
+              <a:rPr lang="en-GB" dirty="0" err="1">
+                <a:solidFill>
+                  <a:schemeClr val="tx1"/>
+                </a:solidFill>
+              </a:rPr>
+              <a:t>unicamente</a:t>
+            </a:r>
+            <a:r>
+              <a:rPr lang="en-GB" dirty="0">
+                <a:solidFill>
+                  <a:schemeClr val="tx1"/>
+                </a:solidFill>
+              </a:rPr>
               <a:t> il dataset </a:t>
             </a:r>
             <a:r>
@@ -24198,7 +25305,23 @@
                   <a:schemeClr val="tx1"/>
                 </a:solidFill>
               </a:rPr>
-              <a:t>tagliato</a:t>
+              <a:t>troncato</a:t>
+            </a:r>
+            <a:r>
+              <a:rPr lang="en-GB" dirty="0">
+                <a:solidFill>
+                  <a:schemeClr val="tx1"/>
+                </a:solidFill>
+              </a:rPr>
+              <a:t> </a:t>
+            </a:r>
+            <a:r>
+              <a:rPr lang="en-GB" dirty="0" err="1">
+                <a:solidFill>
+                  <a:schemeClr val="tx1"/>
+                </a:solidFill>
+              </a:rPr>
+              <a:t>fino</a:t>
             </a:r>
             <a:r>
               <a:rPr lang="en-GB" dirty="0">

</xml_diff>

<commit_message>
Slides of ML for SE completed
</commit_message>
<xml_diff>
--- a/ML/Slides/MLforSE_AndreaPepe_0315903.pptx
+++ b/ML/Slides/MLforSE_AndreaPepe_0315903.pptx
@@ -32,7 +32,7 @@
     <p:sldId id="277" r:id="rId23"/>
     <p:sldId id="278" r:id="rId24"/>
     <p:sldId id="279" r:id="rId25"/>
-    <p:sldId id="280" r:id="rId26"/>
+    <p:sldId id="281" r:id="rId26"/>
   </p:sldIdLst>
   <p:sldSz cx="12192000" cy="6858000"/>
   <p:notesSz cx="6858000" cy="9144000"/>
@@ -221,7 +221,7 @@
           <a:p>
             <a:fld id="{97065540-07A0-4C6F-8DCB-73C0680980AD}" type="datetimeFigureOut">
               <a:rPr lang="en-GB" smtClean="0"/>
-              <a:t>30/06/2022</a:t>
+              <a:t>01/07/2022</a:t>
             </a:fld>
             <a:endParaRPr lang="en-GB"/>
           </a:p>
@@ -715,7 +715,7 @@
           <a:p>
             <a:fld id="{36675484-4142-4B7C-84B9-F01C655597FE}" type="datetime1">
               <a:rPr lang="en-GB" smtClean="0"/>
-              <a:t>30/06/2022</a:t>
+              <a:t>01/07/2022</a:t>
             </a:fld>
             <a:endParaRPr lang="en-GB"/>
           </a:p>
@@ -926,7 +926,7 @@
           <a:p>
             <a:fld id="{083C5A5D-FF99-4177-869B-DA343F422A01}" type="datetime1">
               <a:rPr lang="en-GB" smtClean="0"/>
-              <a:t>30/06/2022</a:t>
+              <a:t>01/07/2022</a:t>
             </a:fld>
             <a:endParaRPr lang="en-GB"/>
           </a:p>
@@ -1185,7 +1185,7 @@
           <a:p>
             <a:fld id="{092B45E3-D0D0-4AAE-9720-9E63567A47F3}" type="datetime1">
               <a:rPr lang="en-GB" smtClean="0"/>
-              <a:t>30/06/2022</a:t>
+              <a:t>01/07/2022</a:t>
             </a:fld>
             <a:endParaRPr lang="en-GB"/>
           </a:p>
@@ -1362,7 +1362,7 @@
           <a:p>
             <a:fld id="{0C1C7B71-B0D6-4D5D-BBBB-43567A72C6E5}" type="datetime1">
               <a:rPr lang="en-GB" smtClean="0"/>
-              <a:t>30/06/2022</a:t>
+              <a:t>01/07/2022</a:t>
             </a:fld>
             <a:endParaRPr lang="en-GB"/>
           </a:p>
@@ -1746,7 +1746,7 @@
           <a:p>
             <a:fld id="{C935CB07-C061-473A-A75F-B2F9AE8216F8}" type="datetime1">
               <a:rPr lang="en-GB" smtClean="0"/>
-              <a:t>30/06/2022</a:t>
+              <a:t>01/07/2022</a:t>
             </a:fld>
             <a:endParaRPr lang="en-GB"/>
           </a:p>
@@ -2024,7 +2024,7 @@
           <a:p>
             <a:fld id="{391B62BF-7985-4FDD-BC5F-23B7B3D0F313}" type="datetime1">
               <a:rPr lang="en-GB" smtClean="0"/>
-              <a:t>30/06/2022</a:t>
+              <a:t>01/07/2022</a:t>
             </a:fld>
             <a:endParaRPr lang="en-GB"/>
           </a:p>
@@ -2406,7 +2406,7 @@
           <a:p>
             <a:fld id="{64D75D9B-AAEB-48B3-99F3-2419C903C6D0}" type="datetime1">
               <a:rPr lang="en-GB" smtClean="0"/>
-              <a:t>30/06/2022</a:t>
+              <a:t>01/07/2022</a:t>
             </a:fld>
             <a:endParaRPr lang="en-GB"/>
           </a:p>
@@ -2527,7 +2527,7 @@
           <a:p>
             <a:fld id="{D4AA4976-D0F0-4CBE-AC66-43EB7632E6CE}" type="datetime1">
               <a:rPr lang="en-GB" smtClean="0"/>
-              <a:t>30/06/2022</a:t>
+              <a:t>01/07/2022</a:t>
             </a:fld>
             <a:endParaRPr lang="en-GB"/>
           </a:p>
@@ -2701,7 +2701,7 @@
           <a:p>
             <a:fld id="{75CC64E9-6628-44E0-9812-4A7D096FE556}" type="datetime1">
               <a:rPr lang="en-GB" smtClean="0"/>
-              <a:t>30/06/2022</a:t>
+              <a:t>01/07/2022</a:t>
             </a:fld>
             <a:endParaRPr lang="en-GB"/>
           </a:p>
@@ -3058,7 +3058,7 @@
           <a:p>
             <a:fld id="{C7C6A9E6-4737-40F4-BDF7-16F45B54A2C3}" type="datetime1">
               <a:rPr lang="en-GB" smtClean="0"/>
-              <a:t>30/06/2022</a:t>
+              <a:t>01/07/2022</a:t>
             </a:fld>
             <a:endParaRPr lang="en-GB"/>
           </a:p>
@@ -3443,7 +3443,7 @@
           <a:p>
             <a:fld id="{2187E6E7-BC76-4247-89A8-AACF9F7A52F2}" type="datetime1">
               <a:rPr lang="en-GB" smtClean="0"/>
-              <a:t>30/06/2022</a:t>
+              <a:t>01/07/2022</a:t>
             </a:fld>
             <a:endParaRPr lang="en-GB"/>
           </a:p>
@@ -3743,7 +3743,7 @@
           <a:p>
             <a:fld id="{4A967235-3FFC-4E0D-8871-192108DDF2C6}" type="datetime1">
               <a:rPr lang="en-GB" smtClean="0"/>
-              <a:t>30/06/2022</a:t>
+              <a:t>01/07/2022</a:t>
             </a:fld>
             <a:endParaRPr lang="en-GB"/>
           </a:p>
@@ -9356,8 +9356,8 @@
           </a:p>
         </p:txBody>
       </p:sp>
-      <mc:AlternateContent xmlns:mc="http://schemas.openxmlformats.org/markup-compatibility/2006">
-        <mc:Choice xmlns:a14="http://schemas.microsoft.com/office/drawing/2010/main" Requires="a14">
+      <mc:AlternateContent xmlns:mc="http://schemas.openxmlformats.org/markup-compatibility/2006" xmlns:a14="http://schemas.microsoft.com/office/drawing/2010/main">
+        <mc:Choice Requires="a14">
           <p:sp>
             <p:nvSpPr>
               <p:cNvPr id="3" name="Segnaposto contenuto 2">
@@ -10545,7 +10545,7 @@
             </p:txBody>
           </p:sp>
         </mc:Choice>
-        <mc:Fallback>
+        <mc:Fallback xmlns="">
           <p:sp>
             <p:nvSpPr>
               <p:cNvPr id="3" name="Segnaposto contenuto 2">
@@ -16931,7 +16931,39 @@
           <a:bodyPr/>
           <a:lstStyle/>
           <a:p>
-            <a:endParaRPr lang="en-GB">
+            <a:r>
+              <a:rPr lang="en-GB" dirty="0" err="1">
+                <a:solidFill>
+                  <a:schemeClr val="tx1"/>
+                </a:solidFill>
+              </a:rPr>
+              <a:t>Risultati</a:t>
+            </a:r>
+            <a:r>
+              <a:rPr lang="en-GB" dirty="0">
+                <a:solidFill>
+                  <a:schemeClr val="tx1"/>
+                </a:solidFill>
+              </a:rPr>
+              <a:t>: </a:t>
+            </a:r>
+            <a:r>
+              <a:rPr lang="en-GB" sz="2800" dirty="0" err="1">
+                <a:solidFill>
+                  <a:schemeClr val="tx1"/>
+                </a:solidFill>
+              </a:rPr>
+              <a:t>BookKeeper</a:t>
+            </a:r>
+            <a:r>
+              <a:rPr lang="en-GB" sz="2800" dirty="0">
+                <a:solidFill>
+                  <a:schemeClr val="tx1"/>
+                </a:solidFill>
+              </a:rPr>
+              <a:t> – cost sensitivity con Naive Bayes</a:t>
+            </a:r>
+            <a:endParaRPr lang="en-GB" dirty="0">
               <a:solidFill>
                 <a:schemeClr val="tx1"/>
               </a:solidFill>
@@ -16939,39 +16971,41 @@
           </a:p>
         </p:txBody>
       </p:sp>
-      <p:sp>
-        <p:nvSpPr>
-          <p:cNvPr id="3" name="Segnaposto contenuto 2">
+      <p:pic>
+        <p:nvPicPr>
+          <p:cNvPr id="7" name="Segnaposto contenuto 6">
             <a:extLst>
               <a:ext uri="{FF2B5EF4-FFF2-40B4-BE49-F238E27FC236}">
-                <a16:creationId xmlns:a16="http://schemas.microsoft.com/office/drawing/2014/main" id="{5E8FA3ED-6BA8-BFDD-78F6-890E095E6805}"/>
+                <a16:creationId xmlns:a16="http://schemas.microsoft.com/office/drawing/2014/main" id="{9E87134B-995E-BEC9-E206-F1125AEF75FF}"/>
               </a:ext>
             </a:extLst>
           </p:cNvPr>
-          <p:cNvSpPr>
-            <a:spLocks noGrp="1"/>
-          </p:cNvSpPr>
+          <p:cNvPicPr>
+            <a:picLocks noGrp="1" noChangeAspect="1"/>
+          </p:cNvPicPr>
           <p:nvPr>
             <p:ph idx="1"/>
           </p:nvPr>
-        </p:nvSpPr>
-        <p:spPr/>
-        <p:txBody>
-          <a:bodyPr/>
-          <a:lstStyle/>
-          <a:p>
-            <a:pPr lvl="1">
-              <a:buFont typeface="Arial" panose="020B0604020202020204" pitchFamily="34" charset="0"/>
-              <a:buChar char="•"/>
-            </a:pPr>
-            <a:endParaRPr lang="en-GB">
-              <a:solidFill>
-                <a:schemeClr val="tx1"/>
-              </a:solidFill>
-            </a:endParaRPr>
-          </a:p>
-        </p:txBody>
-      </p:sp>
+        </p:nvPicPr>
+        <p:blipFill>
+          <a:blip r:embed="rId2">
+            <a:extLst>
+              <a:ext uri="{28A0092B-C50C-407E-A947-70E740481C1C}">
+                <a14:useLocalDpi xmlns:a14="http://schemas.microsoft.com/office/drawing/2010/main" val="0"/>
+              </a:ext>
+            </a:extLst>
+          </a:blip>
+          <a:stretch>
+            <a:fillRect/>
+          </a:stretch>
+        </p:blipFill>
+        <p:spPr>
+          <a:xfrm>
+            <a:off x="1017258" y="1284288"/>
+            <a:ext cx="10065410" cy="4584700"/>
+          </a:xfrm>
+        </p:spPr>
+      </p:pic>
       <p:sp>
         <p:nvSpPr>
           <p:cNvPr id="4" name="Segnaposto piè di pagina 3">
@@ -17088,47 +17122,68 @@
           <a:bodyPr/>
           <a:lstStyle/>
           <a:p>
-            <a:endParaRPr lang="en-GB">
-              <a:solidFill>
-                <a:schemeClr val="tx1"/>
-              </a:solidFill>
-            </a:endParaRPr>
+            <a:r>
+              <a:rPr lang="en-GB" dirty="0" err="1">
+                <a:solidFill>
+                  <a:schemeClr val="tx1"/>
+                </a:solidFill>
+              </a:rPr>
+              <a:t>Risultati</a:t>
+            </a:r>
+            <a:r>
+              <a:rPr lang="en-GB" dirty="0">
+                <a:solidFill>
+                  <a:schemeClr val="tx1"/>
+                </a:solidFill>
+              </a:rPr>
+              <a:t>: </a:t>
+            </a:r>
+            <a:r>
+              <a:rPr lang="en-GB" sz="2800" dirty="0">
+                <a:solidFill>
+                  <a:schemeClr val="tx1"/>
+                </a:solidFill>
+              </a:rPr>
+              <a:t>Syncope – cost sensitivity con Naive Bayes</a:t>
+            </a:r>
           </a:p>
         </p:txBody>
       </p:sp>
-      <p:sp>
-        <p:nvSpPr>
-          <p:cNvPr id="3" name="Segnaposto contenuto 2">
+      <p:pic>
+        <p:nvPicPr>
+          <p:cNvPr id="7" name="Segnaposto contenuto 6">
             <a:extLst>
               <a:ext uri="{FF2B5EF4-FFF2-40B4-BE49-F238E27FC236}">
-                <a16:creationId xmlns:a16="http://schemas.microsoft.com/office/drawing/2014/main" id="{5E8FA3ED-6BA8-BFDD-78F6-890E095E6805}"/>
+                <a16:creationId xmlns:a16="http://schemas.microsoft.com/office/drawing/2014/main" id="{0059298F-9666-1A64-DD62-8B0011075886}"/>
               </a:ext>
             </a:extLst>
           </p:cNvPr>
-          <p:cNvSpPr>
-            <a:spLocks noGrp="1"/>
-          </p:cNvSpPr>
+          <p:cNvPicPr>
+            <a:picLocks noGrp="1" noChangeAspect="1"/>
+          </p:cNvPicPr>
           <p:nvPr>
             <p:ph idx="1"/>
           </p:nvPr>
-        </p:nvSpPr>
-        <p:spPr/>
-        <p:txBody>
-          <a:bodyPr/>
-          <a:lstStyle/>
-          <a:p>
-            <a:pPr lvl="1">
-              <a:buFont typeface="Arial" panose="020B0604020202020204" pitchFamily="34" charset="0"/>
-              <a:buChar char="•"/>
-            </a:pPr>
-            <a:endParaRPr lang="en-GB">
-              <a:solidFill>
-                <a:schemeClr val="tx1"/>
-              </a:solidFill>
-            </a:endParaRPr>
-          </a:p>
-        </p:txBody>
-      </p:sp>
+        </p:nvPicPr>
+        <p:blipFill>
+          <a:blip r:embed="rId2">
+            <a:extLst>
+              <a:ext uri="{28A0092B-C50C-407E-A947-70E740481C1C}">
+                <a14:useLocalDpi xmlns:a14="http://schemas.microsoft.com/office/drawing/2010/main" val="0"/>
+              </a:ext>
+            </a:extLst>
+          </a:blip>
+          <a:stretch>
+            <a:fillRect/>
+          </a:stretch>
+        </p:blipFill>
+        <p:spPr>
+          <a:xfrm>
+            <a:off x="1017258" y="1284288"/>
+            <a:ext cx="10065410" cy="4584700"/>
+          </a:xfrm>
+        </p:spPr>
+      </p:pic>
       <p:sp>
         <p:nvSpPr>
           <p:cNvPr id="4" name="Segnaposto piè di pagina 3">
@@ -17245,7 +17300,31 @@
           <a:bodyPr/>
           <a:lstStyle/>
           <a:p>
-            <a:endParaRPr lang="en-GB">
+            <a:r>
+              <a:rPr lang="en-GB" dirty="0" err="1">
+                <a:solidFill>
+                  <a:schemeClr val="tx1"/>
+                </a:solidFill>
+              </a:rPr>
+              <a:t>Considerazioni</a:t>
+            </a:r>
+            <a:r>
+              <a:rPr lang="en-GB" dirty="0">
+                <a:solidFill>
+                  <a:schemeClr val="tx1"/>
+                </a:solidFill>
+              </a:rPr>
+              <a:t> e </a:t>
+            </a:r>
+            <a:r>
+              <a:rPr lang="en-GB" dirty="0" err="1">
+                <a:solidFill>
+                  <a:schemeClr val="tx1"/>
+                </a:solidFill>
+              </a:rPr>
+              <a:t>conclusioni</a:t>
+            </a:r>
+            <a:endParaRPr lang="en-GB" dirty="0">
               <a:solidFill>
                 <a:schemeClr val="tx1"/>
               </a:solidFill>
@@ -17278,7 +17357,1474 @@
               <a:buFont typeface="Arial" panose="020B0604020202020204" pitchFamily="34" charset="0"/>
               <a:buChar char="•"/>
             </a:pPr>
-            <a:endParaRPr lang="en-GB">
+            <a:r>
+              <a:rPr lang="en-GB" dirty="0" err="1">
+                <a:solidFill>
+                  <a:schemeClr val="tx1"/>
+                </a:solidFill>
+              </a:rPr>
+              <a:t>Scelto</a:t>
+            </a:r>
+            <a:r>
+              <a:rPr lang="en-GB" dirty="0">
+                <a:solidFill>
+                  <a:schemeClr val="tx1"/>
+                </a:solidFill>
+              </a:rPr>
+              <a:t> </a:t>
+            </a:r>
+            <a:r>
+              <a:rPr lang="en-GB" b="1" dirty="0">
+                <a:solidFill>
+                  <a:schemeClr val="tx1"/>
+                </a:solidFill>
+              </a:rPr>
+              <a:t>Naive Bayes </a:t>
+            </a:r>
+            <a:r>
+              <a:rPr lang="en-GB" dirty="0">
+                <a:solidFill>
+                  <a:schemeClr val="tx1"/>
+                </a:solidFill>
+              </a:rPr>
+              <a:t>come </a:t>
+            </a:r>
+            <a:r>
+              <a:rPr lang="en-GB" dirty="0" err="1">
+                <a:solidFill>
+                  <a:schemeClr val="tx1"/>
+                </a:solidFill>
+              </a:rPr>
+              <a:t>classificatore</a:t>
+            </a:r>
+            <a:r>
+              <a:rPr lang="en-GB" dirty="0">
+                <a:solidFill>
+                  <a:schemeClr val="tx1"/>
+                </a:solidFill>
+              </a:rPr>
+              <a:t>, è </a:t>
+            </a:r>
+            <a:r>
+              <a:rPr lang="en-GB" dirty="0" err="1">
+                <a:solidFill>
+                  <a:schemeClr val="tx1"/>
+                </a:solidFill>
+              </a:rPr>
+              <a:t>stata</a:t>
+            </a:r>
+            <a:r>
+              <a:rPr lang="en-GB" dirty="0">
+                <a:solidFill>
+                  <a:schemeClr val="tx1"/>
+                </a:solidFill>
+              </a:rPr>
+              <a:t> </a:t>
+            </a:r>
+            <a:r>
+              <a:rPr lang="en-GB" dirty="0" err="1">
+                <a:solidFill>
+                  <a:schemeClr val="tx1"/>
+                </a:solidFill>
+              </a:rPr>
+              <a:t>valutata</a:t>
+            </a:r>
+            <a:r>
+              <a:rPr lang="en-GB" dirty="0">
+                <a:solidFill>
+                  <a:schemeClr val="tx1"/>
+                </a:solidFill>
+              </a:rPr>
+              <a:t> la </a:t>
+            </a:r>
+            <a:r>
+              <a:rPr lang="en-GB" dirty="0" err="1">
+                <a:solidFill>
+                  <a:schemeClr val="tx1"/>
+                </a:solidFill>
+              </a:rPr>
+              <a:t>tecnica</a:t>
+            </a:r>
+            <a:r>
+              <a:rPr lang="en-GB" dirty="0">
+                <a:solidFill>
+                  <a:schemeClr val="tx1"/>
+                </a:solidFill>
+              </a:rPr>
+              <a:t> di </a:t>
+            </a:r>
+            <a:r>
+              <a:rPr lang="en-GB" i="1" dirty="0">
+                <a:solidFill>
+                  <a:schemeClr val="tx1"/>
+                </a:solidFill>
+              </a:rPr>
+              <a:t>cost sensitivity</a:t>
+            </a:r>
+            <a:r>
+              <a:rPr lang="en-GB" dirty="0">
+                <a:solidFill>
+                  <a:schemeClr val="tx1"/>
+                </a:solidFill>
+              </a:rPr>
+              <a:t> </a:t>
+            </a:r>
+            <a:r>
+              <a:rPr lang="en-GB" dirty="0" err="1">
+                <a:solidFill>
+                  <a:schemeClr val="tx1"/>
+                </a:solidFill>
+              </a:rPr>
+              <a:t>più</a:t>
+            </a:r>
+            <a:r>
+              <a:rPr lang="en-GB" dirty="0">
+                <a:solidFill>
+                  <a:schemeClr val="tx1"/>
+                </a:solidFill>
+              </a:rPr>
+              <a:t> </a:t>
+            </a:r>
+            <a:r>
+              <a:rPr lang="en-GB" dirty="0" err="1">
+                <a:solidFill>
+                  <a:schemeClr val="tx1"/>
+                </a:solidFill>
+              </a:rPr>
+              <a:t>efficiente</a:t>
+            </a:r>
+            <a:r>
+              <a:rPr lang="en-GB" dirty="0">
+                <a:solidFill>
+                  <a:schemeClr val="tx1"/>
+                </a:solidFill>
+              </a:rPr>
+              <a:t>.</a:t>
+            </a:r>
+          </a:p>
+          <a:p>
+            <a:pPr lvl="1">
+              <a:buFont typeface="Arial" panose="020B0604020202020204" pitchFamily="34" charset="0"/>
+              <a:buChar char="•"/>
+            </a:pPr>
+            <a:endParaRPr lang="en-GB" dirty="0">
+              <a:solidFill>
+                <a:schemeClr val="tx1"/>
+              </a:solidFill>
+            </a:endParaRPr>
+          </a:p>
+          <a:p>
+            <a:pPr lvl="1">
+              <a:buFont typeface="Arial" panose="020B0604020202020204" pitchFamily="34" charset="0"/>
+              <a:buChar char="•"/>
+            </a:pPr>
+            <a:r>
+              <a:rPr lang="en-GB" dirty="0">
+                <a:solidFill>
+                  <a:schemeClr val="tx1"/>
+                </a:solidFill>
+              </a:rPr>
+              <a:t>Per </a:t>
+            </a:r>
+            <a:r>
+              <a:rPr lang="en-GB" i="1" dirty="0" err="1">
+                <a:solidFill>
+                  <a:schemeClr val="tx1"/>
+                </a:solidFill>
+              </a:rPr>
+              <a:t>BookKeeper</a:t>
+            </a:r>
+            <a:r>
+              <a:rPr lang="en-GB" dirty="0">
+                <a:solidFill>
+                  <a:schemeClr val="tx1"/>
+                </a:solidFill>
+              </a:rPr>
+              <a:t>, la Precision e il Kappa </a:t>
+            </a:r>
+            <a:r>
+              <a:rPr lang="en-GB" dirty="0" err="1">
+                <a:solidFill>
+                  <a:schemeClr val="tx1"/>
+                </a:solidFill>
+              </a:rPr>
+              <a:t>maggiori</a:t>
+            </a:r>
+            <a:r>
+              <a:rPr lang="en-GB" dirty="0">
+                <a:solidFill>
+                  <a:schemeClr val="tx1"/>
+                </a:solidFill>
+              </a:rPr>
+              <a:t> </a:t>
+            </a:r>
+            <a:r>
+              <a:rPr lang="en-GB" dirty="0" err="1">
+                <a:solidFill>
+                  <a:schemeClr val="tx1"/>
+                </a:solidFill>
+              </a:rPr>
+              <a:t>si</a:t>
+            </a:r>
+            <a:r>
+              <a:rPr lang="en-GB" dirty="0">
+                <a:solidFill>
+                  <a:schemeClr val="tx1"/>
+                </a:solidFill>
+              </a:rPr>
+              <a:t> </a:t>
+            </a:r>
+            <a:r>
+              <a:rPr lang="en-GB" dirty="0" err="1">
+                <a:solidFill>
+                  <a:schemeClr val="tx1"/>
+                </a:solidFill>
+              </a:rPr>
+              <a:t>ottengono</a:t>
+            </a:r>
+            <a:r>
+              <a:rPr lang="en-GB" dirty="0">
+                <a:solidFill>
+                  <a:schemeClr val="tx1"/>
+                </a:solidFill>
+              </a:rPr>
+              <a:t> con </a:t>
+            </a:r>
+            <a:r>
+              <a:rPr lang="en-GB" i="1" dirty="0">
+                <a:solidFill>
+                  <a:schemeClr val="tx1"/>
+                </a:solidFill>
+              </a:rPr>
+              <a:t>Sensitive Threshold,</a:t>
+            </a:r>
+            <a:r>
+              <a:rPr lang="en-GB" dirty="0">
+                <a:solidFill>
+                  <a:schemeClr val="tx1"/>
+                </a:solidFill>
+              </a:rPr>
+              <a:t> ma le </a:t>
+            </a:r>
+            <a:r>
+              <a:rPr lang="en-GB" dirty="0" err="1">
+                <a:solidFill>
+                  <a:schemeClr val="tx1"/>
+                </a:solidFill>
+              </a:rPr>
+              <a:t>stesse</a:t>
+            </a:r>
+            <a:r>
+              <a:rPr lang="en-GB" dirty="0">
+                <a:solidFill>
+                  <a:schemeClr val="tx1"/>
+                </a:solidFill>
+              </a:rPr>
+              <a:t> </a:t>
+            </a:r>
+            <a:r>
+              <a:rPr lang="en-GB" dirty="0" err="1">
+                <a:solidFill>
+                  <a:schemeClr val="tx1"/>
+                </a:solidFill>
+              </a:rPr>
+              <a:t>metriche</a:t>
+            </a:r>
+            <a:r>
+              <a:rPr lang="en-GB" dirty="0">
+                <a:solidFill>
+                  <a:schemeClr val="tx1"/>
+                </a:solidFill>
+              </a:rPr>
+              <a:t> </a:t>
+            </a:r>
+            <a:r>
+              <a:rPr lang="en-GB" dirty="0" err="1">
+                <a:solidFill>
+                  <a:schemeClr val="tx1"/>
+                </a:solidFill>
+              </a:rPr>
+              <a:t>ottenute</a:t>
+            </a:r>
+            <a:r>
+              <a:rPr lang="en-GB" dirty="0">
+                <a:solidFill>
+                  <a:schemeClr val="tx1"/>
+                </a:solidFill>
+              </a:rPr>
+              <a:t> con No </a:t>
+            </a:r>
+            <a:r>
+              <a:rPr lang="en-GB" i="1" dirty="0">
+                <a:solidFill>
+                  <a:schemeClr val="tx1"/>
+                </a:solidFill>
+              </a:rPr>
+              <a:t>Cost Sensitivity</a:t>
+            </a:r>
+            <a:r>
+              <a:rPr lang="en-GB" dirty="0">
+                <a:solidFill>
+                  <a:schemeClr val="tx1"/>
+                </a:solidFill>
+              </a:rPr>
+              <a:t> </a:t>
+            </a:r>
+            <a:r>
+              <a:rPr lang="en-GB" dirty="0" err="1">
+                <a:solidFill>
+                  <a:schemeClr val="tx1"/>
+                </a:solidFill>
+              </a:rPr>
+              <a:t>presentano</a:t>
+            </a:r>
+            <a:r>
+              <a:rPr lang="en-GB" dirty="0">
+                <a:solidFill>
+                  <a:schemeClr val="tx1"/>
+                </a:solidFill>
+              </a:rPr>
+              <a:t> </a:t>
+            </a:r>
+            <a:r>
+              <a:rPr lang="en-GB" dirty="0" err="1">
+                <a:solidFill>
+                  <a:schemeClr val="tx1"/>
+                </a:solidFill>
+              </a:rPr>
+              <a:t>andamenti</a:t>
+            </a:r>
+            <a:r>
+              <a:rPr lang="en-GB" dirty="0">
+                <a:solidFill>
+                  <a:schemeClr val="tx1"/>
+                </a:solidFill>
+              </a:rPr>
+              <a:t> </a:t>
+            </a:r>
+            <a:r>
+              <a:rPr lang="en-GB" dirty="0" err="1">
+                <a:solidFill>
+                  <a:schemeClr val="tx1"/>
+                </a:solidFill>
+              </a:rPr>
+              <a:t>molto</a:t>
+            </a:r>
+            <a:r>
+              <a:rPr lang="en-GB" dirty="0">
+                <a:solidFill>
+                  <a:schemeClr val="tx1"/>
+                </a:solidFill>
+              </a:rPr>
+              <a:t> </a:t>
+            </a:r>
+            <a:r>
+              <a:rPr lang="en-GB" dirty="0" err="1">
+                <a:solidFill>
+                  <a:schemeClr val="tx1"/>
+                </a:solidFill>
+              </a:rPr>
+              <a:t>simili</a:t>
+            </a:r>
+            <a:r>
+              <a:rPr lang="en-GB" dirty="0">
+                <a:solidFill>
+                  <a:schemeClr val="tx1"/>
+                </a:solidFill>
+              </a:rPr>
+              <a:t>.</a:t>
+            </a:r>
+            <a:r>
+              <a:rPr lang="en-GB" i="1" dirty="0">
+                <a:solidFill>
+                  <a:schemeClr val="tx1"/>
+                </a:solidFill>
+              </a:rPr>
+              <a:t> </a:t>
+            </a:r>
+            <a:r>
+              <a:rPr lang="en-GB" dirty="0">
+                <a:solidFill>
+                  <a:schemeClr val="tx1"/>
+                </a:solidFill>
+              </a:rPr>
+              <a:t>Si </a:t>
+            </a:r>
+            <a:r>
+              <a:rPr lang="en-GB" dirty="0" err="1">
+                <a:solidFill>
+                  <a:schemeClr val="tx1"/>
+                </a:solidFill>
+              </a:rPr>
+              <a:t>predilige</a:t>
+            </a:r>
+            <a:r>
+              <a:rPr lang="en-GB" dirty="0">
+                <a:solidFill>
+                  <a:schemeClr val="tx1"/>
+                </a:solidFill>
+              </a:rPr>
+              <a:t> </a:t>
+            </a:r>
+            <a:r>
+              <a:rPr lang="en-GB" dirty="0" err="1">
+                <a:solidFill>
+                  <a:schemeClr val="tx1"/>
+                </a:solidFill>
+              </a:rPr>
+              <a:t>quest’ultima</a:t>
+            </a:r>
+            <a:r>
+              <a:rPr lang="en-GB" dirty="0">
+                <a:solidFill>
+                  <a:schemeClr val="tx1"/>
+                </a:solidFill>
+              </a:rPr>
+              <a:t> </a:t>
+            </a:r>
+            <a:r>
+              <a:rPr lang="en-GB" dirty="0" err="1">
+                <a:solidFill>
+                  <a:schemeClr val="tx1"/>
+                </a:solidFill>
+              </a:rPr>
+              <a:t>tecnica</a:t>
+            </a:r>
+            <a:r>
+              <a:rPr lang="en-GB" dirty="0">
+                <a:solidFill>
+                  <a:schemeClr val="tx1"/>
+                </a:solidFill>
+              </a:rPr>
+              <a:t> </a:t>
+            </a:r>
+            <a:r>
+              <a:rPr lang="en-GB" dirty="0" err="1">
+                <a:solidFill>
+                  <a:schemeClr val="tx1"/>
+                </a:solidFill>
+              </a:rPr>
+              <a:t>poiché</a:t>
+            </a:r>
+            <a:r>
+              <a:rPr lang="en-GB" dirty="0">
+                <a:solidFill>
+                  <a:schemeClr val="tx1"/>
+                </a:solidFill>
+              </a:rPr>
+              <a:t> è </a:t>
+            </a:r>
+            <a:r>
+              <a:rPr lang="en-GB" dirty="0" err="1">
+                <a:solidFill>
+                  <a:schemeClr val="tx1"/>
+                </a:solidFill>
+              </a:rPr>
+              <a:t>quella</a:t>
+            </a:r>
+            <a:r>
+              <a:rPr lang="en-GB" dirty="0">
+                <a:solidFill>
+                  <a:schemeClr val="tx1"/>
+                </a:solidFill>
+              </a:rPr>
+              <a:t> </a:t>
+            </a:r>
+            <a:r>
+              <a:rPr lang="en-GB" dirty="0" err="1">
+                <a:solidFill>
+                  <a:schemeClr val="tx1"/>
+                </a:solidFill>
+              </a:rPr>
+              <a:t>tra</a:t>
+            </a:r>
+            <a:r>
+              <a:rPr lang="en-GB" dirty="0">
+                <a:solidFill>
+                  <a:schemeClr val="tx1"/>
+                </a:solidFill>
+              </a:rPr>
+              <a:t> le due </a:t>
+            </a:r>
+            <a:r>
+              <a:rPr lang="en-GB" dirty="0" err="1">
+                <a:solidFill>
+                  <a:schemeClr val="tx1"/>
+                </a:solidFill>
+              </a:rPr>
+              <a:t>che</a:t>
+            </a:r>
+            <a:r>
+              <a:rPr lang="en-GB" dirty="0">
+                <a:solidFill>
+                  <a:schemeClr val="tx1"/>
+                </a:solidFill>
+              </a:rPr>
+              <a:t> </a:t>
+            </a:r>
+            <a:r>
+              <a:rPr lang="en-GB" dirty="0" err="1">
+                <a:solidFill>
+                  <a:schemeClr val="tx1"/>
+                </a:solidFill>
+              </a:rPr>
+              <a:t>evidenzia</a:t>
+            </a:r>
+            <a:r>
+              <a:rPr lang="en-GB" dirty="0">
+                <a:solidFill>
+                  <a:schemeClr val="tx1"/>
+                </a:solidFill>
+              </a:rPr>
+              <a:t> un AUC </a:t>
+            </a:r>
+            <a:r>
+              <a:rPr lang="en-GB" dirty="0" err="1">
+                <a:solidFill>
+                  <a:schemeClr val="tx1"/>
+                </a:solidFill>
+              </a:rPr>
+              <a:t>migliore</a:t>
+            </a:r>
+            <a:r>
+              <a:rPr lang="en-GB" dirty="0">
+                <a:solidFill>
+                  <a:schemeClr val="tx1"/>
+                </a:solidFill>
+              </a:rPr>
+              <a:t>.</a:t>
+            </a:r>
+          </a:p>
+          <a:p>
+            <a:pPr lvl="1">
+              <a:buFont typeface="Arial" panose="020B0604020202020204" pitchFamily="34" charset="0"/>
+              <a:buChar char="•"/>
+            </a:pPr>
+            <a:endParaRPr lang="en-GB" dirty="0">
+              <a:solidFill>
+                <a:schemeClr val="tx1"/>
+              </a:solidFill>
+            </a:endParaRPr>
+          </a:p>
+          <a:p>
+            <a:pPr lvl="1">
+              <a:buFont typeface="Arial" panose="020B0604020202020204" pitchFamily="34" charset="0"/>
+              <a:buChar char="•"/>
+            </a:pPr>
+            <a:r>
+              <a:rPr lang="en-GB" dirty="0">
+                <a:solidFill>
+                  <a:schemeClr val="tx1"/>
+                </a:solidFill>
+              </a:rPr>
+              <a:t>Per </a:t>
+            </a:r>
+            <a:r>
+              <a:rPr lang="en-GB" i="1" dirty="0">
+                <a:solidFill>
+                  <a:schemeClr val="tx1"/>
+                </a:solidFill>
+              </a:rPr>
+              <a:t>Syncope</a:t>
+            </a:r>
+            <a:r>
+              <a:rPr lang="en-GB" dirty="0">
+                <a:solidFill>
+                  <a:schemeClr val="tx1"/>
+                </a:solidFill>
+              </a:rPr>
+              <a:t>, </a:t>
+            </a:r>
+            <a:r>
+              <a:rPr lang="en-GB" dirty="0" err="1">
+                <a:solidFill>
+                  <a:schemeClr val="tx1"/>
+                </a:solidFill>
+              </a:rPr>
+              <a:t>c’è</a:t>
+            </a:r>
+            <a:r>
+              <a:rPr lang="en-GB" dirty="0">
+                <a:solidFill>
+                  <a:schemeClr val="tx1"/>
+                </a:solidFill>
+              </a:rPr>
+              <a:t> da dire </a:t>
+            </a:r>
+            <a:r>
+              <a:rPr lang="en-GB" dirty="0" err="1">
+                <a:solidFill>
+                  <a:schemeClr val="tx1"/>
+                </a:solidFill>
+              </a:rPr>
+              <a:t>che</a:t>
+            </a:r>
+            <a:r>
+              <a:rPr lang="en-GB" dirty="0">
+                <a:solidFill>
+                  <a:schemeClr val="tx1"/>
+                </a:solidFill>
+              </a:rPr>
+              <a:t> in tutti </a:t>
+            </a:r>
+            <a:r>
+              <a:rPr lang="en-GB" dirty="0" err="1">
+                <a:solidFill>
+                  <a:schemeClr val="tx1"/>
+                </a:solidFill>
+              </a:rPr>
+              <a:t>gli</a:t>
+            </a:r>
+            <a:r>
+              <a:rPr lang="en-GB" dirty="0">
+                <a:solidFill>
+                  <a:schemeClr val="tx1"/>
+                </a:solidFill>
+              </a:rPr>
+              <a:t> </a:t>
+            </a:r>
+            <a:r>
+              <a:rPr lang="en-GB" dirty="0" err="1">
+                <a:solidFill>
+                  <a:schemeClr val="tx1"/>
+                </a:solidFill>
+              </a:rPr>
+              <a:t>scenari</a:t>
+            </a:r>
+            <a:r>
+              <a:rPr lang="en-GB" dirty="0">
+                <a:solidFill>
+                  <a:schemeClr val="tx1"/>
+                </a:solidFill>
+              </a:rPr>
+              <a:t> il </a:t>
+            </a:r>
+            <a:r>
+              <a:rPr lang="en-GB" dirty="0" err="1">
+                <a:solidFill>
+                  <a:schemeClr val="tx1"/>
+                </a:solidFill>
+              </a:rPr>
+              <a:t>valore</a:t>
+            </a:r>
+            <a:r>
+              <a:rPr lang="en-GB" dirty="0">
+                <a:solidFill>
+                  <a:schemeClr val="tx1"/>
+                </a:solidFill>
+              </a:rPr>
+              <a:t> di Kappa è </a:t>
+            </a:r>
+            <a:r>
+              <a:rPr lang="en-GB" dirty="0" err="1">
+                <a:solidFill>
+                  <a:schemeClr val="tx1"/>
+                </a:solidFill>
+              </a:rPr>
+              <a:t>molto</a:t>
+            </a:r>
+            <a:r>
+              <a:rPr lang="en-GB" dirty="0">
+                <a:solidFill>
+                  <a:schemeClr val="tx1"/>
+                </a:solidFill>
+              </a:rPr>
+              <a:t> </a:t>
+            </a:r>
+            <a:r>
+              <a:rPr lang="en-GB" dirty="0" err="1">
+                <a:solidFill>
+                  <a:schemeClr val="tx1"/>
+                </a:solidFill>
+              </a:rPr>
+              <a:t>prossimo</a:t>
+            </a:r>
+            <a:r>
+              <a:rPr lang="en-GB" dirty="0">
+                <a:solidFill>
+                  <a:schemeClr val="tx1"/>
+                </a:solidFill>
+              </a:rPr>
+              <a:t> </a:t>
+            </a:r>
+            <a:r>
+              <a:rPr lang="en-GB" dirty="0" err="1">
+                <a:solidFill>
+                  <a:schemeClr val="tx1"/>
+                </a:solidFill>
+              </a:rPr>
+              <a:t>allo</a:t>
+            </a:r>
+            <a:r>
+              <a:rPr lang="en-GB" dirty="0">
+                <a:solidFill>
+                  <a:schemeClr val="tx1"/>
+                </a:solidFill>
+              </a:rPr>
+              <a:t> zero, </a:t>
+            </a:r>
+            <a:r>
+              <a:rPr lang="en-GB" dirty="0" err="1">
+                <a:solidFill>
+                  <a:schemeClr val="tx1"/>
+                </a:solidFill>
+              </a:rPr>
+              <a:t>sintomo</a:t>
+            </a:r>
+            <a:r>
+              <a:rPr lang="en-GB" dirty="0">
+                <a:solidFill>
+                  <a:schemeClr val="tx1"/>
+                </a:solidFill>
+              </a:rPr>
+              <a:t> </a:t>
+            </a:r>
+            <a:r>
+              <a:rPr lang="en-GB" dirty="0" err="1">
+                <a:solidFill>
+                  <a:schemeClr val="tx1"/>
+                </a:solidFill>
+              </a:rPr>
+              <a:t>che</a:t>
+            </a:r>
+            <a:r>
+              <a:rPr lang="en-GB" dirty="0">
+                <a:solidFill>
+                  <a:schemeClr val="tx1"/>
+                </a:solidFill>
+              </a:rPr>
+              <a:t> il </a:t>
+            </a:r>
+            <a:r>
+              <a:rPr lang="en-GB" dirty="0" err="1">
+                <a:solidFill>
+                  <a:schemeClr val="tx1"/>
+                </a:solidFill>
+              </a:rPr>
+              <a:t>classificatore</a:t>
+            </a:r>
+            <a:r>
+              <a:rPr lang="en-GB" dirty="0">
+                <a:solidFill>
+                  <a:schemeClr val="tx1"/>
+                </a:solidFill>
+              </a:rPr>
+              <a:t> </a:t>
+            </a:r>
+            <a:r>
+              <a:rPr lang="en-GB" dirty="0" err="1">
+                <a:solidFill>
+                  <a:schemeClr val="tx1"/>
+                </a:solidFill>
+              </a:rPr>
+              <a:t>si</a:t>
+            </a:r>
+            <a:r>
+              <a:rPr lang="en-GB" dirty="0">
+                <a:solidFill>
+                  <a:schemeClr val="tx1"/>
+                </a:solidFill>
+              </a:rPr>
+              <a:t> </a:t>
+            </a:r>
+            <a:r>
+              <a:rPr lang="en-GB" dirty="0" err="1">
+                <a:solidFill>
+                  <a:schemeClr val="tx1"/>
+                </a:solidFill>
+              </a:rPr>
+              <a:t>comporta</a:t>
+            </a:r>
+            <a:r>
+              <a:rPr lang="en-GB" dirty="0">
+                <a:solidFill>
+                  <a:schemeClr val="tx1"/>
+                </a:solidFill>
+              </a:rPr>
+              <a:t> quasi come un </a:t>
+            </a:r>
+            <a:r>
+              <a:rPr lang="en-GB" dirty="0" err="1">
+                <a:solidFill>
+                  <a:schemeClr val="tx1"/>
+                </a:solidFill>
+              </a:rPr>
+              <a:t>classificatore</a:t>
+            </a:r>
+            <a:r>
+              <a:rPr lang="en-GB" dirty="0">
+                <a:solidFill>
+                  <a:schemeClr val="tx1"/>
+                </a:solidFill>
+              </a:rPr>
+              <a:t> “dummy” (e.g. </a:t>
+            </a:r>
+            <a:r>
+              <a:rPr lang="en-GB" dirty="0" err="1">
+                <a:solidFill>
+                  <a:schemeClr val="tx1"/>
+                </a:solidFill>
+              </a:rPr>
+              <a:t>ZeroR</a:t>
+            </a:r>
+            <a:r>
+              <a:rPr lang="en-GB" dirty="0">
+                <a:solidFill>
+                  <a:schemeClr val="tx1"/>
+                </a:solidFill>
+              </a:rPr>
+              <a:t>). Le </a:t>
+            </a:r>
+            <a:r>
+              <a:rPr lang="en-GB" dirty="0" err="1">
+                <a:solidFill>
+                  <a:schemeClr val="tx1"/>
+                </a:solidFill>
+              </a:rPr>
+              <a:t>prestazioni</a:t>
+            </a:r>
+            <a:r>
+              <a:rPr lang="en-GB" dirty="0">
+                <a:solidFill>
+                  <a:schemeClr val="tx1"/>
+                </a:solidFill>
+              </a:rPr>
+              <a:t> </a:t>
+            </a:r>
+            <a:r>
+              <a:rPr lang="en-GB" dirty="0" err="1">
+                <a:solidFill>
+                  <a:schemeClr val="tx1"/>
+                </a:solidFill>
+              </a:rPr>
+              <a:t>ottenute</a:t>
+            </a:r>
+            <a:r>
+              <a:rPr lang="en-GB" dirty="0">
+                <a:solidFill>
+                  <a:schemeClr val="tx1"/>
+                </a:solidFill>
+              </a:rPr>
+              <a:t> </a:t>
+            </a:r>
+            <a:r>
+              <a:rPr lang="en-GB" dirty="0" err="1">
+                <a:solidFill>
+                  <a:schemeClr val="tx1"/>
+                </a:solidFill>
+              </a:rPr>
+              <a:t>dall’applicazione</a:t>
+            </a:r>
+            <a:r>
+              <a:rPr lang="en-GB" dirty="0">
+                <a:solidFill>
+                  <a:schemeClr val="tx1"/>
+                </a:solidFill>
+              </a:rPr>
+              <a:t> di </a:t>
+            </a:r>
+            <a:r>
+              <a:rPr lang="en-GB" i="1" dirty="0">
+                <a:solidFill>
+                  <a:schemeClr val="tx1"/>
+                </a:solidFill>
+              </a:rPr>
+              <a:t>Sensitive Learning</a:t>
+            </a:r>
+            <a:r>
+              <a:rPr lang="en-GB" dirty="0">
+                <a:solidFill>
+                  <a:schemeClr val="tx1"/>
+                </a:solidFill>
+              </a:rPr>
+              <a:t> </a:t>
+            </a:r>
+            <a:r>
+              <a:rPr lang="en-GB" dirty="0" err="1">
+                <a:solidFill>
+                  <a:schemeClr val="tx1"/>
+                </a:solidFill>
+              </a:rPr>
+              <a:t>sono</a:t>
+            </a:r>
+            <a:r>
+              <a:rPr lang="en-GB" dirty="0">
+                <a:solidFill>
+                  <a:schemeClr val="tx1"/>
+                </a:solidFill>
+              </a:rPr>
+              <a:t> </a:t>
+            </a:r>
+            <a:r>
+              <a:rPr lang="en-GB" dirty="0" err="1">
+                <a:solidFill>
+                  <a:schemeClr val="tx1"/>
+                </a:solidFill>
+              </a:rPr>
+              <a:t>comparabili</a:t>
+            </a:r>
+            <a:r>
+              <a:rPr lang="en-GB" dirty="0">
+                <a:solidFill>
+                  <a:schemeClr val="tx1"/>
+                </a:solidFill>
+              </a:rPr>
+              <a:t> a quelle </a:t>
+            </a:r>
+            <a:r>
+              <a:rPr lang="en-GB" dirty="0" err="1">
+                <a:solidFill>
+                  <a:schemeClr val="tx1"/>
+                </a:solidFill>
+              </a:rPr>
+              <a:t>ottenute</a:t>
+            </a:r>
+            <a:r>
+              <a:rPr lang="en-GB" dirty="0">
+                <a:solidFill>
+                  <a:schemeClr val="tx1"/>
+                </a:solidFill>
+              </a:rPr>
+              <a:t> senza </a:t>
+            </a:r>
+            <a:r>
+              <a:rPr lang="en-GB" dirty="0" err="1">
+                <a:solidFill>
+                  <a:schemeClr val="tx1"/>
+                </a:solidFill>
+              </a:rPr>
+              <a:t>applicare</a:t>
+            </a:r>
+            <a:r>
+              <a:rPr lang="en-GB" dirty="0">
+                <a:solidFill>
+                  <a:schemeClr val="tx1"/>
+                </a:solidFill>
+              </a:rPr>
+              <a:t> alcuna </a:t>
+            </a:r>
+            <a:r>
+              <a:rPr lang="en-GB" dirty="0" err="1">
+                <a:solidFill>
+                  <a:schemeClr val="tx1"/>
+                </a:solidFill>
+              </a:rPr>
+              <a:t>tecnica</a:t>
+            </a:r>
+            <a:r>
+              <a:rPr lang="en-GB" dirty="0">
+                <a:solidFill>
+                  <a:schemeClr val="tx1"/>
+                </a:solidFill>
+              </a:rPr>
+              <a:t> di </a:t>
+            </a:r>
+            <a:r>
+              <a:rPr lang="en-GB" i="1" dirty="0">
+                <a:solidFill>
+                  <a:schemeClr val="tx1"/>
+                </a:solidFill>
+              </a:rPr>
+              <a:t>cost sensitivity</a:t>
+            </a:r>
+            <a:r>
+              <a:rPr lang="en-GB" dirty="0">
+                <a:solidFill>
+                  <a:schemeClr val="tx1"/>
+                </a:solidFill>
+              </a:rPr>
+              <a:t>. </a:t>
+            </a:r>
+            <a:r>
+              <a:rPr lang="en-GB" dirty="0" err="1">
+                <a:solidFill>
+                  <a:schemeClr val="tx1"/>
+                </a:solidFill>
+              </a:rPr>
+              <a:t>Tuttavia</a:t>
+            </a:r>
+            <a:r>
+              <a:rPr lang="en-GB" dirty="0">
+                <a:solidFill>
+                  <a:schemeClr val="tx1"/>
+                </a:solidFill>
+              </a:rPr>
+              <a:t>, </a:t>
+            </a:r>
+            <a:r>
+              <a:rPr lang="en-GB" dirty="0" err="1">
+                <a:solidFill>
+                  <a:schemeClr val="tx1"/>
+                </a:solidFill>
+              </a:rPr>
+              <a:t>questo</a:t>
+            </a:r>
+            <a:r>
+              <a:rPr lang="en-GB" dirty="0">
+                <a:solidFill>
+                  <a:schemeClr val="tx1"/>
+                </a:solidFill>
+              </a:rPr>
+              <a:t> secondo scenario </a:t>
+            </a:r>
+            <a:r>
+              <a:rPr lang="en-GB" dirty="0" err="1">
+                <a:solidFill>
+                  <a:schemeClr val="tx1"/>
+                </a:solidFill>
+              </a:rPr>
+              <a:t>evidenzia</a:t>
+            </a:r>
+            <a:r>
+              <a:rPr lang="en-GB" dirty="0">
+                <a:solidFill>
+                  <a:schemeClr val="tx1"/>
+                </a:solidFill>
+              </a:rPr>
+              <a:t> un </a:t>
+            </a:r>
+            <a:r>
+              <a:rPr lang="en-GB" dirty="0" err="1">
+                <a:solidFill>
+                  <a:schemeClr val="tx1"/>
+                </a:solidFill>
+              </a:rPr>
+              <a:t>valore</a:t>
+            </a:r>
+            <a:r>
+              <a:rPr lang="en-GB" dirty="0">
+                <a:solidFill>
+                  <a:schemeClr val="tx1"/>
+                </a:solidFill>
+              </a:rPr>
+              <a:t> </a:t>
+            </a:r>
+            <a:r>
+              <a:rPr lang="en-GB" dirty="0" err="1">
+                <a:solidFill>
+                  <a:schemeClr val="tx1"/>
+                </a:solidFill>
+              </a:rPr>
+              <a:t>mediano</a:t>
+            </a:r>
+            <a:r>
+              <a:rPr lang="en-GB" dirty="0">
+                <a:solidFill>
+                  <a:schemeClr val="tx1"/>
+                </a:solidFill>
+              </a:rPr>
+              <a:t> di AUC </a:t>
+            </a:r>
+            <a:r>
+              <a:rPr lang="en-GB" dirty="0" err="1">
+                <a:solidFill>
+                  <a:schemeClr val="tx1"/>
+                </a:solidFill>
+              </a:rPr>
+              <a:t>preferibile</a:t>
+            </a:r>
+            <a:r>
+              <a:rPr lang="en-GB" dirty="0">
+                <a:solidFill>
+                  <a:schemeClr val="tx1"/>
+                </a:solidFill>
+              </a:rPr>
+              <a:t> ed un Kappa </a:t>
+            </a:r>
+            <a:r>
+              <a:rPr lang="en-GB" dirty="0" err="1">
+                <a:solidFill>
+                  <a:schemeClr val="tx1"/>
+                </a:solidFill>
+              </a:rPr>
+              <a:t>leggeremente</a:t>
+            </a:r>
+            <a:r>
+              <a:rPr lang="en-GB" dirty="0">
+                <a:solidFill>
+                  <a:schemeClr val="tx1"/>
+                </a:solidFill>
+              </a:rPr>
+              <a:t> </a:t>
+            </a:r>
+            <a:r>
+              <a:rPr lang="en-GB" dirty="0" err="1">
+                <a:solidFill>
+                  <a:schemeClr val="tx1"/>
+                </a:solidFill>
+              </a:rPr>
+              <a:t>maggiore</a:t>
+            </a:r>
+            <a:r>
+              <a:rPr lang="en-GB" dirty="0">
+                <a:solidFill>
+                  <a:schemeClr val="tx1"/>
+                </a:solidFill>
+              </a:rPr>
+              <a:t>, </a:t>
+            </a:r>
+            <a:r>
+              <a:rPr lang="en-GB" dirty="0" err="1">
+                <a:solidFill>
+                  <a:schemeClr val="tx1"/>
+                </a:solidFill>
+              </a:rPr>
+              <a:t>pertanto</a:t>
+            </a:r>
+            <a:r>
+              <a:rPr lang="en-GB" dirty="0">
+                <a:solidFill>
+                  <a:schemeClr val="tx1"/>
+                </a:solidFill>
+              </a:rPr>
+              <a:t> è </a:t>
+            </a:r>
+            <a:r>
+              <a:rPr lang="en-GB" dirty="0" err="1">
+                <a:solidFill>
+                  <a:schemeClr val="tx1"/>
+                </a:solidFill>
+              </a:rPr>
+              <a:t>migliore</a:t>
+            </a:r>
+            <a:r>
+              <a:rPr lang="en-GB" dirty="0">
+                <a:solidFill>
+                  <a:schemeClr val="tx1"/>
+                </a:solidFill>
+              </a:rPr>
+              <a:t>.</a:t>
+            </a:r>
+          </a:p>
+          <a:p>
+            <a:pPr lvl="1">
+              <a:buFont typeface="Arial" panose="020B0604020202020204" pitchFamily="34" charset="0"/>
+              <a:buChar char="•"/>
+            </a:pPr>
+            <a:endParaRPr lang="en-GB" dirty="0">
+              <a:solidFill>
+                <a:schemeClr val="tx1"/>
+              </a:solidFill>
+            </a:endParaRPr>
+          </a:p>
+          <a:p>
+            <a:pPr lvl="1">
+              <a:buFont typeface="Arial" panose="020B0604020202020204" pitchFamily="34" charset="0"/>
+              <a:buChar char="•"/>
+            </a:pPr>
+            <a:r>
+              <a:rPr lang="en-GB" dirty="0">
+                <a:solidFill>
+                  <a:schemeClr val="tx1"/>
+                </a:solidFill>
+              </a:rPr>
+              <a:t>In </a:t>
+            </a:r>
+            <a:r>
+              <a:rPr lang="en-GB" dirty="0" err="1">
+                <a:solidFill>
+                  <a:schemeClr val="tx1"/>
+                </a:solidFill>
+              </a:rPr>
+              <a:t>conclusione</a:t>
+            </a:r>
+            <a:r>
+              <a:rPr lang="en-GB" dirty="0">
+                <a:solidFill>
+                  <a:schemeClr val="tx1"/>
+                </a:solidFill>
+              </a:rPr>
+              <a:t>, </a:t>
+            </a:r>
+            <a:r>
+              <a:rPr lang="en-GB" dirty="0" err="1">
+                <a:solidFill>
+                  <a:schemeClr val="tx1"/>
+                </a:solidFill>
+              </a:rPr>
+              <a:t>sia</a:t>
+            </a:r>
+            <a:r>
+              <a:rPr lang="en-GB" dirty="0">
+                <a:solidFill>
+                  <a:schemeClr val="tx1"/>
+                </a:solidFill>
+              </a:rPr>
+              <a:t> per </a:t>
+            </a:r>
+            <a:r>
+              <a:rPr lang="en-GB" i="1" dirty="0">
+                <a:solidFill>
+                  <a:schemeClr val="tx1"/>
+                </a:solidFill>
+              </a:rPr>
+              <a:t>Syncope</a:t>
+            </a:r>
+            <a:r>
+              <a:rPr lang="en-GB" dirty="0">
+                <a:solidFill>
+                  <a:schemeClr val="tx1"/>
+                </a:solidFill>
+              </a:rPr>
+              <a:t> </a:t>
+            </a:r>
+            <a:r>
+              <a:rPr lang="en-GB" dirty="0" err="1">
+                <a:solidFill>
+                  <a:schemeClr val="tx1"/>
+                </a:solidFill>
+              </a:rPr>
+              <a:t>che</a:t>
+            </a:r>
+            <a:r>
+              <a:rPr lang="en-GB" dirty="0">
+                <a:solidFill>
+                  <a:schemeClr val="tx1"/>
+                </a:solidFill>
+              </a:rPr>
+              <a:t> per </a:t>
+            </a:r>
+            <a:r>
+              <a:rPr lang="en-GB" i="1" dirty="0" err="1">
+                <a:solidFill>
+                  <a:schemeClr val="tx1"/>
+                </a:solidFill>
+              </a:rPr>
+              <a:t>BookKeeper</a:t>
+            </a:r>
+            <a:r>
+              <a:rPr lang="en-GB" dirty="0">
+                <a:solidFill>
+                  <a:schemeClr val="tx1"/>
+                </a:solidFill>
+              </a:rPr>
+              <a:t>, </a:t>
+            </a:r>
+            <a:r>
+              <a:rPr lang="en-GB" dirty="0" err="1">
+                <a:solidFill>
+                  <a:schemeClr val="tx1"/>
+                </a:solidFill>
+              </a:rPr>
+              <a:t>conviene</a:t>
+            </a:r>
+            <a:r>
+              <a:rPr lang="en-GB" dirty="0">
+                <a:solidFill>
+                  <a:schemeClr val="tx1"/>
+                </a:solidFill>
+              </a:rPr>
+              <a:t>, in </a:t>
+            </a:r>
+            <a:r>
+              <a:rPr lang="en-GB" dirty="0" err="1">
+                <a:solidFill>
+                  <a:schemeClr val="tx1"/>
+                </a:solidFill>
+              </a:rPr>
+              <a:t>generale</a:t>
+            </a:r>
+            <a:r>
+              <a:rPr lang="en-GB" dirty="0">
+                <a:solidFill>
+                  <a:schemeClr val="tx1"/>
+                </a:solidFill>
+              </a:rPr>
+              <a:t>, </a:t>
+            </a:r>
+            <a:r>
+              <a:rPr lang="en-GB" b="1" dirty="0">
+                <a:solidFill>
+                  <a:schemeClr val="tx1"/>
+                </a:solidFill>
+              </a:rPr>
+              <a:t>NON </a:t>
+            </a:r>
+            <a:r>
+              <a:rPr lang="en-GB" b="1" dirty="0" err="1">
+                <a:solidFill>
+                  <a:schemeClr val="tx1"/>
+                </a:solidFill>
+              </a:rPr>
+              <a:t>applicare</a:t>
+            </a:r>
+            <a:r>
+              <a:rPr lang="en-GB" b="1" dirty="0">
+                <a:solidFill>
+                  <a:schemeClr val="tx1"/>
+                </a:solidFill>
+              </a:rPr>
+              <a:t> alcuna </a:t>
+            </a:r>
+            <a:r>
+              <a:rPr lang="en-GB" b="1" dirty="0" err="1">
+                <a:solidFill>
+                  <a:schemeClr val="tx1"/>
+                </a:solidFill>
+              </a:rPr>
+              <a:t>tecnica</a:t>
+            </a:r>
+            <a:r>
+              <a:rPr lang="en-GB" b="1" dirty="0">
+                <a:solidFill>
+                  <a:schemeClr val="tx1"/>
+                </a:solidFill>
+              </a:rPr>
+              <a:t> di cost sensitivity,</a:t>
+            </a:r>
+            <a:r>
+              <a:rPr lang="en-GB" dirty="0">
+                <a:solidFill>
+                  <a:schemeClr val="tx1"/>
+                </a:solidFill>
+              </a:rPr>
+              <a:t> se </a:t>
+            </a:r>
+            <a:r>
+              <a:rPr lang="en-GB" dirty="0" err="1">
+                <a:solidFill>
+                  <a:schemeClr val="tx1"/>
+                </a:solidFill>
+              </a:rPr>
+              <a:t>si</a:t>
+            </a:r>
+            <a:r>
+              <a:rPr lang="en-GB" dirty="0">
+                <a:solidFill>
+                  <a:schemeClr val="tx1"/>
+                </a:solidFill>
+              </a:rPr>
+              <a:t> </a:t>
+            </a:r>
+            <a:r>
+              <a:rPr lang="en-GB" dirty="0" err="1">
+                <a:solidFill>
+                  <a:schemeClr val="tx1"/>
+                </a:solidFill>
+              </a:rPr>
+              <a:t>applica</a:t>
+            </a:r>
+            <a:r>
+              <a:rPr lang="en-GB" dirty="0">
+                <a:solidFill>
+                  <a:schemeClr val="tx1"/>
+                </a:solidFill>
+              </a:rPr>
+              <a:t> </a:t>
+            </a:r>
+            <a:r>
+              <a:rPr lang="en-GB" dirty="0" err="1">
+                <a:solidFill>
+                  <a:schemeClr val="tx1"/>
+                </a:solidFill>
+              </a:rPr>
+              <a:t>già</a:t>
+            </a:r>
+            <a:r>
+              <a:rPr lang="en-GB" dirty="0">
+                <a:solidFill>
+                  <a:schemeClr val="tx1"/>
+                </a:solidFill>
+              </a:rPr>
+              <a:t> </a:t>
+            </a:r>
+            <a:r>
+              <a:rPr lang="en-GB" i="1" dirty="0">
+                <a:solidFill>
+                  <a:schemeClr val="tx1"/>
+                </a:solidFill>
+              </a:rPr>
+              <a:t>feature selection </a:t>
+            </a:r>
+            <a:r>
+              <a:rPr lang="en-GB" dirty="0">
+                <a:solidFill>
+                  <a:schemeClr val="tx1"/>
+                </a:solidFill>
+              </a:rPr>
+              <a:t>di </a:t>
+            </a:r>
+            <a:r>
+              <a:rPr lang="en-GB" dirty="0" err="1">
+                <a:solidFill>
+                  <a:schemeClr val="tx1"/>
+                </a:solidFill>
+              </a:rPr>
+              <a:t>tipo</a:t>
+            </a:r>
+            <a:r>
+              <a:rPr lang="en-GB" dirty="0">
+                <a:solidFill>
+                  <a:schemeClr val="tx1"/>
+                </a:solidFill>
+              </a:rPr>
+              <a:t> </a:t>
+            </a:r>
+            <a:r>
+              <a:rPr lang="en-GB" i="1" dirty="0">
+                <a:solidFill>
+                  <a:schemeClr val="tx1"/>
+                </a:solidFill>
+              </a:rPr>
+              <a:t>Backward Search</a:t>
+            </a:r>
+            <a:r>
+              <a:rPr lang="en-GB" dirty="0">
+                <a:solidFill>
+                  <a:schemeClr val="tx1"/>
+                </a:solidFill>
+              </a:rPr>
+              <a:t> e </a:t>
+            </a:r>
+            <a:r>
+              <a:rPr lang="en-GB" dirty="0" err="1">
+                <a:solidFill>
+                  <a:schemeClr val="tx1"/>
+                </a:solidFill>
+              </a:rPr>
+              <a:t>bilanciamento</a:t>
+            </a:r>
+            <a:r>
+              <a:rPr lang="en-GB" dirty="0">
+                <a:solidFill>
+                  <a:schemeClr val="tx1"/>
+                </a:solidFill>
+              </a:rPr>
+              <a:t> di </a:t>
+            </a:r>
+            <a:r>
+              <a:rPr lang="en-GB" dirty="0" err="1">
+                <a:solidFill>
+                  <a:schemeClr val="tx1"/>
+                </a:solidFill>
+              </a:rPr>
+              <a:t>tipo</a:t>
+            </a:r>
+            <a:r>
+              <a:rPr lang="en-GB" dirty="0">
+                <a:solidFill>
+                  <a:schemeClr val="tx1"/>
+                </a:solidFill>
+              </a:rPr>
+              <a:t> </a:t>
+            </a:r>
+            <a:r>
+              <a:rPr lang="en-GB" i="1" dirty="0" err="1">
+                <a:solidFill>
+                  <a:schemeClr val="tx1"/>
+                </a:solidFill>
+              </a:rPr>
+              <a:t>Undersampling</a:t>
+            </a:r>
+            <a:r>
+              <a:rPr lang="en-GB" i="1" dirty="0">
+                <a:solidFill>
+                  <a:schemeClr val="tx1"/>
+                </a:solidFill>
+              </a:rPr>
+              <a:t>.</a:t>
+            </a:r>
+            <a:endParaRPr lang="en-GB" b="1" dirty="0">
               <a:solidFill>
                 <a:schemeClr val="tx1"/>
               </a:solidFill>
@@ -17476,7 +19022,28 @@
               <a:buFont typeface="Arial" panose="020B0604020202020204" pitchFamily="34" charset="0"/>
               <a:buChar char="•"/>
             </a:pPr>
-            <a:endParaRPr lang="en-GB" dirty="0">
+            <a:r>
+              <a:rPr lang="en-GB" dirty="0">
+                <a:solidFill>
+                  <a:schemeClr val="tx1"/>
+                </a:solidFill>
+              </a:rPr>
+              <a:t>Repository GitHub: </a:t>
+            </a:r>
+            <a:r>
+              <a:rPr lang="it-IT" dirty="0">
+                <a:hlinkClick r:id="rId2"/>
+              </a:rPr>
+              <a:t>https://github.com/AndreaPepe/MLforSE</a:t>
+            </a:r>
+            <a:endParaRPr lang="it-IT" dirty="0"/>
+          </a:p>
+          <a:p>
+            <a:pPr lvl="1">
+              <a:buFont typeface="Arial" panose="020B0604020202020204" pitchFamily="34" charset="0"/>
+              <a:buChar char="•"/>
+            </a:pPr>
+            <a:endParaRPr lang="it-IT" dirty="0">
               <a:solidFill>
                 <a:schemeClr val="tx1"/>
               </a:solidFill>
@@ -17487,56 +19054,7 @@
               <a:buFont typeface="Arial" panose="020B0604020202020204" pitchFamily="34" charset="0"/>
               <a:buChar char="•"/>
             </a:pPr>
-            <a:r>
-              <a:rPr lang="en-GB" dirty="0">
-                <a:solidFill>
-                  <a:schemeClr val="tx1"/>
-                </a:solidFill>
-              </a:rPr>
-              <a:t>Repository GitHub con </a:t>
-            </a:r>
-            <a:r>
-              <a:rPr lang="en-GB" dirty="0" err="1">
-                <a:solidFill>
-                  <a:schemeClr val="tx1"/>
-                </a:solidFill>
-              </a:rPr>
-              <a:t>codice</a:t>
-            </a:r>
-            <a:r>
-              <a:rPr lang="en-GB" dirty="0">
-                <a:solidFill>
-                  <a:schemeClr val="tx1"/>
-                </a:solidFill>
-              </a:rPr>
-              <a:t> </a:t>
-            </a:r>
-            <a:r>
-              <a:rPr lang="en-GB" dirty="0" err="1">
-                <a:solidFill>
-                  <a:schemeClr val="tx1"/>
-                </a:solidFill>
-              </a:rPr>
-              <a:t>sorgente</a:t>
-            </a:r>
-            <a:r>
-              <a:rPr lang="en-GB" dirty="0">
-                <a:solidFill>
-                  <a:schemeClr val="tx1"/>
-                </a:solidFill>
-              </a:rPr>
-              <a:t>:  </a:t>
-            </a:r>
-            <a:r>
-              <a:rPr lang="en-GB" dirty="0">
-                <a:solidFill>
-                  <a:schemeClr val="tx1"/>
-                </a:solidFill>
-                <a:hlinkClick r:id="rId2"/>
-              </a:rPr>
-              <a:t>https://github.com/AndreaPepe/MLforSE</a:t>
-            </a:r>
-            <a:endParaRPr lang="en-GB" dirty="0">
+            <a:endParaRPr lang="it-IT" dirty="0">
               <a:solidFill>
                 <a:schemeClr val="tx1"/>
               </a:solidFill>
@@ -17547,7 +19065,7 @@
               <a:buFont typeface="Arial" panose="020B0604020202020204" pitchFamily="34" charset="0"/>
               <a:buChar char="•"/>
             </a:pPr>
-            <a:endParaRPr lang="en-GB" dirty="0">
+            <a:endParaRPr lang="it-IT" dirty="0">
               <a:solidFill>
                 <a:schemeClr val="tx1"/>
               </a:solidFill>
@@ -17558,19 +19076,8 @@
               <a:buFont typeface="Arial" panose="020B0604020202020204" pitchFamily="34" charset="0"/>
               <a:buChar char="•"/>
             </a:pPr>
-            <a:endParaRPr lang="en-GB" dirty="0">
-              <a:solidFill>
-                <a:schemeClr val="tx1"/>
-              </a:solidFill>
-            </a:endParaRPr>
-          </a:p>
-          <a:p>
-            <a:pPr lvl="1">
-              <a:buFont typeface="Arial" panose="020B0604020202020204" pitchFamily="34" charset="0"/>
-              <a:buChar char="•"/>
-            </a:pPr>
-            <a:r>
-              <a:rPr lang="en-GB" dirty="0" err="1">
+            <a:r>
+              <a:rPr lang="it-IT" dirty="0" err="1">
                 <a:solidFill>
                   <a:schemeClr val="tx1"/>
                 </a:solidFill>
@@ -17578,7 +19085,7 @@
               <a:t>SonarCloud</a:t>
             </a:r>
             <a:r>
-              <a:rPr lang="en-GB" dirty="0">
+              <a:rPr lang="it-IT" dirty="0">
                 <a:solidFill>
                   <a:schemeClr val="tx1"/>
                 </a:solidFill>
@@ -17586,10 +19093,7 @@
               <a:t>: </a:t>
             </a:r>
             <a:r>
-              <a:rPr lang="en-GB" dirty="0">
-                <a:solidFill>
-                  <a:schemeClr val="tx1"/>
-                </a:solidFill>
+              <a:rPr lang="it-IT" dirty="0">
                 <a:hlinkClick r:id="rId3"/>
               </a:rPr>
               <a:t>https://sonarcloud.io/summary/overall?id=AndreaPepe_SyncopeDataMining</a:t>
@@ -17670,7 +19174,7 @@
     </p:spTree>
     <p:extLst>
       <p:ext uri="{BB962C8B-B14F-4D97-AF65-F5344CB8AC3E}">
-        <p14:creationId xmlns:p14="http://schemas.microsoft.com/office/powerpoint/2010/main" val="1351500140"/>
+        <p14:creationId xmlns:p14="http://schemas.microsoft.com/office/powerpoint/2010/main" val="3280712215"/>
       </p:ext>
     </p:extLst>
   </p:cSld>

</xml_diff>

<commit_message>
Slides finished. Ready for delivery
</commit_message>
<xml_diff>
--- a/ML/Slides/MLforSE_AndreaPepe_0315903.pptx
+++ b/ML/Slides/MLforSE_AndreaPepe_0315903.pptx
@@ -221,7 +221,7 @@
           <a:p>
             <a:fld id="{97065540-07A0-4C6F-8DCB-73C0680980AD}" type="datetimeFigureOut">
               <a:rPr lang="en-GB" smtClean="0"/>
-              <a:t>01/07/2022</a:t>
+              <a:t>07/07/2022</a:t>
             </a:fld>
             <a:endParaRPr lang="en-GB"/>
           </a:p>
@@ -715,7 +715,7 @@
           <a:p>
             <a:fld id="{36675484-4142-4B7C-84B9-F01C655597FE}" type="datetime1">
               <a:rPr lang="en-GB" smtClean="0"/>
-              <a:t>01/07/2022</a:t>
+              <a:t>07/07/2022</a:t>
             </a:fld>
             <a:endParaRPr lang="en-GB"/>
           </a:p>
@@ -926,7 +926,7 @@
           <a:p>
             <a:fld id="{083C5A5D-FF99-4177-869B-DA343F422A01}" type="datetime1">
               <a:rPr lang="en-GB" smtClean="0"/>
-              <a:t>01/07/2022</a:t>
+              <a:t>07/07/2022</a:t>
             </a:fld>
             <a:endParaRPr lang="en-GB"/>
           </a:p>
@@ -1185,7 +1185,7 @@
           <a:p>
             <a:fld id="{092B45E3-D0D0-4AAE-9720-9E63567A47F3}" type="datetime1">
               <a:rPr lang="en-GB" smtClean="0"/>
-              <a:t>01/07/2022</a:t>
+              <a:t>07/07/2022</a:t>
             </a:fld>
             <a:endParaRPr lang="en-GB"/>
           </a:p>
@@ -1362,7 +1362,7 @@
           <a:p>
             <a:fld id="{0C1C7B71-B0D6-4D5D-BBBB-43567A72C6E5}" type="datetime1">
               <a:rPr lang="en-GB" smtClean="0"/>
-              <a:t>01/07/2022</a:t>
+              <a:t>07/07/2022</a:t>
             </a:fld>
             <a:endParaRPr lang="en-GB"/>
           </a:p>
@@ -1746,7 +1746,7 @@
           <a:p>
             <a:fld id="{C935CB07-C061-473A-A75F-B2F9AE8216F8}" type="datetime1">
               <a:rPr lang="en-GB" smtClean="0"/>
-              <a:t>01/07/2022</a:t>
+              <a:t>07/07/2022</a:t>
             </a:fld>
             <a:endParaRPr lang="en-GB"/>
           </a:p>
@@ -2024,7 +2024,7 @@
           <a:p>
             <a:fld id="{391B62BF-7985-4FDD-BC5F-23B7B3D0F313}" type="datetime1">
               <a:rPr lang="en-GB" smtClean="0"/>
-              <a:t>01/07/2022</a:t>
+              <a:t>07/07/2022</a:t>
             </a:fld>
             <a:endParaRPr lang="en-GB"/>
           </a:p>
@@ -2406,7 +2406,7 @@
           <a:p>
             <a:fld id="{64D75D9B-AAEB-48B3-99F3-2419C903C6D0}" type="datetime1">
               <a:rPr lang="en-GB" smtClean="0"/>
-              <a:t>01/07/2022</a:t>
+              <a:t>07/07/2022</a:t>
             </a:fld>
             <a:endParaRPr lang="en-GB"/>
           </a:p>
@@ -2527,7 +2527,7 @@
           <a:p>
             <a:fld id="{D4AA4976-D0F0-4CBE-AC66-43EB7632E6CE}" type="datetime1">
               <a:rPr lang="en-GB" smtClean="0"/>
-              <a:t>01/07/2022</a:t>
+              <a:t>07/07/2022</a:t>
             </a:fld>
             <a:endParaRPr lang="en-GB"/>
           </a:p>
@@ -2701,7 +2701,7 @@
           <a:p>
             <a:fld id="{75CC64E9-6628-44E0-9812-4A7D096FE556}" type="datetime1">
               <a:rPr lang="en-GB" smtClean="0"/>
-              <a:t>01/07/2022</a:t>
+              <a:t>07/07/2022</a:t>
             </a:fld>
             <a:endParaRPr lang="en-GB"/>
           </a:p>
@@ -3058,7 +3058,7 @@
           <a:p>
             <a:fld id="{C7C6A9E6-4737-40F4-BDF7-16F45B54A2C3}" type="datetime1">
               <a:rPr lang="en-GB" smtClean="0"/>
-              <a:t>01/07/2022</a:t>
+              <a:t>07/07/2022</a:t>
             </a:fld>
             <a:endParaRPr lang="en-GB"/>
           </a:p>
@@ -3443,7 +3443,7 @@
           <a:p>
             <a:fld id="{2187E6E7-BC76-4247-89A8-AACF9F7A52F2}" type="datetime1">
               <a:rPr lang="en-GB" smtClean="0"/>
-              <a:t>01/07/2022</a:t>
+              <a:t>07/07/2022</a:t>
             </a:fld>
             <a:endParaRPr lang="en-GB"/>
           </a:p>
@@ -3743,7 +3743,7 @@
           <a:p>
             <a:fld id="{4A967235-3FFC-4E0D-8871-192108DDF2C6}" type="datetime1">
               <a:rPr lang="en-GB" smtClean="0"/>
-              <a:t>01/07/2022</a:t>
+              <a:t>07/07/2022</a:t>
             </a:fld>
             <a:endParaRPr lang="en-GB"/>
           </a:p>
@@ -4975,7 +4975,7 @@
                   <a:schemeClr val="tx1"/>
                 </a:solidFill>
               </a:rPr>
-              <a:t>influenzati</a:t>
+              <a:t>influenzate</a:t>
             </a:r>
             <a:r>
               <a:rPr lang="en-GB" dirty="0">
@@ -5321,10 +5321,10 @@
       </p:sp>
       <p:grpSp>
         <p:nvGrpSpPr>
-          <p:cNvPr id="21" name="Gruppo 20">
+          <p:cNvPr id="8" name="Gruppo 7">
             <a:extLst>
               <a:ext uri="{FF2B5EF4-FFF2-40B4-BE49-F238E27FC236}">
-                <a16:creationId xmlns:a16="http://schemas.microsoft.com/office/drawing/2014/main" id="{F7B92EC0-6B5F-0CF4-9583-058B1E421A5B}"/>
+                <a16:creationId xmlns:a16="http://schemas.microsoft.com/office/drawing/2014/main" id="{0A9E59AD-322F-4A79-E0B5-560399481CCF}"/>
               </a:ext>
             </a:extLst>
           </p:cNvPr>
@@ -5333,10 +5333,10 @@
         </p:nvGrpSpPr>
         <p:grpSpPr>
           <a:xfrm>
-            <a:off x="4119749" y="3359894"/>
-            <a:ext cx="3284593" cy="2678984"/>
-            <a:chOff x="4181777" y="3251680"/>
-            <a:chExt cx="3995981" cy="3459101"/>
+            <a:off x="3961947" y="3195520"/>
+            <a:ext cx="3296091" cy="2702496"/>
+            <a:chOff x="4108251" y="3336382"/>
+            <a:chExt cx="3296091" cy="2702496"/>
           </a:xfrm>
         </p:grpSpPr>
         <p:graphicFrame>
@@ -5354,14 +5354,14 @@
             <p:nvPr>
               <p:extLst>
                 <p:ext uri="{D42A27DB-BD31-4B8C-83A1-F6EECF244321}">
-                  <p14:modId xmlns:p14="http://schemas.microsoft.com/office/powerpoint/2010/main" val="246016778"/>
+                  <p14:modId xmlns:p14="http://schemas.microsoft.com/office/powerpoint/2010/main" val="2058895151"/>
                 </p:ext>
               </p:extLst>
             </p:nvPr>
           </p:nvGraphicFramePr>
           <p:xfrm>
-            <a:off x="4643442" y="3629025"/>
-            <a:ext cx="3534316" cy="3081756"/>
+            <a:off x="4499226" y="3652138"/>
+            <a:ext cx="2905116" cy="2386740"/>
           </p:xfrm>
           <a:graphic>
             <a:graphicData uri="http://schemas.openxmlformats.org/drawingml/2006/table">
@@ -7330,8 +7330,8 @@
           </p:nvSpPr>
           <p:spPr>
             <a:xfrm>
-              <a:off x="5124451" y="3251680"/>
-              <a:ext cx="2424107" cy="369332"/>
+              <a:off x="5164049" y="3336382"/>
+              <a:ext cx="1992553" cy="286038"/>
             </a:xfrm>
             <a:prstGeom prst="rect">
               <a:avLst/>
@@ -7368,8 +7368,8 @@
           </p:nvSpPr>
           <p:spPr>
             <a:xfrm>
-              <a:off x="4181777" y="4020224"/>
-              <a:ext cx="461665" cy="1973675"/>
+              <a:off x="4108251" y="4288219"/>
+              <a:ext cx="379477" cy="1528560"/>
             </a:xfrm>
             <a:prstGeom prst="rect">
               <a:avLst/>
@@ -8218,23 +8218,23 @@
                   <a:schemeClr val="tx1"/>
                 </a:solidFill>
               </a:rPr>
-              <a:t> di feature selection e sampling, </a:t>
-            </a:r>
-            <a:r>
-              <a:rPr lang="en-GB" dirty="0" err="1">
-                <a:solidFill>
-                  <a:schemeClr val="tx1"/>
-                </a:solidFill>
-              </a:rPr>
-              <a:t>mentre</a:t>
-            </a:r>
-            <a:r>
-              <a:rPr lang="en-GB" dirty="0">
-                <a:solidFill>
-                  <a:schemeClr val="tx1"/>
-                </a:solidFill>
-              </a:rPr>
-              <a:t> </a:t>
+              <a:t> di feature selection e sampling. </a:t>
+            </a:r>
+            <a:r>
+              <a:rPr lang="en-GB" dirty="0" err="1">
+                <a:solidFill>
+                  <a:schemeClr val="tx1"/>
+                </a:solidFill>
+              </a:rPr>
+              <a:t>Invece</a:t>
+            </a:r>
+            <a:r>
+              <a:rPr lang="en-GB" dirty="0">
+                <a:solidFill>
+                  <a:schemeClr val="tx1"/>
+                </a:solidFill>
+              </a:rPr>
+              <a:t>, </a:t>
             </a:r>
             <a:r>
               <a:rPr lang="en-GB" dirty="0" err="1">
@@ -12760,20 +12760,12 @@
               <a:t>pochi</a:t>
             </a:r>
             <a:r>
-              <a:rPr lang="en-GB">
-                <a:solidFill>
-                  <a:schemeClr val="tx1"/>
-                </a:solidFill>
-              </a:rPr>
-              <a:t> sample points</a:t>
-            </a:r>
-            <a:r>
-              <a:rPr lang="en-GB" dirty="0">
-                <a:solidFill>
-                  <a:schemeClr val="tx1"/>
-                </a:solidFill>
-              </a:rPr>
-              <a:t>.</a:t>
+              <a:rPr lang="en-GB" dirty="0">
+                <a:solidFill>
+                  <a:schemeClr val="tx1"/>
+                </a:solidFill>
+              </a:rPr>
+              <a:t> sample points.</a:t>
             </a:r>
             <a:endParaRPr lang="en-GB" b="1" dirty="0">
               <a:solidFill>
@@ -13676,39 +13668,23 @@
                   <a:schemeClr val="tx1"/>
                 </a:solidFill>
               </a:rPr>
-              <a:t> ha un </a:t>
-            </a:r>
-            <a:r>
-              <a:rPr lang="en-GB" dirty="0" err="1">
-                <a:solidFill>
-                  <a:schemeClr val="tx1"/>
-                </a:solidFill>
-              </a:rPr>
-              <a:t>valore</a:t>
-            </a:r>
-            <a:r>
-              <a:rPr lang="en-GB" dirty="0">
-                <a:solidFill>
-                  <a:schemeClr val="tx1"/>
-                </a:solidFill>
-              </a:rPr>
-              <a:t> </a:t>
-            </a:r>
-            <a:r>
-              <a:rPr lang="en-GB" dirty="0" err="1">
-                <a:solidFill>
-                  <a:schemeClr val="tx1"/>
-                </a:solidFill>
-              </a:rPr>
-              <a:t>mediano</a:t>
-            </a:r>
-            <a:r>
-              <a:rPr lang="en-GB" dirty="0">
-                <a:solidFill>
-                  <a:schemeClr val="tx1"/>
-                </a:solidFill>
-              </a:rPr>
-              <a:t> di Kappa </a:t>
+              <a:t> ha un Kappa </a:t>
+            </a:r>
+            <a:r>
+              <a:rPr lang="en-GB" dirty="0" err="1">
+                <a:solidFill>
+                  <a:schemeClr val="tx1"/>
+                </a:solidFill>
+              </a:rPr>
+              <a:t>nettamente</a:t>
+            </a:r>
+            <a:r>
+              <a:rPr lang="en-GB" dirty="0">
+                <a:solidFill>
+                  <a:schemeClr val="tx1"/>
+                </a:solidFill>
+              </a:rPr>
+              <a:t> </a:t>
             </a:r>
             <a:r>
               <a:rPr lang="en-GB" dirty="0" err="1">
@@ -13720,6 +13696,94 @@
             </a:r>
             <a:r>
               <a:rPr lang="en-GB" dirty="0">
+                <a:solidFill>
+                  <a:schemeClr val="tx1"/>
+                </a:solidFill>
+              </a:rPr>
+              <a:t>. </a:t>
+            </a:r>
+            <a:r>
+              <a:rPr lang="en-GB" i="1" dirty="0">
+                <a:solidFill>
+                  <a:schemeClr val="tx1"/>
+                </a:solidFill>
+              </a:rPr>
+              <a:t>IBK </a:t>
+            </a:r>
+            <a:r>
+              <a:rPr lang="en-GB" dirty="0">
+                <a:solidFill>
+                  <a:schemeClr val="tx1"/>
+                </a:solidFill>
+              </a:rPr>
+              <a:t>è </a:t>
+            </a:r>
+            <a:r>
+              <a:rPr lang="en-GB" dirty="0" err="1">
+                <a:solidFill>
+                  <a:schemeClr val="tx1"/>
+                </a:solidFill>
+              </a:rPr>
+              <a:t>indicato</a:t>
+            </a:r>
+            <a:r>
+              <a:rPr lang="en-GB" dirty="0">
+                <a:solidFill>
+                  <a:schemeClr val="tx1"/>
+                </a:solidFill>
+              </a:rPr>
+              <a:t> se il </a:t>
+            </a:r>
+            <a:r>
+              <a:rPr lang="en-GB" dirty="0" err="1">
+                <a:solidFill>
+                  <a:schemeClr val="tx1"/>
+                </a:solidFill>
+              </a:rPr>
+              <a:t>requisito</a:t>
+            </a:r>
+            <a:r>
+              <a:rPr lang="en-GB" dirty="0">
+                <a:solidFill>
+                  <a:schemeClr val="tx1"/>
+                </a:solidFill>
+              </a:rPr>
+              <a:t> </a:t>
+            </a:r>
+            <a:r>
+              <a:rPr lang="en-GB" dirty="0" err="1">
+                <a:solidFill>
+                  <a:schemeClr val="tx1"/>
+                </a:solidFill>
+              </a:rPr>
+              <a:t>principale</a:t>
+            </a:r>
+            <a:r>
+              <a:rPr lang="en-GB" dirty="0">
+                <a:solidFill>
+                  <a:schemeClr val="tx1"/>
+                </a:solidFill>
+              </a:rPr>
+              <a:t> è </a:t>
+            </a:r>
+            <a:r>
+              <a:rPr lang="en-GB" dirty="0" err="1">
+                <a:solidFill>
+                  <a:schemeClr val="tx1"/>
+                </a:solidFill>
+              </a:rPr>
+              <a:t>un’alta</a:t>
+            </a:r>
+            <a:r>
+              <a:rPr lang="en-GB" dirty="0">
+                <a:solidFill>
+                  <a:schemeClr val="tx1"/>
+                </a:solidFill>
+              </a:rPr>
+              <a:t> Recall</a:t>
+            </a:r>
+            <a:r>
+              <a:rPr lang="en-GB" i="1" dirty="0">
                 <a:solidFill>
                   <a:schemeClr val="tx1"/>
                 </a:solidFill>
@@ -14085,31 +14149,111 @@
                   <a:schemeClr val="tx1"/>
                 </a:solidFill>
               </a:rPr>
-              <a:t>migliore</a:t>
-            </a:r>
-            <a:r>
-              <a:rPr lang="en-GB" dirty="0">
-                <a:solidFill>
-                  <a:schemeClr val="tx1"/>
-                </a:solidFill>
-              </a:rPr>
-              <a:t> è senza </a:t>
-            </a:r>
-            <a:r>
-              <a:rPr lang="en-GB" dirty="0" err="1">
-                <a:solidFill>
-                  <a:schemeClr val="tx1"/>
-                </a:solidFill>
-              </a:rPr>
-              <a:t>dubbio</a:t>
-            </a:r>
-            <a:r>
-              <a:rPr lang="en-GB" dirty="0">
-                <a:solidFill>
-                  <a:schemeClr val="tx1"/>
-                </a:solidFill>
-              </a:rPr>
-              <a:t> </a:t>
+              <a:t>che</a:t>
+            </a:r>
+            <a:r>
+              <a:rPr lang="en-GB" dirty="0">
+                <a:solidFill>
+                  <a:schemeClr val="tx1"/>
+                </a:solidFill>
+              </a:rPr>
+              <a:t> </a:t>
+            </a:r>
+            <a:r>
+              <a:rPr lang="en-GB" dirty="0" err="1">
+                <a:solidFill>
+                  <a:schemeClr val="tx1"/>
+                </a:solidFill>
+              </a:rPr>
+              <a:t>rappresenta</a:t>
+            </a:r>
+            <a:r>
+              <a:rPr lang="en-GB" dirty="0">
+                <a:solidFill>
+                  <a:schemeClr val="tx1"/>
+                </a:solidFill>
+              </a:rPr>
+              <a:t> il </a:t>
+            </a:r>
+            <a:r>
+              <a:rPr lang="en-GB" dirty="0" err="1">
+                <a:solidFill>
+                  <a:schemeClr val="tx1"/>
+                </a:solidFill>
+              </a:rPr>
+              <a:t>miglior</a:t>
+            </a:r>
+            <a:r>
+              <a:rPr lang="en-GB" dirty="0">
+                <a:solidFill>
+                  <a:schemeClr val="tx1"/>
+                </a:solidFill>
+              </a:rPr>
+              <a:t> </a:t>
+            </a:r>
+            <a:r>
+              <a:rPr lang="en-GB" dirty="0" err="1">
+                <a:solidFill>
+                  <a:schemeClr val="tx1"/>
+                </a:solidFill>
+              </a:rPr>
+              <a:t>compromesso</a:t>
+            </a:r>
+            <a:r>
+              <a:rPr lang="en-GB" dirty="0">
+                <a:solidFill>
+                  <a:schemeClr val="tx1"/>
+                </a:solidFill>
+              </a:rPr>
+              <a:t> </a:t>
+            </a:r>
+            <a:r>
+              <a:rPr lang="en-GB" dirty="0" err="1">
+                <a:solidFill>
+                  <a:schemeClr val="tx1"/>
+                </a:solidFill>
+              </a:rPr>
+              <a:t>tra</a:t>
+            </a:r>
+            <a:r>
+              <a:rPr lang="en-GB" dirty="0">
+                <a:solidFill>
+                  <a:schemeClr val="tx1"/>
+                </a:solidFill>
+              </a:rPr>
+              <a:t> le </a:t>
+            </a:r>
+            <a:r>
+              <a:rPr lang="en-GB" dirty="0" err="1">
+                <a:solidFill>
+                  <a:schemeClr val="tx1"/>
+                </a:solidFill>
+              </a:rPr>
+              <a:t>varie</a:t>
+            </a:r>
+            <a:r>
+              <a:rPr lang="en-GB" dirty="0">
+                <a:solidFill>
+                  <a:schemeClr val="tx1"/>
+                </a:solidFill>
+              </a:rPr>
+              <a:t> </a:t>
+            </a:r>
+            <a:r>
+              <a:rPr lang="en-GB" dirty="0" err="1">
+                <a:solidFill>
+                  <a:schemeClr val="tx1"/>
+                </a:solidFill>
+              </a:rPr>
+              <a:t>metriche</a:t>
+            </a:r>
+            <a:r>
+              <a:rPr lang="en-GB" dirty="0">
+                <a:solidFill>
+                  <a:schemeClr val="tx1"/>
+                </a:solidFill>
+              </a:rPr>
+              <a:t> è </a:t>
             </a:r>
             <a:r>
               <a:rPr lang="en-GB" b="1" dirty="0">
@@ -15635,7 +15779,7 @@
                   <a:schemeClr val="tx1"/>
                 </a:solidFill>
               </a:rPr>
-              <a:t> coincide, ma a </a:t>
+              <a:t> coincide, ma, a </a:t>
             </a:r>
             <a:r>
               <a:rPr lang="en-GB" dirty="0" err="1">
@@ -16397,6 +16541,22 @@
                   <a:schemeClr val="tx1"/>
                 </a:solidFill>
               </a:rPr>
+              <a:t>generale</a:t>
+            </a:r>
+            <a:r>
+              <a:rPr lang="en-GB" dirty="0">
+                <a:solidFill>
+                  <a:schemeClr val="tx1"/>
+                </a:solidFill>
+              </a:rPr>
+              <a:t> </a:t>
+            </a:r>
+            <a:r>
+              <a:rPr lang="en-GB" dirty="0" err="1">
+                <a:solidFill>
+                  <a:schemeClr val="tx1"/>
+                </a:solidFill>
+              </a:rPr>
               <a:t>della</a:t>
             </a:r>
             <a:r>
@@ -16800,7 +16960,7 @@
               <a:t>tre</a:t>
             </a:r>
             <a:r>
-              <a:rPr lang="en-GB">
+              <a:rPr lang="en-GB" dirty="0">
                 <a:solidFill>
                   <a:schemeClr val="tx1"/>
                 </a:solidFill>
@@ -16961,7 +17121,39 @@
                   <a:schemeClr val="tx1"/>
                 </a:solidFill>
               </a:rPr>
-              <a:t> – cost sensitivity con Naive Bayes</a:t>
+              <a:t> – </a:t>
+            </a:r>
+            <a:r>
+              <a:rPr lang="en-GB" sz="2800" dirty="0" err="1">
+                <a:solidFill>
+                  <a:schemeClr val="tx1"/>
+                </a:solidFill>
+              </a:rPr>
+              <a:t>effetti</a:t>
+            </a:r>
+            <a:r>
+              <a:rPr lang="en-GB" sz="2800" dirty="0">
+                <a:solidFill>
+                  <a:schemeClr val="tx1"/>
+                </a:solidFill>
+              </a:rPr>
+              <a:t> di cost sensitivity </a:t>
+            </a:r>
+            <a:r>
+              <a:rPr lang="en-GB" sz="2800" dirty="0" err="1">
+                <a:solidFill>
+                  <a:schemeClr val="tx1"/>
+                </a:solidFill>
+              </a:rPr>
+              <a:t>su</a:t>
+            </a:r>
+            <a:r>
+              <a:rPr lang="en-GB" sz="2800" dirty="0">
+                <a:solidFill>
+                  <a:schemeClr val="tx1"/>
+                </a:solidFill>
+              </a:rPr>
+              <a:t> Naive Bayes</a:t>
             </a:r>
             <a:endParaRPr lang="en-GB" dirty="0">
               <a:solidFill>
@@ -17144,7 +17336,39 @@
                   <a:schemeClr val="tx1"/>
                 </a:solidFill>
               </a:rPr>
-              <a:t>Syncope – cost sensitivity con Naive Bayes</a:t>
+              <a:t>Syncope – </a:t>
+            </a:r>
+            <a:r>
+              <a:rPr lang="en-GB" sz="2800" dirty="0" err="1">
+                <a:solidFill>
+                  <a:schemeClr val="tx1"/>
+                </a:solidFill>
+              </a:rPr>
+              <a:t>effetti</a:t>
+            </a:r>
+            <a:r>
+              <a:rPr lang="en-GB" sz="2800" dirty="0">
+                <a:solidFill>
+                  <a:schemeClr val="tx1"/>
+                </a:solidFill>
+              </a:rPr>
+              <a:t> di cost sensitivity </a:t>
+            </a:r>
+            <a:r>
+              <a:rPr lang="en-GB" sz="2800" dirty="0" err="1">
+                <a:solidFill>
+                  <a:schemeClr val="tx1"/>
+                </a:solidFill>
+              </a:rPr>
+              <a:t>su</a:t>
+            </a:r>
+            <a:r>
+              <a:rPr lang="en-GB" sz="2800" dirty="0">
+                <a:solidFill>
+                  <a:schemeClr val="tx1"/>
+                </a:solidFill>
+              </a:rPr>
+              <a:t> Naive Bayes</a:t>
             </a:r>
           </a:p>
         </p:txBody>
@@ -17350,7 +17574,9 @@
         </p:nvSpPr>
         <p:spPr/>
         <p:txBody>
-          <a:bodyPr/>
+          <a:bodyPr>
+            <a:normAutofit lnSpcReduction="10000"/>
+          </a:bodyPr>
           <a:lstStyle/>
           <a:p>
             <a:pPr lvl="1">
@@ -17876,7 +18102,23 @@
                   <a:schemeClr val="tx1"/>
                 </a:solidFill>
               </a:rPr>
-              <a:t> un AUC </a:t>
+              <a:t> un AUC ed </a:t>
+            </a:r>
+            <a:r>
+              <a:rPr lang="en-GB" dirty="0" err="1">
+                <a:solidFill>
+                  <a:schemeClr val="tx1"/>
+                </a:solidFill>
+              </a:rPr>
+              <a:t>una</a:t>
+            </a:r>
+            <a:r>
+              <a:rPr lang="en-GB" dirty="0">
+                <a:solidFill>
+                  <a:schemeClr val="tx1"/>
+                </a:solidFill>
+              </a:rPr>
+              <a:t> Recall </a:t>
             </a:r>
             <a:r>
               <a:rPr lang="en-GB" dirty="0" err="1">
@@ -17892,7 +18134,215 @@
                   <a:schemeClr val="tx1"/>
                 </a:solidFill>
               </a:rPr>
-              <a:t>.</a:t>
+              <a:t>. </a:t>
+            </a:r>
+            <a:r>
+              <a:rPr lang="en-GB" dirty="0" err="1">
+                <a:solidFill>
+                  <a:schemeClr val="tx1"/>
+                </a:solidFill>
+              </a:rPr>
+              <a:t>Tuttavia</a:t>
+            </a:r>
+            <a:r>
+              <a:rPr lang="en-GB" dirty="0">
+                <a:solidFill>
+                  <a:schemeClr val="tx1"/>
+                </a:solidFill>
+              </a:rPr>
+              <a:t>, </a:t>
+            </a:r>
+            <a:r>
+              <a:rPr lang="en-GB" dirty="0" err="1">
+                <a:solidFill>
+                  <a:schemeClr val="tx1"/>
+                </a:solidFill>
+              </a:rPr>
+              <a:t>nel</a:t>
+            </a:r>
+            <a:r>
+              <a:rPr lang="en-GB" dirty="0">
+                <a:solidFill>
+                  <a:schemeClr val="tx1"/>
+                </a:solidFill>
+              </a:rPr>
+              <a:t> </a:t>
+            </a:r>
+            <a:r>
+              <a:rPr lang="en-GB" dirty="0" err="1">
+                <a:solidFill>
+                  <a:schemeClr val="tx1"/>
+                </a:solidFill>
+              </a:rPr>
+              <a:t>contesto</a:t>
+            </a:r>
+            <a:r>
+              <a:rPr lang="en-GB" dirty="0">
+                <a:solidFill>
+                  <a:schemeClr val="tx1"/>
+                </a:solidFill>
+              </a:rPr>
+              <a:t> del </a:t>
+            </a:r>
+            <a:r>
+              <a:rPr lang="en-GB" dirty="0" err="1">
+                <a:solidFill>
+                  <a:schemeClr val="tx1"/>
+                </a:solidFill>
+              </a:rPr>
+              <a:t>caso</a:t>
+            </a:r>
+            <a:r>
+              <a:rPr lang="en-GB" dirty="0">
+                <a:solidFill>
+                  <a:schemeClr val="tx1"/>
+                </a:solidFill>
+              </a:rPr>
+              <a:t> di studio, </a:t>
+            </a:r>
+            <a:r>
+              <a:rPr lang="en-GB" dirty="0" err="1">
+                <a:solidFill>
+                  <a:schemeClr val="tx1"/>
+                </a:solidFill>
+              </a:rPr>
+              <a:t>avere</a:t>
+            </a:r>
+            <a:r>
+              <a:rPr lang="en-GB" dirty="0">
+                <a:solidFill>
+                  <a:schemeClr val="tx1"/>
+                </a:solidFill>
+              </a:rPr>
+              <a:t> </a:t>
+            </a:r>
+            <a:r>
+              <a:rPr lang="en-GB" dirty="0" err="1">
+                <a:solidFill>
+                  <a:schemeClr val="tx1"/>
+                </a:solidFill>
+              </a:rPr>
+              <a:t>una</a:t>
+            </a:r>
+            <a:r>
+              <a:rPr lang="en-GB" dirty="0">
+                <a:solidFill>
+                  <a:schemeClr val="tx1"/>
+                </a:solidFill>
+              </a:rPr>
+              <a:t> Recall </a:t>
+            </a:r>
+            <a:r>
+              <a:rPr lang="en-GB" dirty="0" err="1">
+                <a:solidFill>
+                  <a:schemeClr val="tx1"/>
+                </a:solidFill>
+              </a:rPr>
+              <a:t>alta</a:t>
+            </a:r>
+            <a:r>
+              <a:rPr lang="en-GB" dirty="0">
+                <a:solidFill>
+                  <a:schemeClr val="tx1"/>
+                </a:solidFill>
+              </a:rPr>
+              <a:t> è </a:t>
+            </a:r>
+            <a:r>
+              <a:rPr lang="en-GB" dirty="0" err="1">
+                <a:solidFill>
+                  <a:schemeClr val="tx1"/>
+                </a:solidFill>
+              </a:rPr>
+              <a:t>importante</a:t>
+            </a:r>
+            <a:r>
+              <a:rPr lang="en-GB" dirty="0">
+                <a:solidFill>
+                  <a:schemeClr val="tx1"/>
+                </a:solidFill>
+              </a:rPr>
+              <a:t>; </a:t>
+            </a:r>
+            <a:r>
+              <a:rPr lang="en-GB" dirty="0" err="1">
+                <a:solidFill>
+                  <a:schemeClr val="tx1"/>
+                </a:solidFill>
+              </a:rPr>
+              <a:t>quindi</a:t>
+            </a:r>
+            <a:r>
+              <a:rPr lang="en-GB" dirty="0">
+                <a:solidFill>
+                  <a:schemeClr val="tx1"/>
+                </a:solidFill>
+              </a:rPr>
+              <a:t>, </a:t>
+            </a:r>
+            <a:r>
+              <a:rPr lang="en-GB" dirty="0" err="1">
+                <a:solidFill>
+                  <a:schemeClr val="tx1"/>
+                </a:solidFill>
+              </a:rPr>
+              <a:t>applicare</a:t>
+            </a:r>
+            <a:r>
+              <a:rPr lang="en-GB" dirty="0">
+                <a:solidFill>
+                  <a:schemeClr val="tx1"/>
+                </a:solidFill>
+              </a:rPr>
+              <a:t> </a:t>
+            </a:r>
+            <a:r>
+              <a:rPr lang="en-GB" i="1" dirty="0">
+                <a:solidFill>
+                  <a:schemeClr val="tx1"/>
+                </a:solidFill>
+              </a:rPr>
+              <a:t>Sensitive Learning</a:t>
+            </a:r>
+            <a:r>
+              <a:rPr lang="en-GB" dirty="0">
+                <a:solidFill>
+                  <a:schemeClr val="tx1"/>
+                </a:solidFill>
+              </a:rPr>
+              <a:t> </a:t>
+            </a:r>
+            <a:r>
+              <a:rPr lang="en-GB" dirty="0" err="1">
+                <a:solidFill>
+                  <a:schemeClr val="tx1"/>
+                </a:solidFill>
+              </a:rPr>
+              <a:t>può</a:t>
+            </a:r>
+            <a:r>
+              <a:rPr lang="en-GB" dirty="0">
+                <a:solidFill>
+                  <a:schemeClr val="tx1"/>
+                </a:solidFill>
+              </a:rPr>
+              <a:t> </a:t>
+            </a:r>
+            <a:r>
+              <a:rPr lang="en-GB" dirty="0" err="1">
+                <a:solidFill>
+                  <a:schemeClr val="tx1"/>
+                </a:solidFill>
+              </a:rPr>
+              <a:t>avere</a:t>
+            </a:r>
+            <a:r>
+              <a:rPr lang="en-GB" dirty="0">
+                <a:solidFill>
+                  <a:schemeClr val="tx1"/>
+                </a:solidFill>
+              </a:rPr>
+              <a:t> senso.</a:t>
             </a:r>
           </a:p>
           <a:p>
@@ -18822,9 +19272,241 @@
                   <a:schemeClr val="tx1"/>
                 </a:solidFill>
               </a:rPr>
+              <a:t>. </a:t>
+            </a:r>
+            <a:r>
+              <a:rPr lang="en-GB" dirty="0">
+                <a:solidFill>
+                  <a:schemeClr val="tx1"/>
+                </a:solidFill>
+              </a:rPr>
+              <a:t>Per </a:t>
+            </a:r>
+            <a:r>
+              <a:rPr lang="en-GB" dirty="0" err="1">
+                <a:solidFill>
+                  <a:schemeClr val="tx1"/>
+                </a:solidFill>
+              </a:rPr>
+              <a:t>BookKeeper</a:t>
+            </a:r>
+            <a:r>
+              <a:rPr lang="en-GB" dirty="0">
+                <a:solidFill>
+                  <a:schemeClr val="tx1"/>
+                </a:solidFill>
+              </a:rPr>
+              <a:t>, la </a:t>
+            </a:r>
+            <a:r>
+              <a:rPr lang="en-GB" dirty="0" err="1">
+                <a:solidFill>
+                  <a:schemeClr val="tx1"/>
+                </a:solidFill>
+              </a:rPr>
+              <a:t>scelta</a:t>
+            </a:r>
+            <a:r>
+              <a:rPr lang="en-GB" dirty="0">
+                <a:solidFill>
+                  <a:schemeClr val="tx1"/>
+                </a:solidFill>
+              </a:rPr>
+              <a:t> di </a:t>
+            </a:r>
+            <a:r>
+              <a:rPr lang="en-GB" dirty="0" err="1">
+                <a:solidFill>
+                  <a:schemeClr val="tx1"/>
+                </a:solidFill>
+              </a:rPr>
+              <a:t>applicare</a:t>
+            </a:r>
+            <a:r>
+              <a:rPr lang="en-GB" dirty="0">
+                <a:solidFill>
+                  <a:schemeClr val="tx1"/>
+                </a:solidFill>
+              </a:rPr>
+              <a:t> </a:t>
+            </a:r>
+            <a:r>
+              <a:rPr lang="en-GB" i="1" dirty="0">
+                <a:solidFill>
+                  <a:schemeClr val="tx1"/>
+                </a:solidFill>
+              </a:rPr>
+              <a:t>Sensitive Learning</a:t>
+            </a:r>
+            <a:r>
+              <a:rPr lang="en-GB" dirty="0">
+                <a:solidFill>
+                  <a:schemeClr val="tx1"/>
+                </a:solidFill>
+              </a:rPr>
+              <a:t> </a:t>
+            </a:r>
+            <a:r>
+              <a:rPr lang="en-GB" dirty="0" err="1">
+                <a:solidFill>
+                  <a:schemeClr val="tx1"/>
+                </a:solidFill>
+              </a:rPr>
+              <a:t>garantirebbe</a:t>
+            </a:r>
+            <a:r>
+              <a:rPr lang="en-GB" dirty="0">
+                <a:solidFill>
+                  <a:schemeClr val="tx1"/>
+                </a:solidFill>
+              </a:rPr>
+              <a:t> un </a:t>
+            </a:r>
+            <a:r>
+              <a:rPr lang="en-GB" dirty="0" err="1">
+                <a:solidFill>
+                  <a:schemeClr val="tx1"/>
+                </a:solidFill>
+              </a:rPr>
+              <a:t>maggior</a:t>
+            </a:r>
+            <a:r>
+              <a:rPr lang="en-GB" dirty="0">
+                <a:solidFill>
+                  <a:schemeClr val="tx1"/>
+                </a:solidFill>
+              </a:rPr>
+              <a:t> </a:t>
+            </a:r>
+            <a:r>
+              <a:rPr lang="en-GB" dirty="0" err="1">
+                <a:solidFill>
+                  <a:schemeClr val="tx1"/>
+                </a:solidFill>
+              </a:rPr>
+              <a:t>numero</a:t>
+            </a:r>
+            <a:r>
+              <a:rPr lang="en-GB" dirty="0">
+                <a:solidFill>
+                  <a:schemeClr val="tx1"/>
+                </a:solidFill>
+              </a:rPr>
+              <a:t> di </a:t>
+            </a:r>
+            <a:r>
+              <a:rPr lang="en-GB" dirty="0" err="1">
+                <a:solidFill>
+                  <a:schemeClr val="tx1"/>
+                </a:solidFill>
+              </a:rPr>
+              <a:t>classi</a:t>
+            </a:r>
+            <a:r>
+              <a:rPr lang="en-GB" dirty="0">
+                <a:solidFill>
+                  <a:schemeClr val="tx1"/>
+                </a:solidFill>
+              </a:rPr>
+              <a:t> buggy </a:t>
+            </a:r>
+            <a:r>
+              <a:rPr lang="en-GB" dirty="0" err="1">
+                <a:solidFill>
+                  <a:schemeClr val="tx1"/>
+                </a:solidFill>
+              </a:rPr>
+              <a:t>correttamente</a:t>
+            </a:r>
+            <a:r>
+              <a:rPr lang="en-GB" dirty="0">
+                <a:solidFill>
+                  <a:schemeClr val="tx1"/>
+                </a:solidFill>
+              </a:rPr>
+              <a:t> </a:t>
+            </a:r>
+            <a:r>
+              <a:rPr lang="en-GB" dirty="0" err="1">
+                <a:solidFill>
+                  <a:schemeClr val="tx1"/>
+                </a:solidFill>
+              </a:rPr>
+              <a:t>predette</a:t>
+            </a:r>
+            <a:r>
+              <a:rPr lang="en-GB" dirty="0">
+                <a:solidFill>
+                  <a:schemeClr val="tx1"/>
+                </a:solidFill>
+              </a:rPr>
+              <a:t>, ma il </a:t>
+            </a:r>
+            <a:r>
+              <a:rPr lang="en-GB" dirty="0" err="1">
+                <a:solidFill>
+                  <a:schemeClr val="tx1"/>
+                </a:solidFill>
+              </a:rPr>
+              <a:t>costo</a:t>
+            </a:r>
+            <a:r>
+              <a:rPr lang="en-GB" dirty="0">
+                <a:solidFill>
+                  <a:schemeClr val="tx1"/>
+                </a:solidFill>
+              </a:rPr>
+              <a:t> da </a:t>
+            </a:r>
+            <a:r>
+              <a:rPr lang="en-GB" dirty="0" err="1">
+                <a:solidFill>
+                  <a:schemeClr val="tx1"/>
+                </a:solidFill>
+              </a:rPr>
+              <a:t>pagare</a:t>
+            </a:r>
+            <a:r>
+              <a:rPr lang="en-GB" dirty="0">
+                <a:solidFill>
+                  <a:schemeClr val="tx1"/>
+                </a:solidFill>
+              </a:rPr>
+              <a:t> è </a:t>
+            </a:r>
+            <a:r>
+              <a:rPr lang="en-GB" dirty="0" err="1">
+                <a:solidFill>
+                  <a:schemeClr val="tx1"/>
+                </a:solidFill>
+              </a:rPr>
+              <a:t>una</a:t>
+            </a:r>
+            <a:r>
+              <a:rPr lang="en-GB" dirty="0">
+                <a:solidFill>
+                  <a:schemeClr val="tx1"/>
+                </a:solidFill>
+              </a:rPr>
+              <a:t> Precision </a:t>
+            </a:r>
+            <a:r>
+              <a:rPr lang="en-GB" dirty="0" err="1">
+                <a:solidFill>
+                  <a:schemeClr val="tx1"/>
+                </a:solidFill>
+              </a:rPr>
+              <a:t>minore</a:t>
+            </a:r>
+            <a:r>
+              <a:rPr lang="en-GB" dirty="0">
+                <a:solidFill>
+                  <a:schemeClr val="tx1"/>
+                </a:solidFill>
+              </a:rPr>
               <a:t>.</a:t>
             </a:r>
-            <a:endParaRPr lang="en-GB" b="1" dirty="0">
+            <a:endParaRPr lang="en-GB" b="1" i="1" dirty="0">
               <a:solidFill>
                 <a:schemeClr val="tx1"/>
               </a:solidFill>
@@ -20108,16 +20790,16 @@
               </a:spcAft>
             </a:pPr>
             <a:r>
-              <a:rPr lang="it-IT" sz="2000" b="1"/>
+              <a:rPr lang="it-IT" sz="2000" b="1" dirty="0"/>
               <a:t>OBIETTIVO n° 1</a:t>
             </a:r>
-            <a:endParaRPr lang="it-IT" b="1"/>
+            <a:endParaRPr lang="it-IT" b="1" dirty="0"/>
           </a:p>
           <a:p>
             <a:pPr algn="ctr"/>
             <a:r>
-              <a:rPr lang="it-IT"/>
-              <a:t>Supportare l’attività di testing, indicando quali classi software conviene testare, stimando la probabilità che tali classi contengano dei bug.</a:t>
+              <a:rPr lang="it-IT" dirty="0"/>
+              <a:t>Supportare l’attività di testing, indicando quali siano le classi software che con maggior probabilità contengono dei bug.</a:t>
             </a:r>
           </a:p>
         </p:txBody>
@@ -20661,23 +21343,39 @@
                   <a:schemeClr val="tx1"/>
                 </a:solidFill>
               </a:rPr>
-              <a:t>Bisognerà</a:t>
-            </a:r>
-            <a:r>
-              <a:rPr lang="en-GB" dirty="0">
-                <a:solidFill>
-                  <a:schemeClr val="tx1"/>
-                </a:solidFill>
-              </a:rPr>
-              <a:t> </a:t>
-            </a:r>
-            <a:r>
-              <a:rPr lang="en-GB" dirty="0" err="1">
-                <a:solidFill>
-                  <a:schemeClr val="tx1"/>
-                </a:solidFill>
-              </a:rPr>
-              <a:t>dunque</a:t>
+              <a:t>Dunque</a:t>
+            </a:r>
+            <a:r>
+              <a:rPr lang="en-GB" dirty="0">
+                <a:solidFill>
+                  <a:schemeClr val="tx1"/>
+                </a:solidFill>
+              </a:rPr>
+              <a:t>, </a:t>
+            </a:r>
+            <a:r>
+              <a:rPr lang="en-GB" dirty="0" err="1">
+                <a:solidFill>
+                  <a:schemeClr val="tx1"/>
+                </a:solidFill>
+              </a:rPr>
+              <a:t>sarà</a:t>
+            </a:r>
+            <a:r>
+              <a:rPr lang="en-GB" dirty="0">
+                <a:solidFill>
+                  <a:schemeClr val="tx1"/>
+                </a:solidFill>
+              </a:rPr>
+              <a:t> </a:t>
+            </a:r>
+            <a:r>
+              <a:rPr lang="en-GB" dirty="0" err="1">
+                <a:solidFill>
+                  <a:schemeClr val="tx1"/>
+                </a:solidFill>
+              </a:rPr>
+              <a:t>necessario</a:t>
             </a:r>
             <a:r>
               <a:rPr lang="en-GB" dirty="0">
@@ -21486,7 +22184,7 @@
                   <a:schemeClr val="tx1"/>
                 </a:solidFill>
               </a:rPr>
-              <a:t>selezionati</a:t>
+              <a:t>individuati</a:t>
             </a:r>
             <a:r>
               <a:rPr lang="en-GB" dirty="0">
@@ -22209,7 +22907,7 @@
         </p:nvSpPr>
         <p:spPr>
           <a:xfrm>
-            <a:off x="2420112" y="4201377"/>
+            <a:off x="2420112" y="4316094"/>
             <a:ext cx="7351776" cy="1308050"/>
           </a:xfrm>
           <a:prstGeom prst="rect">
@@ -22234,19 +22932,23 @@
               </a:spcAft>
             </a:pPr>
             <a:r>
-              <a:rPr lang="it-IT" sz="2000" b="1"/>
+              <a:rPr lang="it-IT" sz="2000" b="1" dirty="0"/>
               <a:t>OBIETTIVO n° 2</a:t>
             </a:r>
-            <a:endParaRPr lang="it-IT" b="1"/>
+            <a:endParaRPr lang="it-IT" b="1" dirty="0"/>
           </a:p>
           <a:p>
             <a:pPr algn="ctr"/>
             <a:r>
-              <a:rPr lang="it-IT"/>
-              <a:t>Individuare quale classificatore ha le migliori performances in termini di accuratezza delle predizioni, al variare delle tecniche di utilizzo, in particolare al variare della tipologia di cost </a:t>
-            </a:r>
-            <a:r>
-              <a:rPr lang="en-GB">
+              <a:rPr lang="it-IT" dirty="0"/>
+              <a:t>Individuare quale classificatore ha le migliori performances in termini di accuratezza delle predizioni, al variare delle tecniche di utilizzo; in particolare, al variare della tipologia di </a:t>
+            </a:r>
+            <a:r>
+              <a:rPr lang="it-IT" b="1" dirty="0"/>
+              <a:t>cost </a:t>
+            </a:r>
+            <a:r>
+              <a:rPr lang="en-GB" b="1" dirty="0">
                 <a:solidFill>
                   <a:schemeClr val="tx1"/>
                 </a:solidFill>
@@ -22254,7 +22956,7 @@
               <a:t>sensitivity</a:t>
             </a:r>
             <a:r>
-              <a:rPr lang="it-IT"/>
+              <a:rPr lang="it-IT" dirty="0"/>
               <a:t>.</a:t>
             </a:r>
           </a:p>
@@ -22460,6 +23162,9 @@
           <a:lstStyle/>
           <a:p>
             <a:pPr lvl="1">
+              <a:spcAft>
+                <a:spcPts val="1200"/>
+              </a:spcAft>
               <a:buFont typeface="Arial" panose="020B0604020202020204" pitchFamily="34" charset="0"/>
               <a:buChar char="•"/>
             </a:pPr>
@@ -22861,7 +23566,533 @@
                   <a:schemeClr val="tx1"/>
                 </a:solidFill>
               </a:rPr>
-              <a:t>Jira.</a:t>
+              <a:t>Jira. </a:t>
+            </a:r>
+          </a:p>
+          <a:p>
+            <a:pPr lvl="1">
+              <a:spcAft>
+                <a:spcPts val="1200"/>
+              </a:spcAft>
+              <a:buFont typeface="Arial" panose="020B0604020202020204" pitchFamily="34" charset="0"/>
+              <a:buChar char="•"/>
+            </a:pPr>
+            <a:r>
+              <a:rPr lang="en-GB" dirty="0" err="1">
+                <a:solidFill>
+                  <a:schemeClr val="tx1"/>
+                </a:solidFill>
+              </a:rPr>
+              <a:t>Sono</a:t>
+            </a:r>
+            <a:r>
+              <a:rPr lang="en-GB" dirty="0">
+                <a:solidFill>
+                  <a:schemeClr val="tx1"/>
+                </a:solidFill>
+              </a:rPr>
+              <a:t> </a:t>
+            </a:r>
+            <a:r>
+              <a:rPr lang="en-GB" dirty="0" err="1">
+                <a:solidFill>
+                  <a:schemeClr val="tx1"/>
+                </a:solidFill>
+              </a:rPr>
+              <a:t>stati</a:t>
+            </a:r>
+            <a:r>
+              <a:rPr lang="en-GB" dirty="0">
+                <a:solidFill>
+                  <a:schemeClr val="tx1"/>
+                </a:solidFill>
+              </a:rPr>
+              <a:t> </a:t>
+            </a:r>
+            <a:r>
+              <a:rPr lang="en-GB" dirty="0" err="1">
+                <a:solidFill>
+                  <a:schemeClr val="tx1"/>
+                </a:solidFill>
+              </a:rPr>
+              <a:t>filtrati</a:t>
+            </a:r>
+            <a:r>
+              <a:rPr lang="en-GB" dirty="0">
+                <a:solidFill>
+                  <a:schemeClr val="tx1"/>
+                </a:solidFill>
+              </a:rPr>
+              <a:t> solo </a:t>
+            </a:r>
+            <a:r>
+              <a:rPr lang="en-GB" dirty="0" err="1">
+                <a:solidFill>
+                  <a:schemeClr val="tx1"/>
+                </a:solidFill>
+              </a:rPr>
+              <a:t>i</a:t>
+            </a:r>
+            <a:r>
+              <a:rPr lang="en-GB" dirty="0">
+                <a:solidFill>
+                  <a:schemeClr val="tx1"/>
+                </a:solidFill>
+              </a:rPr>
+              <a:t> tickets </a:t>
+            </a:r>
+            <a:r>
+              <a:rPr lang="en-GB" dirty="0" err="1">
+                <a:solidFill>
+                  <a:schemeClr val="tx1"/>
+                </a:solidFill>
+              </a:rPr>
+              <a:t>relativi</a:t>
+            </a:r>
+            <a:r>
+              <a:rPr lang="en-GB" dirty="0">
+                <a:solidFill>
+                  <a:schemeClr val="tx1"/>
+                </a:solidFill>
+              </a:rPr>
+              <a:t> ad issues di </a:t>
+            </a:r>
+            <a:r>
+              <a:rPr lang="en-GB" dirty="0" err="1">
+                <a:solidFill>
+                  <a:schemeClr val="tx1"/>
+                </a:solidFill>
+              </a:rPr>
+              <a:t>tipo</a:t>
+            </a:r>
+            <a:r>
+              <a:rPr lang="en-GB" dirty="0">
+                <a:solidFill>
+                  <a:schemeClr val="tx1"/>
+                </a:solidFill>
+              </a:rPr>
+              <a:t> </a:t>
+            </a:r>
+            <a:r>
+              <a:rPr lang="en-GB" i="1" dirty="0">
+                <a:solidFill>
+                  <a:schemeClr val="tx1"/>
+                </a:solidFill>
+              </a:rPr>
+              <a:t>Bug</a:t>
+            </a:r>
+            <a:r>
+              <a:rPr lang="en-GB" dirty="0">
+                <a:solidFill>
+                  <a:schemeClr val="tx1"/>
+                </a:solidFill>
+              </a:rPr>
+              <a:t>, con </a:t>
+            </a:r>
+            <a:r>
+              <a:rPr lang="en-GB" dirty="0" err="1">
+                <a:solidFill>
+                  <a:schemeClr val="tx1"/>
+                </a:solidFill>
+              </a:rPr>
+              <a:t>risoluzione</a:t>
+            </a:r>
+            <a:r>
+              <a:rPr lang="en-GB" dirty="0">
+                <a:solidFill>
+                  <a:schemeClr val="tx1"/>
+                </a:solidFill>
+              </a:rPr>
+              <a:t> </a:t>
+            </a:r>
+            <a:r>
+              <a:rPr lang="en-GB" i="1" dirty="0">
+                <a:solidFill>
+                  <a:schemeClr val="tx1"/>
+                </a:solidFill>
+              </a:rPr>
+              <a:t>Fixed</a:t>
+            </a:r>
+            <a:r>
+              <a:rPr lang="en-GB" dirty="0">
+                <a:solidFill>
+                  <a:schemeClr val="tx1"/>
+                </a:solidFill>
+              </a:rPr>
+              <a:t> e con </a:t>
+            </a:r>
+            <a:r>
+              <a:rPr lang="en-GB" dirty="0" err="1">
+                <a:solidFill>
+                  <a:schemeClr val="tx1"/>
+                </a:solidFill>
+              </a:rPr>
+              <a:t>stato</a:t>
+            </a:r>
+            <a:r>
+              <a:rPr lang="en-GB" dirty="0">
+                <a:solidFill>
+                  <a:schemeClr val="tx1"/>
+                </a:solidFill>
+              </a:rPr>
+              <a:t> </a:t>
+            </a:r>
+            <a:r>
+              <a:rPr lang="en-GB" i="1" dirty="0">
+                <a:solidFill>
+                  <a:schemeClr val="tx1"/>
+                </a:solidFill>
+              </a:rPr>
+              <a:t>Resolved</a:t>
+            </a:r>
+            <a:r>
+              <a:rPr lang="en-GB" dirty="0">
+                <a:solidFill>
+                  <a:schemeClr val="tx1"/>
+                </a:solidFill>
+              </a:rPr>
+              <a:t> </a:t>
+            </a:r>
+            <a:r>
+              <a:rPr lang="en-GB" dirty="0" err="1">
+                <a:solidFill>
+                  <a:schemeClr val="tx1"/>
+                </a:solidFill>
+              </a:rPr>
+              <a:t>oppure</a:t>
+            </a:r>
+            <a:r>
+              <a:rPr lang="en-GB" dirty="0">
+                <a:solidFill>
+                  <a:schemeClr val="tx1"/>
+                </a:solidFill>
+              </a:rPr>
+              <a:t> </a:t>
+            </a:r>
+            <a:r>
+              <a:rPr lang="en-GB" i="1" dirty="0">
+                <a:solidFill>
+                  <a:schemeClr val="tx1"/>
+                </a:solidFill>
+              </a:rPr>
+              <a:t>Closed, </a:t>
+            </a:r>
+            <a:r>
+              <a:rPr lang="en-GB" dirty="0" err="1">
+                <a:solidFill>
+                  <a:schemeClr val="tx1"/>
+                </a:solidFill>
+              </a:rPr>
+              <a:t>collezionandoli</a:t>
+            </a:r>
+            <a:r>
+              <a:rPr lang="en-GB" dirty="0">
+                <a:solidFill>
+                  <a:schemeClr val="tx1"/>
+                </a:solidFill>
+              </a:rPr>
+              <a:t> in </a:t>
+            </a:r>
+            <a:r>
+              <a:rPr lang="en-GB" dirty="0" err="1">
+                <a:solidFill>
+                  <a:schemeClr val="tx1"/>
+                </a:solidFill>
+              </a:rPr>
+              <a:t>una</a:t>
+            </a:r>
+            <a:r>
+              <a:rPr lang="en-GB" dirty="0">
+                <a:solidFill>
+                  <a:schemeClr val="tx1"/>
+                </a:solidFill>
+              </a:rPr>
+              <a:t> </a:t>
+            </a:r>
+            <a:r>
+              <a:rPr lang="en-GB" dirty="0" err="1">
+                <a:solidFill>
+                  <a:schemeClr val="tx1"/>
+                </a:solidFill>
+              </a:rPr>
+              <a:t>lista</a:t>
+            </a:r>
+            <a:r>
+              <a:rPr lang="en-GB" dirty="0">
+                <a:solidFill>
+                  <a:schemeClr val="tx1"/>
+                </a:solidFill>
+              </a:rPr>
+              <a:t>. </a:t>
+            </a:r>
+          </a:p>
+          <a:p>
+            <a:pPr lvl="1">
+              <a:buFont typeface="Arial" panose="020B0604020202020204" pitchFamily="34" charset="0"/>
+              <a:buChar char="•"/>
+            </a:pPr>
+            <a:r>
+              <a:rPr lang="en-GB" dirty="0">
+                <a:solidFill>
+                  <a:schemeClr val="tx1"/>
+                </a:solidFill>
+              </a:rPr>
+              <a:t>La </a:t>
+            </a:r>
+            <a:r>
+              <a:rPr lang="en-GB" dirty="0" err="1">
+                <a:solidFill>
+                  <a:schemeClr val="tx1"/>
+                </a:solidFill>
+              </a:rPr>
+              <a:t>lista</a:t>
+            </a:r>
+            <a:r>
+              <a:rPr lang="en-GB" dirty="0">
+                <a:solidFill>
+                  <a:schemeClr val="tx1"/>
+                </a:solidFill>
+              </a:rPr>
+              <a:t> di bug è </a:t>
+            </a:r>
+            <a:r>
+              <a:rPr lang="en-GB" dirty="0" err="1">
+                <a:solidFill>
+                  <a:schemeClr val="tx1"/>
+                </a:solidFill>
+              </a:rPr>
+              <a:t>stata</a:t>
+            </a:r>
+            <a:r>
+              <a:rPr lang="en-GB" dirty="0">
+                <a:solidFill>
+                  <a:schemeClr val="tx1"/>
+                </a:solidFill>
+              </a:rPr>
+              <a:t> </a:t>
+            </a:r>
+            <a:r>
+              <a:rPr lang="en-GB" dirty="0" err="1">
+                <a:solidFill>
+                  <a:schemeClr val="tx1"/>
+                </a:solidFill>
+              </a:rPr>
+              <a:t>ordinata</a:t>
+            </a:r>
+            <a:r>
+              <a:rPr lang="en-GB" dirty="0">
+                <a:solidFill>
+                  <a:schemeClr val="tx1"/>
+                </a:solidFill>
+              </a:rPr>
+              <a:t> </a:t>
+            </a:r>
+            <a:r>
+              <a:rPr lang="en-GB" dirty="0" err="1">
+                <a:solidFill>
+                  <a:schemeClr val="tx1"/>
+                </a:solidFill>
+              </a:rPr>
+              <a:t>temporalmente</a:t>
+            </a:r>
+            <a:r>
+              <a:rPr lang="en-GB" dirty="0">
+                <a:solidFill>
+                  <a:schemeClr val="tx1"/>
+                </a:solidFill>
+              </a:rPr>
+              <a:t> e </a:t>
+            </a:r>
+            <a:r>
+              <a:rPr lang="en-GB" dirty="0" err="1">
+                <a:solidFill>
+                  <a:schemeClr val="tx1"/>
+                </a:solidFill>
+              </a:rPr>
+              <a:t>sono</a:t>
+            </a:r>
+            <a:r>
+              <a:rPr lang="en-GB" dirty="0">
+                <a:solidFill>
+                  <a:schemeClr val="tx1"/>
+                </a:solidFill>
+              </a:rPr>
+              <a:t> </a:t>
+            </a:r>
+            <a:r>
+              <a:rPr lang="en-GB" dirty="0" err="1">
+                <a:solidFill>
+                  <a:schemeClr val="tx1"/>
+                </a:solidFill>
+              </a:rPr>
+              <a:t>stati</a:t>
+            </a:r>
+            <a:r>
+              <a:rPr lang="en-GB" dirty="0">
+                <a:solidFill>
+                  <a:schemeClr val="tx1"/>
+                </a:solidFill>
+              </a:rPr>
+              <a:t> </a:t>
+            </a:r>
+            <a:r>
+              <a:rPr lang="en-GB" dirty="0" err="1">
+                <a:solidFill>
+                  <a:schemeClr val="tx1"/>
+                </a:solidFill>
+              </a:rPr>
+              <a:t>scartati</a:t>
+            </a:r>
+            <a:r>
+              <a:rPr lang="en-GB" dirty="0">
+                <a:solidFill>
+                  <a:schemeClr val="tx1"/>
+                </a:solidFill>
+              </a:rPr>
+              <a:t> </a:t>
+            </a:r>
+            <a:r>
+              <a:rPr lang="en-GB" dirty="0" err="1">
+                <a:solidFill>
+                  <a:schemeClr val="tx1"/>
+                </a:solidFill>
+              </a:rPr>
+              <a:t>quei</a:t>
+            </a:r>
+            <a:r>
+              <a:rPr lang="en-GB" dirty="0">
+                <a:solidFill>
+                  <a:schemeClr val="tx1"/>
+                </a:solidFill>
+              </a:rPr>
+              <a:t> bug per cui </a:t>
+            </a:r>
+            <a:r>
+              <a:rPr lang="en-GB" dirty="0" err="1">
+                <a:solidFill>
+                  <a:schemeClr val="tx1"/>
+                </a:solidFill>
+              </a:rPr>
+              <a:t>una</a:t>
+            </a:r>
+            <a:r>
+              <a:rPr lang="en-GB" dirty="0">
+                <a:solidFill>
+                  <a:schemeClr val="tx1"/>
+                </a:solidFill>
+              </a:rPr>
+              <a:t> </a:t>
+            </a:r>
+            <a:r>
+              <a:rPr lang="en-GB" dirty="0" err="1">
+                <a:solidFill>
+                  <a:schemeClr val="tx1"/>
+                </a:solidFill>
+              </a:rPr>
+              <a:t>delle</a:t>
+            </a:r>
+            <a:r>
+              <a:rPr lang="en-GB" dirty="0">
+                <a:solidFill>
+                  <a:schemeClr val="tx1"/>
+                </a:solidFill>
+              </a:rPr>
+              <a:t> </a:t>
+            </a:r>
+            <a:r>
+              <a:rPr lang="en-GB" dirty="0" err="1">
+                <a:solidFill>
+                  <a:schemeClr val="tx1"/>
+                </a:solidFill>
+              </a:rPr>
+              <a:t>seguenti</a:t>
+            </a:r>
+            <a:r>
+              <a:rPr lang="en-GB" dirty="0">
+                <a:solidFill>
+                  <a:schemeClr val="tx1"/>
+                </a:solidFill>
+              </a:rPr>
+              <a:t> </a:t>
+            </a:r>
+            <a:r>
+              <a:rPr lang="en-GB" dirty="0" err="1">
+                <a:solidFill>
+                  <a:schemeClr val="tx1"/>
+                </a:solidFill>
+              </a:rPr>
+              <a:t>condizioni</a:t>
+            </a:r>
+            <a:r>
+              <a:rPr lang="en-GB" dirty="0">
+                <a:solidFill>
+                  <a:schemeClr val="tx1"/>
+                </a:solidFill>
+              </a:rPr>
+              <a:t> era vera:</a:t>
+            </a:r>
+          </a:p>
+          <a:p>
+            <a:pPr lvl="2">
+              <a:buFont typeface="Arial" panose="020B0604020202020204" pitchFamily="34" charset="0"/>
+              <a:buChar char="•"/>
+            </a:pPr>
+            <a:r>
+              <a:rPr lang="en-GB" sz="1600" dirty="0">
+                <a:solidFill>
+                  <a:schemeClr val="tx1"/>
+                </a:solidFill>
+              </a:rPr>
+              <a:t>La FV è </a:t>
+            </a:r>
+            <a:r>
+              <a:rPr lang="en-GB" sz="1600" dirty="0" err="1">
+                <a:solidFill>
+                  <a:schemeClr val="tx1"/>
+                </a:solidFill>
+              </a:rPr>
+              <a:t>indicata</a:t>
+            </a:r>
+            <a:r>
+              <a:rPr lang="en-GB" sz="1600" dirty="0">
+                <a:solidFill>
+                  <a:schemeClr val="tx1"/>
+                </a:solidFill>
+              </a:rPr>
+              <a:t> </a:t>
+            </a:r>
+            <a:r>
+              <a:rPr lang="en-GB" sz="1600" dirty="0" err="1">
+                <a:solidFill>
+                  <a:schemeClr val="tx1"/>
+                </a:solidFill>
+              </a:rPr>
+              <a:t>tra</a:t>
+            </a:r>
+            <a:r>
+              <a:rPr lang="en-GB" sz="1600" dirty="0">
+                <a:solidFill>
+                  <a:schemeClr val="tx1"/>
+                </a:solidFill>
+              </a:rPr>
+              <a:t> le Affected Versions</a:t>
+            </a:r>
+          </a:p>
+          <a:p>
+            <a:pPr lvl="2">
+              <a:spcAft>
+                <a:spcPts val="1200"/>
+              </a:spcAft>
+              <a:buFont typeface="Arial" panose="020B0604020202020204" pitchFamily="34" charset="0"/>
+              <a:buChar char="•"/>
+            </a:pPr>
+            <a:r>
+              <a:rPr lang="en-GB" sz="1600" dirty="0">
+                <a:solidFill>
+                  <a:schemeClr val="tx1"/>
+                </a:solidFill>
+              </a:rPr>
+              <a:t>IV &gt; OV</a:t>
             </a:r>
             <a:endParaRPr lang="en-GB" dirty="0">
               <a:solidFill>
@@ -22874,64 +24105,13 @@
               <a:buFont typeface="Arial" panose="020B0604020202020204" pitchFamily="34" charset="0"/>
               <a:buChar char="•"/>
             </a:pPr>
-            <a:endParaRPr lang="en-GB" dirty="0">
-              <a:solidFill>
-                <a:schemeClr val="tx1"/>
-              </a:solidFill>
-            </a:endParaRPr>
-          </a:p>
-          <a:p>
-            <a:pPr lvl="1">
-              <a:buFont typeface="Arial" panose="020B0604020202020204" pitchFamily="34" charset="0"/>
-              <a:buChar char="•"/>
-            </a:pPr>
-            <a:r>
-              <a:rPr lang="en-GB" dirty="0" err="1">
-                <a:solidFill>
-                  <a:schemeClr val="tx1"/>
-                </a:solidFill>
-              </a:rPr>
-              <a:t>Sono</a:t>
-            </a:r>
-            <a:r>
-              <a:rPr lang="en-GB" dirty="0">
-                <a:solidFill>
-                  <a:schemeClr val="tx1"/>
-                </a:solidFill>
-              </a:rPr>
-              <a:t> </a:t>
-            </a:r>
-            <a:r>
-              <a:rPr lang="en-GB" dirty="0" err="1">
-                <a:solidFill>
-                  <a:schemeClr val="tx1"/>
-                </a:solidFill>
-              </a:rPr>
-              <a:t>stati</a:t>
-            </a:r>
-            <a:r>
-              <a:rPr lang="en-GB" dirty="0">
-                <a:solidFill>
-                  <a:schemeClr val="tx1"/>
-                </a:solidFill>
-              </a:rPr>
-              <a:t> </a:t>
-            </a:r>
-            <a:r>
-              <a:rPr lang="en-GB" dirty="0" err="1">
-                <a:solidFill>
-                  <a:schemeClr val="tx1"/>
-                </a:solidFill>
-              </a:rPr>
-              <a:t>filtrati</a:t>
-            </a:r>
-            <a:r>
-              <a:rPr lang="en-GB" dirty="0">
-                <a:solidFill>
-                  <a:schemeClr val="tx1"/>
-                </a:solidFill>
-              </a:rPr>
-              <a:t> solo </a:t>
+            <a:r>
+              <a:rPr lang="en-GB" dirty="0">
+                <a:solidFill>
+                  <a:schemeClr val="tx1"/>
+                </a:solidFill>
+              </a:rPr>
+              <a:t>Per </a:t>
             </a:r>
             <a:r>
               <a:rPr lang="en-GB" dirty="0" err="1">
@@ -22947,159 +24127,23 @@
                   <a:schemeClr val="tx1"/>
                 </a:solidFill>
               </a:rPr>
-              <a:t> tickets </a:t>
-            </a:r>
-            <a:r>
-              <a:rPr lang="en-GB" dirty="0" err="1">
-                <a:solidFill>
-                  <a:schemeClr val="tx1"/>
-                </a:solidFill>
-              </a:rPr>
-              <a:t>relativi</a:t>
-            </a:r>
-            <a:r>
-              <a:rPr lang="en-GB" dirty="0">
-                <a:solidFill>
-                  <a:schemeClr val="tx1"/>
-                </a:solidFill>
-              </a:rPr>
-              <a:t> ad issues di </a:t>
-            </a:r>
-            <a:r>
-              <a:rPr lang="en-GB" dirty="0" err="1">
-                <a:solidFill>
-                  <a:schemeClr val="tx1"/>
-                </a:solidFill>
-              </a:rPr>
-              <a:t>tipo</a:t>
-            </a:r>
-            <a:r>
-              <a:rPr lang="en-GB" dirty="0">
-                <a:solidFill>
-                  <a:schemeClr val="tx1"/>
-                </a:solidFill>
-              </a:rPr>
-              <a:t> </a:t>
-            </a:r>
-            <a:r>
-              <a:rPr lang="en-GB" i="1" dirty="0">
-                <a:solidFill>
-                  <a:schemeClr val="tx1"/>
-                </a:solidFill>
-              </a:rPr>
-              <a:t>Bug</a:t>
-            </a:r>
-            <a:r>
-              <a:rPr lang="en-GB" dirty="0">
-                <a:solidFill>
-                  <a:schemeClr val="tx1"/>
-                </a:solidFill>
-              </a:rPr>
-              <a:t>, con </a:t>
-            </a:r>
-            <a:r>
-              <a:rPr lang="en-GB" dirty="0" err="1">
-                <a:solidFill>
-                  <a:schemeClr val="tx1"/>
-                </a:solidFill>
-              </a:rPr>
-              <a:t>risoluzione</a:t>
-            </a:r>
-            <a:r>
-              <a:rPr lang="en-GB" dirty="0">
-                <a:solidFill>
-                  <a:schemeClr val="tx1"/>
-                </a:solidFill>
-              </a:rPr>
-              <a:t> </a:t>
-            </a:r>
-            <a:r>
-              <a:rPr lang="en-GB" i="1" dirty="0">
-                <a:solidFill>
-                  <a:schemeClr val="tx1"/>
-                </a:solidFill>
-              </a:rPr>
-              <a:t>Fixed</a:t>
-            </a:r>
-            <a:r>
-              <a:rPr lang="en-GB" dirty="0">
-                <a:solidFill>
-                  <a:schemeClr val="tx1"/>
-                </a:solidFill>
-              </a:rPr>
-              <a:t> e con </a:t>
-            </a:r>
-            <a:r>
-              <a:rPr lang="en-GB" dirty="0" err="1">
-                <a:solidFill>
-                  <a:schemeClr val="tx1"/>
-                </a:solidFill>
-              </a:rPr>
-              <a:t>stato</a:t>
-            </a:r>
-            <a:r>
-              <a:rPr lang="en-GB" dirty="0">
-                <a:solidFill>
-                  <a:schemeClr val="tx1"/>
-                </a:solidFill>
-              </a:rPr>
-              <a:t> </a:t>
-            </a:r>
-            <a:r>
-              <a:rPr lang="en-GB" i="1" dirty="0">
-                <a:solidFill>
-                  <a:schemeClr val="tx1"/>
-                </a:solidFill>
-              </a:rPr>
-              <a:t>Resolved</a:t>
-            </a:r>
-            <a:r>
-              <a:rPr lang="en-GB" dirty="0">
-                <a:solidFill>
-                  <a:schemeClr val="tx1"/>
-                </a:solidFill>
-              </a:rPr>
-              <a:t> </a:t>
-            </a:r>
-            <a:r>
-              <a:rPr lang="en-GB" dirty="0" err="1">
-                <a:solidFill>
-                  <a:schemeClr val="tx1"/>
-                </a:solidFill>
-              </a:rPr>
-              <a:t>oppure</a:t>
-            </a:r>
-            <a:r>
-              <a:rPr lang="en-GB" dirty="0">
-                <a:solidFill>
-                  <a:schemeClr val="tx1"/>
-                </a:solidFill>
-              </a:rPr>
-              <a:t> </a:t>
-            </a:r>
-            <a:r>
-              <a:rPr lang="en-GB" i="1" dirty="0">
-                <a:solidFill>
-                  <a:schemeClr val="tx1"/>
-                </a:solidFill>
-              </a:rPr>
-              <a:t>Closed, </a:t>
-            </a:r>
-            <a:r>
-              <a:rPr lang="en-GB" dirty="0" err="1">
-                <a:solidFill>
-                  <a:schemeClr val="tx1"/>
-                </a:solidFill>
-              </a:rPr>
-              <a:t>collezionandoli</a:t>
-            </a:r>
-            <a:r>
-              <a:rPr lang="en-GB" dirty="0">
-                <a:solidFill>
-                  <a:schemeClr val="tx1"/>
-                </a:solidFill>
-              </a:rPr>
-              <a:t> in </a:t>
+              <a:t> bug </a:t>
+            </a:r>
+            <a:r>
+              <a:rPr lang="en-GB" dirty="0" err="1">
+                <a:solidFill>
+                  <a:schemeClr val="tx1"/>
+                </a:solidFill>
+              </a:rPr>
+              <a:t>aventi</a:t>
+            </a:r>
+            <a:r>
+              <a:rPr lang="en-GB" dirty="0">
+                <a:solidFill>
+                  <a:schemeClr val="tx1"/>
+                </a:solidFill>
+              </a:rPr>
+              <a:t> </a:t>
             </a:r>
             <a:r>
               <a:rPr lang="en-GB" dirty="0" err="1">
@@ -23115,389 +24159,23 @@
                   <a:schemeClr val="tx1"/>
                 </a:solidFill>
               </a:rPr>
-              <a:t> </a:t>
-            </a:r>
-            <a:r>
-              <a:rPr lang="en-GB" dirty="0" err="1">
-                <a:solidFill>
-                  <a:schemeClr val="tx1"/>
-                </a:solidFill>
-              </a:rPr>
-              <a:t>lista</a:t>
-            </a:r>
-            <a:r>
-              <a:rPr lang="en-GB" dirty="0">
-                <a:solidFill>
-                  <a:schemeClr val="tx1"/>
-                </a:solidFill>
-              </a:rPr>
-              <a:t>. </a:t>
-            </a:r>
-          </a:p>
-          <a:p>
-            <a:pPr lvl="1">
-              <a:buFont typeface="Arial" panose="020B0604020202020204" pitchFamily="34" charset="0"/>
-              <a:buChar char="•"/>
-            </a:pPr>
-            <a:endParaRPr lang="en-GB" dirty="0">
-              <a:solidFill>
-                <a:schemeClr val="tx1"/>
-              </a:solidFill>
-            </a:endParaRPr>
-          </a:p>
-          <a:p>
-            <a:pPr lvl="1">
-              <a:buFont typeface="Arial" panose="020B0604020202020204" pitchFamily="34" charset="0"/>
-              <a:buChar char="•"/>
-            </a:pPr>
-            <a:r>
-              <a:rPr lang="en-GB" dirty="0">
-                <a:solidFill>
-                  <a:schemeClr val="tx1"/>
-                </a:solidFill>
-              </a:rPr>
-              <a:t>La </a:t>
-            </a:r>
-            <a:r>
-              <a:rPr lang="en-GB" dirty="0" err="1">
-                <a:solidFill>
-                  <a:schemeClr val="tx1"/>
-                </a:solidFill>
-              </a:rPr>
-              <a:t>lista</a:t>
-            </a:r>
-            <a:r>
-              <a:rPr lang="en-GB" dirty="0">
-                <a:solidFill>
-                  <a:schemeClr val="tx1"/>
-                </a:solidFill>
-              </a:rPr>
-              <a:t> di bug è </a:t>
-            </a:r>
-            <a:r>
-              <a:rPr lang="en-GB" dirty="0" err="1">
-                <a:solidFill>
-                  <a:schemeClr val="tx1"/>
-                </a:solidFill>
-              </a:rPr>
-              <a:t>stata</a:t>
-            </a:r>
-            <a:r>
-              <a:rPr lang="en-GB" dirty="0">
-                <a:solidFill>
-                  <a:schemeClr val="tx1"/>
-                </a:solidFill>
-              </a:rPr>
-              <a:t> </a:t>
-            </a:r>
-            <a:r>
-              <a:rPr lang="en-GB" dirty="0" err="1">
-                <a:solidFill>
-                  <a:schemeClr val="tx1"/>
-                </a:solidFill>
-              </a:rPr>
-              <a:t>ordinata</a:t>
-            </a:r>
-            <a:r>
-              <a:rPr lang="en-GB" dirty="0">
-                <a:solidFill>
-                  <a:schemeClr val="tx1"/>
-                </a:solidFill>
-              </a:rPr>
-              <a:t> </a:t>
-            </a:r>
-            <a:r>
-              <a:rPr lang="en-GB" dirty="0" err="1">
-                <a:solidFill>
-                  <a:schemeClr val="tx1"/>
-                </a:solidFill>
-              </a:rPr>
-              <a:t>temporalmente</a:t>
-            </a:r>
-            <a:r>
-              <a:rPr lang="en-GB" dirty="0">
-                <a:solidFill>
-                  <a:schemeClr val="tx1"/>
-                </a:solidFill>
-              </a:rPr>
-              <a:t> e </a:t>
-            </a:r>
-            <a:r>
-              <a:rPr lang="en-GB" dirty="0" err="1">
-                <a:solidFill>
-                  <a:schemeClr val="tx1"/>
-                </a:solidFill>
-              </a:rPr>
-              <a:t>sono</a:t>
-            </a:r>
-            <a:r>
-              <a:rPr lang="en-GB" dirty="0">
-                <a:solidFill>
-                  <a:schemeClr val="tx1"/>
-                </a:solidFill>
-              </a:rPr>
-              <a:t> </a:t>
-            </a:r>
-            <a:r>
-              <a:rPr lang="en-GB" dirty="0" err="1">
-                <a:solidFill>
-                  <a:schemeClr val="tx1"/>
-                </a:solidFill>
-              </a:rPr>
-              <a:t>stati</a:t>
-            </a:r>
-            <a:r>
-              <a:rPr lang="en-GB" dirty="0">
-                <a:solidFill>
-                  <a:schemeClr val="tx1"/>
-                </a:solidFill>
-              </a:rPr>
-              <a:t> </a:t>
-            </a:r>
-            <a:r>
-              <a:rPr lang="en-GB" dirty="0" err="1">
-                <a:solidFill>
-                  <a:schemeClr val="tx1"/>
-                </a:solidFill>
-              </a:rPr>
-              <a:t>scartati</a:t>
-            </a:r>
-            <a:r>
-              <a:rPr lang="en-GB" dirty="0">
-                <a:solidFill>
-                  <a:schemeClr val="tx1"/>
-                </a:solidFill>
-              </a:rPr>
-              <a:t> </a:t>
-            </a:r>
-            <a:r>
-              <a:rPr lang="en-GB" dirty="0" err="1">
-                <a:solidFill>
-                  <a:schemeClr val="tx1"/>
-                </a:solidFill>
-              </a:rPr>
-              <a:t>quei</a:t>
-            </a:r>
-            <a:r>
-              <a:rPr lang="en-GB" dirty="0">
-                <a:solidFill>
-                  <a:schemeClr val="tx1"/>
-                </a:solidFill>
-              </a:rPr>
-              <a:t> bug per cui </a:t>
-            </a:r>
-            <a:r>
-              <a:rPr lang="en-GB" dirty="0" err="1">
-                <a:solidFill>
-                  <a:schemeClr val="tx1"/>
-                </a:solidFill>
-              </a:rPr>
-              <a:t>una</a:t>
-            </a:r>
-            <a:r>
-              <a:rPr lang="en-GB" dirty="0">
-                <a:solidFill>
-                  <a:schemeClr val="tx1"/>
-                </a:solidFill>
-              </a:rPr>
-              <a:t> </a:t>
-            </a:r>
-            <a:r>
-              <a:rPr lang="en-GB" dirty="0" err="1">
-                <a:solidFill>
-                  <a:schemeClr val="tx1"/>
-                </a:solidFill>
-              </a:rPr>
-              <a:t>delle</a:t>
-            </a:r>
-            <a:r>
-              <a:rPr lang="en-GB" dirty="0">
-                <a:solidFill>
-                  <a:schemeClr val="tx1"/>
-                </a:solidFill>
-              </a:rPr>
-              <a:t> </a:t>
-            </a:r>
-            <a:r>
-              <a:rPr lang="en-GB" dirty="0" err="1">
-                <a:solidFill>
-                  <a:schemeClr val="tx1"/>
-                </a:solidFill>
-              </a:rPr>
-              <a:t>seguenti</a:t>
-            </a:r>
-            <a:r>
-              <a:rPr lang="en-GB" dirty="0">
-                <a:solidFill>
-                  <a:schemeClr val="tx1"/>
-                </a:solidFill>
-              </a:rPr>
-              <a:t> </a:t>
-            </a:r>
-            <a:r>
-              <a:rPr lang="en-GB" dirty="0" err="1">
-                <a:solidFill>
-                  <a:schemeClr val="tx1"/>
-                </a:solidFill>
-              </a:rPr>
-              <a:t>condizioni</a:t>
-            </a:r>
-            <a:r>
-              <a:rPr lang="en-GB" dirty="0">
-                <a:solidFill>
-                  <a:schemeClr val="tx1"/>
-                </a:solidFill>
-              </a:rPr>
-              <a:t> era vera:</a:t>
-            </a:r>
-          </a:p>
-          <a:p>
-            <a:pPr lvl="2">
-              <a:buFont typeface="Arial" panose="020B0604020202020204" pitchFamily="34" charset="0"/>
-              <a:buChar char="•"/>
-            </a:pPr>
-            <a:r>
-              <a:rPr lang="en-GB" sz="1600" dirty="0">
-                <a:solidFill>
-                  <a:schemeClr val="tx1"/>
-                </a:solidFill>
-              </a:rPr>
-              <a:t>La FV è </a:t>
-            </a:r>
-            <a:r>
-              <a:rPr lang="en-GB" sz="1600" dirty="0" err="1">
-                <a:solidFill>
-                  <a:schemeClr val="tx1"/>
-                </a:solidFill>
-              </a:rPr>
-              <a:t>indicata</a:t>
-            </a:r>
-            <a:r>
-              <a:rPr lang="en-GB" sz="1600" dirty="0">
-                <a:solidFill>
-                  <a:schemeClr val="tx1"/>
-                </a:solidFill>
-              </a:rPr>
-              <a:t> </a:t>
-            </a:r>
-            <a:r>
-              <a:rPr lang="en-GB" sz="1600" dirty="0" err="1">
-                <a:solidFill>
-                  <a:schemeClr val="tx1"/>
-                </a:solidFill>
-              </a:rPr>
-              <a:t>tra</a:t>
-            </a:r>
-            <a:r>
-              <a:rPr lang="en-GB" sz="1600" dirty="0">
-                <a:solidFill>
-                  <a:schemeClr val="tx1"/>
-                </a:solidFill>
-              </a:rPr>
-              <a:t> le Affected Versions</a:t>
-            </a:r>
-          </a:p>
-          <a:p>
-            <a:pPr lvl="2">
-              <a:buFont typeface="Arial" panose="020B0604020202020204" pitchFamily="34" charset="0"/>
-              <a:buChar char="•"/>
-            </a:pPr>
-            <a:r>
-              <a:rPr lang="en-GB" sz="1600" dirty="0">
-                <a:solidFill>
-                  <a:schemeClr val="tx1"/>
-                </a:solidFill>
-              </a:rPr>
-              <a:t>IV &gt; OV</a:t>
-            </a:r>
-          </a:p>
-          <a:p>
-            <a:pPr lvl="1">
-              <a:buFont typeface="Arial" panose="020B0604020202020204" pitchFamily="34" charset="0"/>
-              <a:buChar char="•"/>
-            </a:pPr>
-            <a:endParaRPr lang="en-GB" dirty="0">
-              <a:solidFill>
-                <a:schemeClr val="tx1"/>
-              </a:solidFill>
-            </a:endParaRPr>
-          </a:p>
-          <a:p>
-            <a:pPr lvl="1">
-              <a:buFont typeface="Arial" panose="020B0604020202020204" pitchFamily="34" charset="0"/>
-              <a:buChar char="•"/>
-            </a:pPr>
-            <a:r>
-              <a:rPr lang="en-GB" dirty="0">
-                <a:solidFill>
-                  <a:schemeClr val="tx1"/>
-                </a:solidFill>
-              </a:rPr>
-              <a:t>Per </a:t>
-            </a:r>
-            <a:r>
-              <a:rPr lang="en-GB" dirty="0" err="1">
-                <a:solidFill>
-                  <a:schemeClr val="tx1"/>
-                </a:solidFill>
-              </a:rPr>
-              <a:t>i</a:t>
-            </a:r>
-            <a:r>
-              <a:rPr lang="en-GB" dirty="0">
-                <a:solidFill>
-                  <a:schemeClr val="tx1"/>
-                </a:solidFill>
-              </a:rPr>
-              <a:t> bug </a:t>
-            </a:r>
-            <a:r>
-              <a:rPr lang="en-GB" dirty="0" err="1">
-                <a:solidFill>
-                  <a:schemeClr val="tx1"/>
-                </a:solidFill>
-              </a:rPr>
-              <a:t>che</a:t>
-            </a:r>
-            <a:r>
-              <a:rPr lang="en-GB" dirty="0">
-                <a:solidFill>
-                  <a:schemeClr val="tx1"/>
-                </a:solidFill>
-              </a:rPr>
-              <a:t> non </a:t>
-            </a:r>
-            <a:r>
-              <a:rPr lang="en-GB" dirty="0" err="1">
-                <a:solidFill>
-                  <a:schemeClr val="tx1"/>
-                </a:solidFill>
-              </a:rPr>
-              <a:t>avevano</a:t>
-            </a:r>
-            <a:r>
-              <a:rPr lang="en-GB" dirty="0">
-                <a:solidFill>
-                  <a:schemeClr val="tx1"/>
-                </a:solidFill>
-              </a:rPr>
-              <a:t> </a:t>
-            </a:r>
-            <a:r>
-              <a:rPr lang="en-GB" dirty="0" err="1">
-                <a:solidFill>
-                  <a:schemeClr val="tx1"/>
-                </a:solidFill>
-              </a:rPr>
-              <a:t>una</a:t>
-            </a:r>
-            <a:r>
-              <a:rPr lang="en-GB" dirty="0">
-                <a:solidFill>
-                  <a:schemeClr val="tx1"/>
-                </a:solidFill>
-              </a:rPr>
-              <a:t> IV </a:t>
+              <a:t> IV non </a:t>
+            </a:r>
+            <a:r>
+              <a:rPr lang="en-GB" dirty="0" err="1">
+                <a:solidFill>
+                  <a:schemeClr val="tx1"/>
+                </a:solidFill>
+              </a:rPr>
+              <a:t>valida</a:t>
+            </a:r>
+            <a:r>
+              <a:rPr lang="en-GB" dirty="0">
+                <a:solidFill>
+                  <a:schemeClr val="tx1"/>
+                </a:solidFill>
+              </a:rPr>
+              <a:t> o non </a:t>
             </a:r>
             <a:r>
               <a:rPr lang="en-GB" dirty="0" err="1">
@@ -24116,6 +24794,322 @@
           </a:p>
         </p:txBody>
       </p:sp>
+      <mc:AlternateContent xmlns:mc="http://schemas.openxmlformats.org/markup-compatibility/2006">
+        <mc:Choice xmlns:a14="http://schemas.microsoft.com/office/drawing/2010/main" Requires="a14">
+          <p:sp>
+            <p:nvSpPr>
+              <p:cNvPr id="6" name="CasellaDiTesto 5">
+                <a:extLst>
+                  <a:ext uri="{FF2B5EF4-FFF2-40B4-BE49-F238E27FC236}">
+                    <a16:creationId xmlns:a16="http://schemas.microsoft.com/office/drawing/2014/main" id="{B1260868-432E-06F6-CECD-E99CB3A77D43}"/>
+                  </a:ext>
+                </a:extLst>
+              </p:cNvPr>
+              <p:cNvSpPr txBox="1"/>
+              <p:nvPr/>
+            </p:nvSpPr>
+            <p:spPr>
+              <a:xfrm>
+                <a:off x="3246120" y="5368936"/>
+                <a:ext cx="1901952" cy="609077"/>
+              </a:xfrm>
+              <a:prstGeom prst="rect">
+                <a:avLst/>
+              </a:prstGeom>
+              <a:noFill/>
+            </p:spPr>
+            <p:txBody>
+              <a:bodyPr wrap="square" rtlCol="0">
+                <a:spAutoFit/>
+              </a:bodyPr>
+              <a:lstStyle/>
+              <a:p>
+                <a14:m>
+                  <m:oMathPara xmlns:m="http://schemas.openxmlformats.org/officeDocument/2006/math">
+                    <m:oMathParaPr>
+                      <m:jc m:val="centerGroup"/>
+                    </m:oMathParaPr>
+                    <m:oMath xmlns:m="http://schemas.openxmlformats.org/officeDocument/2006/math">
+                      <m:r>
+                        <a:rPr lang="it-IT" b="0" i="1" smtClean="0">
+                          <a:latin typeface="Cambria Math" panose="02040503050406030204" pitchFamily="18" charset="0"/>
+                        </a:rPr>
+                        <m:t>𝑝</m:t>
+                      </m:r>
+                      <m:r>
+                        <a:rPr lang="it-IT" b="0" i="1" smtClean="0">
+                          <a:latin typeface="Cambria Math" panose="02040503050406030204" pitchFamily="18" charset="0"/>
+                        </a:rPr>
+                        <m:t>= </m:t>
+                      </m:r>
+                      <m:f>
+                        <m:fPr>
+                          <m:ctrlPr>
+                            <a:rPr lang="it-IT" b="0" i="1" smtClean="0">
+                              <a:latin typeface="Cambria Math" panose="02040503050406030204" pitchFamily="18" charset="0"/>
+                            </a:rPr>
+                          </m:ctrlPr>
+                        </m:fPr>
+                        <m:num>
+                          <m:r>
+                            <a:rPr lang="it-IT" b="0" i="1" smtClean="0">
+                              <a:latin typeface="Cambria Math" panose="02040503050406030204" pitchFamily="18" charset="0"/>
+                            </a:rPr>
+                            <m:t>𝐹𝑉</m:t>
+                          </m:r>
+                          <m:r>
+                            <a:rPr lang="it-IT" b="0" i="1" smtClean="0">
+                              <a:latin typeface="Cambria Math" panose="02040503050406030204" pitchFamily="18" charset="0"/>
+                            </a:rPr>
+                            <m:t> −</m:t>
+                          </m:r>
+                          <m:r>
+                            <a:rPr lang="it-IT" b="0" i="1" smtClean="0">
+                              <a:latin typeface="Cambria Math" panose="02040503050406030204" pitchFamily="18" charset="0"/>
+                            </a:rPr>
+                            <m:t>𝐼𝑉</m:t>
+                          </m:r>
+                        </m:num>
+                        <m:den>
+                          <m:r>
+                            <a:rPr lang="it-IT" b="0" i="1" smtClean="0">
+                              <a:latin typeface="Cambria Math" panose="02040503050406030204" pitchFamily="18" charset="0"/>
+                            </a:rPr>
+                            <m:t>𝐹𝑉</m:t>
+                          </m:r>
+                          <m:r>
+                            <a:rPr lang="it-IT" b="0" i="1" smtClean="0">
+                              <a:latin typeface="Cambria Math" panose="02040503050406030204" pitchFamily="18" charset="0"/>
+                            </a:rPr>
+                            <m:t> −</m:t>
+                          </m:r>
+                          <m:r>
+                            <a:rPr lang="it-IT" b="0" i="1" smtClean="0">
+                              <a:latin typeface="Cambria Math" panose="02040503050406030204" pitchFamily="18" charset="0"/>
+                            </a:rPr>
+                            <m:t>𝑂𝑉</m:t>
+                          </m:r>
+                        </m:den>
+                      </m:f>
+                    </m:oMath>
+                  </m:oMathPara>
+                </a14:m>
+                <a:endParaRPr lang="it-IT" dirty="0"/>
+              </a:p>
+            </p:txBody>
+          </p:sp>
+        </mc:Choice>
+        <mc:Fallback>
+          <p:sp>
+            <p:nvSpPr>
+              <p:cNvPr id="6" name="CasellaDiTesto 5">
+                <a:extLst>
+                  <a:ext uri="{FF2B5EF4-FFF2-40B4-BE49-F238E27FC236}">
+                    <a16:creationId xmlns:a16="http://schemas.microsoft.com/office/drawing/2014/main" id="{B1260868-432E-06F6-CECD-E99CB3A77D43}"/>
+                  </a:ext>
+                </a:extLst>
+              </p:cNvPr>
+              <p:cNvSpPr txBox="1">
+                <a:spLocks noRot="1" noChangeAspect="1" noMove="1" noResize="1" noEditPoints="1" noAdjustHandles="1" noChangeArrowheads="1" noChangeShapeType="1" noTextEdit="1"/>
+              </p:cNvSpPr>
+              <p:nvPr/>
+            </p:nvSpPr>
+            <p:spPr>
+              <a:xfrm>
+                <a:off x="3246120" y="5368936"/>
+                <a:ext cx="1901952" cy="609077"/>
+              </a:xfrm>
+              <a:prstGeom prst="rect">
+                <a:avLst/>
+              </a:prstGeom>
+              <a:blipFill>
+                <a:blip r:embed="rId2"/>
+                <a:stretch>
+                  <a:fillRect/>
+                </a:stretch>
+              </a:blipFill>
+            </p:spPr>
+            <p:txBody>
+              <a:bodyPr/>
+              <a:lstStyle/>
+              <a:p>
+                <a:r>
+                  <a:rPr lang="it-IT">
+                    <a:noFill/>
+                  </a:rPr>
+                  <a:t> </a:t>
+                </a:r>
+              </a:p>
+            </p:txBody>
+          </p:sp>
+        </mc:Fallback>
+      </mc:AlternateContent>
+      <mc:AlternateContent xmlns:mc="http://schemas.openxmlformats.org/markup-compatibility/2006">
+        <mc:Choice xmlns:a14="http://schemas.microsoft.com/office/drawing/2010/main" Requires="a14">
+          <p:sp>
+            <p:nvSpPr>
+              <p:cNvPr id="7" name="CasellaDiTesto 6">
+                <a:extLst>
+                  <a:ext uri="{FF2B5EF4-FFF2-40B4-BE49-F238E27FC236}">
+                    <a16:creationId xmlns:a16="http://schemas.microsoft.com/office/drawing/2014/main" id="{34DD7769-D5AA-C848-6424-2268313B2356}"/>
+                  </a:ext>
+                </a:extLst>
+              </p:cNvPr>
+              <p:cNvSpPr txBox="1"/>
+              <p:nvPr/>
+            </p:nvSpPr>
+            <p:spPr>
+              <a:xfrm>
+                <a:off x="6049817" y="5488808"/>
+                <a:ext cx="3935836" cy="369332"/>
+              </a:xfrm>
+              <a:prstGeom prst="rect">
+                <a:avLst/>
+              </a:prstGeom>
+              <a:noFill/>
+            </p:spPr>
+            <p:txBody>
+              <a:bodyPr wrap="square" rtlCol="0">
+                <a:spAutoFit/>
+              </a:bodyPr>
+              <a:lstStyle/>
+              <a:p>
+                <a14:m>
+                  <m:oMathPara xmlns:m="http://schemas.openxmlformats.org/officeDocument/2006/math">
+                    <m:oMathParaPr>
+                      <m:jc m:val="centerGroup"/>
+                    </m:oMathParaPr>
+                    <m:oMath xmlns:m="http://schemas.openxmlformats.org/officeDocument/2006/math">
+                      <m:r>
+                        <a:rPr lang="it-IT" b="0" i="1" smtClean="0">
+                          <a:latin typeface="Cambria Math" panose="02040503050406030204" pitchFamily="18" charset="0"/>
+                        </a:rPr>
+                        <m:t>𝑃𝑟𝑒𝑑𝑖𝑐𝑡𝑒𝑑</m:t>
+                      </m:r>
+                      <m:r>
+                        <a:rPr lang="it-IT" b="0" i="1" smtClean="0">
+                          <a:latin typeface="Cambria Math" panose="02040503050406030204" pitchFamily="18" charset="0"/>
+                        </a:rPr>
+                        <m:t> </m:t>
+                      </m:r>
+                      <m:r>
+                        <a:rPr lang="it-IT" b="0" i="1" smtClean="0">
+                          <a:latin typeface="Cambria Math" panose="02040503050406030204" pitchFamily="18" charset="0"/>
+                        </a:rPr>
+                        <m:t>𝐼𝑉</m:t>
+                      </m:r>
+                      <m:r>
+                        <a:rPr lang="it-IT" b="0" i="1" smtClean="0">
+                          <a:latin typeface="Cambria Math" panose="02040503050406030204" pitchFamily="18" charset="0"/>
+                        </a:rPr>
+                        <m:t>=</m:t>
+                      </m:r>
+                      <m:r>
+                        <a:rPr lang="it-IT" b="0" i="1" smtClean="0">
+                          <a:latin typeface="Cambria Math" panose="02040503050406030204" pitchFamily="18" charset="0"/>
+                        </a:rPr>
+                        <m:t>𝐹𝑉</m:t>
+                      </m:r>
+                      <m:r>
+                        <a:rPr lang="it-IT" b="0" i="1" smtClean="0">
+                          <a:latin typeface="Cambria Math" panose="02040503050406030204" pitchFamily="18" charset="0"/>
+                        </a:rPr>
+                        <m:t> −</m:t>
+                      </m:r>
+                      <m:d>
+                        <m:dPr>
+                          <m:ctrlPr>
+                            <a:rPr lang="it-IT" b="0" i="1" smtClean="0">
+                              <a:latin typeface="Cambria Math" panose="02040503050406030204" pitchFamily="18" charset="0"/>
+                            </a:rPr>
+                          </m:ctrlPr>
+                        </m:dPr>
+                        <m:e>
+                          <m:r>
+                            <a:rPr lang="it-IT" b="0" i="1" smtClean="0">
+                              <a:latin typeface="Cambria Math" panose="02040503050406030204" pitchFamily="18" charset="0"/>
+                            </a:rPr>
+                            <m:t>𝐹𝑉</m:t>
+                          </m:r>
+                          <m:r>
+                            <a:rPr lang="it-IT" b="0" i="1" smtClean="0">
+                              <a:latin typeface="Cambria Math" panose="02040503050406030204" pitchFamily="18" charset="0"/>
+                            </a:rPr>
+                            <m:t> −</m:t>
+                          </m:r>
+                          <m:r>
+                            <a:rPr lang="it-IT" b="0" i="1" smtClean="0">
+                              <a:latin typeface="Cambria Math" panose="02040503050406030204" pitchFamily="18" charset="0"/>
+                            </a:rPr>
+                            <m:t>𝑂𝑉</m:t>
+                          </m:r>
+                        </m:e>
+                      </m:d>
+                      <m:r>
+                        <a:rPr lang="it-IT" b="0" i="1" smtClean="0">
+                          <a:latin typeface="Cambria Math" panose="02040503050406030204" pitchFamily="18" charset="0"/>
+                        </a:rPr>
+                        <m:t>∗</m:t>
+                      </m:r>
+                      <m:r>
+                        <a:rPr lang="it-IT" b="0" i="1" smtClean="0">
+                          <a:latin typeface="Cambria Math" panose="02040503050406030204" pitchFamily="18" charset="0"/>
+                        </a:rPr>
+                        <m:t>𝑝</m:t>
+                      </m:r>
+                    </m:oMath>
+                  </m:oMathPara>
+                </a14:m>
+                <a:endParaRPr lang="it-IT" dirty="0"/>
+              </a:p>
+            </p:txBody>
+          </p:sp>
+        </mc:Choice>
+        <mc:Fallback>
+          <p:sp>
+            <p:nvSpPr>
+              <p:cNvPr id="7" name="CasellaDiTesto 6">
+                <a:extLst>
+                  <a:ext uri="{FF2B5EF4-FFF2-40B4-BE49-F238E27FC236}">
+                    <a16:creationId xmlns:a16="http://schemas.microsoft.com/office/drawing/2014/main" id="{34DD7769-D5AA-C848-6424-2268313B2356}"/>
+                  </a:ext>
+                </a:extLst>
+              </p:cNvPr>
+              <p:cNvSpPr txBox="1">
+                <a:spLocks noRot="1" noChangeAspect="1" noMove="1" noResize="1" noEditPoints="1" noAdjustHandles="1" noChangeArrowheads="1" noChangeShapeType="1" noTextEdit="1"/>
+              </p:cNvSpPr>
+              <p:nvPr/>
+            </p:nvSpPr>
+            <p:spPr>
+              <a:xfrm>
+                <a:off x="6049817" y="5488808"/>
+                <a:ext cx="3935836" cy="369332"/>
+              </a:xfrm>
+              <a:prstGeom prst="rect">
+                <a:avLst/>
+              </a:prstGeom>
+              <a:blipFill>
+                <a:blip r:embed="rId3"/>
+                <a:stretch>
+                  <a:fillRect b="-6557"/>
+                </a:stretch>
+              </a:blipFill>
+            </p:spPr>
+            <p:txBody>
+              <a:bodyPr/>
+              <a:lstStyle/>
+              <a:p>
+                <a:r>
+                  <a:rPr lang="it-IT">
+                    <a:noFill/>
+                  </a:rPr>
+                  <a:t> </a:t>
+                </a:r>
+              </a:p>
+            </p:txBody>
+          </p:sp>
+        </mc:Fallback>
+      </mc:AlternateContent>
     </p:spTree>
     <p:extLst>
       <p:ext uri="{BB962C8B-B14F-4D97-AF65-F5344CB8AC3E}">
@@ -24254,7 +25248,9 @@
           </a:xfrm>
         </p:spPr>
         <p:txBody>
-          <a:bodyPr/>
+          <a:bodyPr>
+            <a:normAutofit lnSpcReduction="10000"/>
+          </a:bodyPr>
           <a:lstStyle/>
           <a:p>
             <a:pPr lvl="1">
@@ -24379,31 +25375,15 @@
                   <a:schemeClr val="tx1"/>
                 </a:solidFill>
               </a:rPr>
-              <a:t>effettuati</a:t>
-            </a:r>
-            <a:r>
-              <a:rPr lang="en-GB" dirty="0">
-                <a:solidFill>
-                  <a:schemeClr val="tx1"/>
-                </a:solidFill>
-              </a:rPr>
-              <a:t> </a:t>
-            </a:r>
-            <a:r>
-              <a:rPr lang="en-GB" dirty="0" err="1">
-                <a:solidFill>
-                  <a:schemeClr val="tx1"/>
-                </a:solidFill>
-              </a:rPr>
-              <a:t>nel</a:t>
-            </a:r>
-            <a:r>
-              <a:rPr lang="en-GB" dirty="0">
-                <a:solidFill>
-                  <a:schemeClr val="tx1"/>
-                </a:solidFill>
-              </a:rPr>
-              <a:t> tempo sui </a:t>
+              <a:t>dei</a:t>
+            </a:r>
+            <a:r>
+              <a:rPr lang="en-GB" dirty="0">
+                <a:solidFill>
+                  <a:schemeClr val="tx1"/>
+                </a:solidFill>
+              </a:rPr>
+              <a:t> </a:t>
             </a:r>
             <a:r>
               <a:rPr lang="en-GB" dirty="0" err="1">
@@ -24547,7 +25527,103 @@
                   <a:schemeClr val="tx1"/>
                 </a:solidFill>
               </a:rPr>
-              <a:t> commit di fix.</a:t>
+              <a:t> commit di fix, </a:t>
+            </a:r>
+            <a:r>
+              <a:rPr lang="en-GB" dirty="0" err="1">
+                <a:solidFill>
+                  <a:schemeClr val="tx1"/>
+                </a:solidFill>
+              </a:rPr>
+              <a:t>necessari</a:t>
+            </a:r>
+            <a:r>
+              <a:rPr lang="en-GB" dirty="0">
+                <a:solidFill>
+                  <a:schemeClr val="tx1"/>
+                </a:solidFill>
+              </a:rPr>
+              <a:t> per </a:t>
+            </a:r>
+            <a:r>
+              <a:rPr lang="en-GB" dirty="0" err="1">
+                <a:solidFill>
+                  <a:schemeClr val="tx1"/>
+                </a:solidFill>
+              </a:rPr>
+              <a:t>classificare</a:t>
+            </a:r>
+            <a:r>
+              <a:rPr lang="en-GB" dirty="0">
+                <a:solidFill>
+                  <a:schemeClr val="tx1"/>
+                </a:solidFill>
+              </a:rPr>
+              <a:t> le </a:t>
+            </a:r>
+            <a:r>
+              <a:rPr lang="en-GB" dirty="0" err="1">
+                <a:solidFill>
+                  <a:schemeClr val="tx1"/>
+                </a:solidFill>
+              </a:rPr>
+              <a:t>classi</a:t>
+            </a:r>
+            <a:r>
+              <a:rPr lang="en-GB" dirty="0">
+                <a:solidFill>
+                  <a:schemeClr val="tx1"/>
+                </a:solidFill>
+              </a:rPr>
+              <a:t> software come </a:t>
+            </a:r>
+            <a:r>
+              <a:rPr lang="en-GB" i="1" dirty="0">
+                <a:solidFill>
+                  <a:schemeClr val="tx1"/>
+                </a:solidFill>
+              </a:rPr>
+              <a:t>buggy</a:t>
+            </a:r>
+            <a:r>
+              <a:rPr lang="en-GB" dirty="0">
+                <a:solidFill>
+                  <a:schemeClr val="tx1"/>
+                </a:solidFill>
+              </a:rPr>
+              <a:t> o </a:t>
+            </a:r>
+            <a:r>
+              <a:rPr lang="en-GB" i="1" dirty="0">
+                <a:solidFill>
+                  <a:schemeClr val="tx1"/>
+                </a:solidFill>
+              </a:rPr>
+              <a:t>non buggy</a:t>
+            </a:r>
+            <a:r>
+              <a:rPr lang="en-GB" dirty="0">
+                <a:solidFill>
+                  <a:schemeClr val="tx1"/>
+                </a:solidFill>
+              </a:rPr>
+              <a:t> </a:t>
+            </a:r>
+            <a:r>
+              <a:rPr lang="en-GB" dirty="0" err="1">
+                <a:solidFill>
+                  <a:schemeClr val="tx1"/>
+                </a:solidFill>
+              </a:rPr>
+              <a:t>nelle</a:t>
+            </a:r>
+            <a:r>
+              <a:rPr lang="en-GB" dirty="0">
+                <a:solidFill>
+                  <a:schemeClr val="tx1"/>
+                </a:solidFill>
+              </a:rPr>
+              <a:t> diverse releases.</a:t>
             </a:r>
           </a:p>
           <a:p>
@@ -25573,7 +26649,7 @@
                   <a:schemeClr val="tx1"/>
                 </a:solidFill>
               </a:rPr>
-              <a:t>siano</a:t>
+              <a:t>vengano</a:t>
             </a:r>
             <a:r>
               <a:rPr lang="en-GB" dirty="0">

</xml_diff>